<commit_message>
Update pkgdown documentation c10563a520d85de3eae17aecf5600df069725a86
</commit_message>
<xml_diff>
--- a/main/reference/ae.pptx
+++ b/main/reference/ae.pptx
@@ -3412,7 +3412,7 @@
           <p:nvPr/>
         </p:nvGraphicFramePr>
         <p:xfrm rot="0">
-          <a:off x="2862526" y="1165860"/>
+          <a:off x="2608556" y="1165860"/>
           <a:ext cx="3657600" cy="2743200"/>
         </p:xfrm>
         <a:graphic>
@@ -3420,10 +3420,11 @@
             <a:tbl>
               <a:tblPr/>
               <a:tblGrid>
-                <a:gridCol w="2977693"/>
-                <a:gridCol w="1163085"/>
-                <a:gridCol w="1163085"/>
-                <a:gridCol w="1163085"/>
+                <a:gridCol w="2780359"/>
+                <a:gridCol w="1048632"/>
+                <a:gridCol w="1048632"/>
+                <a:gridCol w="1048632"/>
+                <a:gridCol w="1048632"/>
               </a:tblGrid>
               <a:tr h="268114">
                 <a:tc>
@@ -3514,6 +3515,17 @@
                         </a:spcAft>
                         <a:buNone/>
                       </a:pPr>
+                      <a:endParaRPr cap="none" sz="1400" i="0" b="1" u="none">
+                        <a:solidFill>
+                          <a:srgbClr val="FFFFFF">
+                            <a:alpha val="100000"/>
+                          </a:srgbClr>
+                        </a:solidFill>
+                        <a:latin typeface="arial"/>
+                        <a:cs typeface="arial"/>
+                        <a:ea typeface="arial"/>
+                        <a:sym typeface="arial"/>
+                      </a:endParaRPr>
                       <a:r>
                         <a:rPr cap="none" sz="1400" i="0" b="1" u="none">
                           <a:solidFill>
@@ -3526,7 +3538,7 @@
                           <a:ea typeface="arial"/>
                           <a:sym typeface="arial"/>
                         </a:rPr>
-                        <a:t>A: Drug X</a:t>
+                        <a:t/>
                       </a:r>
                     </a:p>
                   </a:txBody>
@@ -3571,6 +3583,17 @@
                         </a:spcAft>
                         <a:buNone/>
                       </a:pPr>
+                      <a:endParaRPr cap="none" sz="1400" i="0" b="1" u="none">
+                        <a:solidFill>
+                          <a:srgbClr val="FFFFFF">
+                            <a:alpha val="100000"/>
+                          </a:srgbClr>
+                        </a:solidFill>
+                        <a:latin typeface="arial"/>
+                        <a:cs typeface="arial"/>
+                        <a:ea typeface="arial"/>
+                        <a:sym typeface="arial"/>
+                      </a:endParaRPr>
                       <a:r>
                         <a:rPr cap="none" sz="1400" i="0" b="1" u="none">
                           <a:solidFill>
@@ -3583,7 +3606,7 @@
                           <a:ea typeface="arial"/>
                           <a:sym typeface="arial"/>
                         </a:rPr>
-                        <a:t>B: Placebo</a:t>
+                        <a:t/>
                       </a:r>
                     </a:p>
                   </a:txBody>
@@ -3628,6 +3651,17 @@
                         </a:spcAft>
                         <a:buNone/>
                       </a:pPr>
+                      <a:endParaRPr cap="none" sz="1400" i="0" b="1" u="none">
+                        <a:solidFill>
+                          <a:srgbClr val="FFFFFF">
+                            <a:alpha val="100000"/>
+                          </a:srgbClr>
+                        </a:solidFill>
+                        <a:latin typeface="arial"/>
+                        <a:cs typeface="arial"/>
+                        <a:ea typeface="arial"/>
+                        <a:sym typeface="arial"/>
+                      </a:endParaRPr>
                       <a:r>
                         <a:rPr cap="none" sz="1400" i="0" b="1" u="none">
                           <a:solidFill>
@@ -3640,7 +3674,7 @@
                           <a:ea typeface="arial"/>
                           <a:sym typeface="arial"/>
                         </a:rPr>
-                        <a:t>All Patients</a:t>
+                        <a:t/>
                       </a:r>
                     </a:p>
                   </a:txBody>
@@ -3668,8 +3702,6 @@
                     </a:solidFill>
                   </a:tcPr>
                 </a:tc>
-              </a:tr>
-              <a:tr h="267333">
                 <a:tc>
                   <a:txBody>
                     <a:bodyPr/>
@@ -3687,6 +3719,17 @@
                         </a:spcAft>
                         <a:buNone/>
                       </a:pPr>
+                      <a:endParaRPr cap="none" sz="1400" i="0" b="1" u="none">
+                        <a:solidFill>
+                          <a:srgbClr val="FFFFFF">
+                            <a:alpha val="100000"/>
+                          </a:srgbClr>
+                        </a:solidFill>
+                        <a:latin typeface="arial"/>
+                        <a:cs typeface="arial"/>
+                        <a:ea typeface="arial"/>
+                        <a:sym typeface="arial"/>
+                      </a:endParaRPr>
                       <a:r>
                         <a:rPr cap="none" sz="1400" i="0" b="1" u="none">
                           <a:solidFill>
@@ -3699,7 +3742,7 @@
                           <a:ea typeface="arial"/>
                           <a:sym typeface="arial"/>
                         </a:rPr>
-                        <a:t>   MedDRA Preferred Term N (%)</a:t>
+                        <a:t/>
                       </a:r>
                     </a:p>
                   </a:txBody>
@@ -3727,27 +3770,29 @@
                     </a:solidFill>
                   </a:tcPr>
                 </a:tc>
+              </a:tr>
+              <a:tr h="243582">
                 <a:tc>
                   <a:txBody>
                     <a:bodyPr/>
                     <a:lstStyle/>
                     <a:p>
-                      <a:pPr algn="ctr" marL="63500" marR="63500">
-                        <a:lnSpc>
-                          <a:spcPct val="100000"/>
-                        </a:lnSpc>
-                        <a:spcBef>
-                          <a:spcPts val="300"/>
-                        </a:spcBef>
-                        <a:spcAft>
-                          <a:spcPts val="300"/>
-                        </a:spcAft>
-                        <a:buNone/>
-                      </a:pPr>
-                      <a:r>
-                        <a:rPr cap="none" sz="1400" i="0" b="1" u="none">
-                          <a:solidFill>
-                            <a:srgbClr val="FFFFFF">
+                      <a:pPr algn="l" marL="127000" marR="63500">
+                        <a:lnSpc>
+                          <a:spcPct val="100000"/>
+                        </a:lnSpc>
+                        <a:spcBef>
+                          <a:spcPts val="300"/>
+                        </a:spcBef>
+                        <a:spcAft>
+                          <a:spcPts val="300"/>
+                        </a:spcAft>
+                        <a:buNone/>
+                      </a:pPr>
+                      <a:r>
+                        <a:rPr cap="none" sz="1200" i="0" b="0" u="none">
+                          <a:solidFill>
+                            <a:srgbClr val="000000">
                               <a:alpha val="100000"/>
                             </a:srgbClr>
                           </a:solidFill>
@@ -3756,7 +3801,7 @@
                           <a:ea typeface="arial"/>
                           <a:sym typeface="arial"/>
                         </a:rPr>
-                        <a:t>(N=134)</a:t>
+                        <a:t>   MedDRA Preferred Term N (%)</a:t>
                       </a:r>
                     </a:p>
                   </a:txBody>
@@ -3778,7 +3823,7 @@
                       <a:prstDash val="solid"/>
                     </a:lnB>
                     <a:solidFill>
-                      <a:srgbClr val="ED4A0D">
+                      <a:srgbClr val="FF7D29">
                         <a:alpha val="100000"/>
                       </a:srgbClr>
                     </a:solidFill>
@@ -3802,9 +3847,9 @@
                         <a:buNone/>
                       </a:pPr>
                       <a:r>
-                        <a:rPr cap="none" sz="1400" i="0" b="1" u="none">
-                          <a:solidFill>
-                            <a:srgbClr val="FFFFFF">
+                        <a:rPr cap="none" sz="1200" i="0" b="0" u="none">
+                          <a:solidFill>
+                            <a:srgbClr val="000000">
                               <a:alpha val="100000"/>
                             </a:srgbClr>
                           </a:solidFill>
@@ -3813,7 +3858,7 @@
                           <a:ea typeface="arial"/>
                           <a:sym typeface="arial"/>
                         </a:rPr>
-                        <a:t>(N=134)</a:t>
+                        <a:t>A: Drug X</a:t>
                       </a:r>
                     </a:p>
                   </a:txBody>
@@ -3835,7 +3880,7 @@
                       <a:prstDash val="solid"/>
                     </a:lnB>
                     <a:solidFill>
-                      <a:srgbClr val="ED4A0D">
+                      <a:srgbClr val="FF7D29">
                         <a:alpha val="100000"/>
                       </a:srgbClr>
                     </a:solidFill>
@@ -3859,9 +3904,9 @@
                         <a:buNone/>
                       </a:pPr>
                       <a:r>
-                        <a:rPr cap="none" sz="1400" i="0" b="1" u="none">
-                          <a:solidFill>
-                            <a:srgbClr val="FFFFFF">
+                        <a:rPr cap="none" sz="1200" i="0" b="0" u="none">
+                          <a:solidFill>
+                            <a:srgbClr val="000000">
                               <a:alpha val="100000"/>
                             </a:srgbClr>
                           </a:solidFill>
@@ -3870,7 +3915,7 @@
                           <a:ea typeface="arial"/>
                           <a:sym typeface="arial"/>
                         </a:rPr>
-                        <a:t>(N=268)</a:t>
+                        <a:t>B: Placebo</a:t>
                       </a:r>
                     </a:p>
                   </a:txBody>
@@ -3892,20 +3937,18 @@
                       <a:prstDash val="solid"/>
                     </a:lnB>
                     <a:solidFill>
-                      <a:srgbClr val="ED4A0D">
+                      <a:srgbClr val="FF7D29">
                         <a:alpha val="100000"/>
                       </a:srgbClr>
                     </a:solidFill>
                   </a:tcPr>
                 </a:tc>
-              </a:tr>
-              <a:tr h="243582">
                 <a:tc>
                   <a:txBody>
                     <a:bodyPr/>
                     <a:lstStyle/>
                     <a:p>
-                      <a:pPr algn="l" marL="127000" marR="63500">
+                      <a:pPr algn="ctr" marL="63500" marR="63500">
                         <a:lnSpc>
                           <a:spcPct val="100000"/>
                         </a:lnSpc>
@@ -3929,7 +3972,7 @@
                           <a:ea typeface="arial"/>
                           <a:sym typeface="arial"/>
                         </a:rPr>
-                        <a:t>cl A.1</a:t>
+                        <a:t>All Patients</a:t>
                       </a:r>
                     </a:p>
                   </a:txBody>
@@ -3986,7 +4029,7 @@
                           <a:ea typeface="arial"/>
                           <a:sym typeface="arial"/>
                         </a:rPr>
-                        <a:t>78 (58.2%)</a:t>
+                        <a:t>All Patients</a:t>
                       </a:r>
                     </a:p>
                   </a:txBody>
@@ -4014,12 +4057,14 @@
                     </a:solidFill>
                   </a:tcPr>
                 </a:tc>
+              </a:tr>
+              <a:tr h="243582">
                 <a:tc>
                   <a:txBody>
                     <a:bodyPr/>
                     <a:lstStyle/>
                     <a:p>
-                      <a:pPr algn="ctr" marL="63500" marR="63500">
+                      <a:pPr algn="l" marL="127000" marR="63500">
                         <a:lnSpc>
                           <a:spcPct val="100000"/>
                         </a:lnSpc>
@@ -4043,7 +4088,7 @@
                           <a:ea typeface="arial"/>
                           <a:sym typeface="arial"/>
                         </a:rPr>
-                        <a:t>75 (56.0%)</a:t>
+                        <a:t>cl A.1</a:t>
                       </a:r>
                     </a:p>
                   </a:txBody>
@@ -4065,7 +4110,7 @@
                       <a:prstDash val="solid"/>
                     </a:lnB>
                     <a:solidFill>
-                      <a:srgbClr val="FF7D29">
+                      <a:srgbClr val="FFBD69">
                         <a:alpha val="100000"/>
                       </a:srgbClr>
                     </a:solidFill>
@@ -4100,7 +4145,7 @@
                           <a:ea typeface="arial"/>
                           <a:sym typeface="arial"/>
                         </a:rPr>
-                        <a:t>153 (57.1%)</a:t>
+                        <a:t>78 (58.2%)</a:t>
                       </a:r>
                     </a:p>
                   </a:txBody>
@@ -4122,20 +4167,18 @@
                       <a:prstDash val="solid"/>
                     </a:lnB>
                     <a:solidFill>
-                      <a:srgbClr val="FF7D29">
+                      <a:srgbClr val="FFBD69">
                         <a:alpha val="100000"/>
                       </a:srgbClr>
                     </a:solidFill>
                   </a:tcPr>
                 </a:tc>
-              </a:tr>
-              <a:tr h="243582">
                 <a:tc>
                   <a:txBody>
                     <a:bodyPr/>
                     <a:lstStyle/>
                     <a:p>
-                      <a:pPr algn="l" marL="127000" marR="63500">
+                      <a:pPr algn="ctr" marL="63500" marR="63500">
                         <a:lnSpc>
                           <a:spcPct val="100000"/>
                         </a:lnSpc>
@@ -4159,7 +4202,7 @@
                           <a:ea typeface="arial"/>
                           <a:sym typeface="arial"/>
                         </a:rPr>
-                        <a:t>dcd A.1.1.1.2</a:t>
+                        <a:t>75 (56.0%)</a:t>
                       </a:r>
                     </a:p>
                   </a:txBody>
@@ -4216,7 +4259,7 @@
                           <a:ea typeface="arial"/>
                           <a:sym typeface="arial"/>
                         </a:rPr>
-                        <a:t>48 (35.8%)</a:t>
+                        <a:t>153 (57.1%)</a:t>
                       </a:r>
                     </a:p>
                   </a:txBody>
@@ -4273,7 +4316,7 @@
                           <a:ea typeface="arial"/>
                           <a:sym typeface="arial"/>
                         </a:rPr>
-                        <a:t>48 (35.8%)</a:t>
+                        <a:t>242 (60.5%)</a:t>
                       </a:r>
                     </a:p>
                   </a:txBody>
@@ -4301,12 +4344,14 @@
                     </a:solidFill>
                   </a:tcPr>
                 </a:tc>
+              </a:tr>
+              <a:tr h="243582">
                 <a:tc>
                   <a:txBody>
                     <a:bodyPr/>
                     <a:lstStyle/>
                     <a:p>
-                      <a:pPr algn="ctr" marL="63500" marR="63500">
+                      <a:pPr algn="l" marL="127000" marR="63500">
                         <a:lnSpc>
                           <a:spcPct val="100000"/>
                         </a:lnSpc>
@@ -4330,7 +4375,7 @@
                           <a:ea typeface="arial"/>
                           <a:sym typeface="arial"/>
                         </a:rPr>
-                        <a:t>96 (35.8%)</a:t>
+                        <a:t>dcd A.1.1.1.1</a:t>
                       </a:r>
                     </a:p>
                   </a:txBody>
@@ -4352,20 +4397,18 @@
                       <a:prstDash val="solid"/>
                     </a:lnB>
                     <a:solidFill>
-                      <a:srgbClr val="FFBD69">
+                      <a:srgbClr val="FF7D29">
                         <a:alpha val="100000"/>
                       </a:srgbClr>
                     </a:solidFill>
                   </a:tcPr>
                 </a:tc>
-              </a:tr>
-              <a:tr h="243582">
                 <a:tc>
                   <a:txBody>
                     <a:bodyPr/>
                     <a:lstStyle/>
                     <a:p>
-                      <a:pPr algn="l" marL="127000" marR="63500">
+                      <a:pPr algn="ctr" marL="63500" marR="63500">
                         <a:lnSpc>
                           <a:spcPct val="100000"/>
                         </a:lnSpc>
@@ -4389,7 +4432,7 @@
                           <a:ea typeface="arial"/>
                           <a:sym typeface="arial"/>
                         </a:rPr>
-                        <a:t>dcd A.1.1.1.1</a:t>
+                        <a:t>50 (37.3%)</a:t>
                       </a:r>
                     </a:p>
                   </a:txBody>
@@ -4446,7 +4489,7 @@
                           <a:ea typeface="arial"/>
                           <a:sym typeface="arial"/>
                         </a:rPr>
-                        <a:t>50 (37.3%)</a:t>
+                        <a:t>45 (33.6%)</a:t>
                       </a:r>
                     </a:p>
                   </a:txBody>
@@ -4503,7 +4546,7 @@
                           <a:ea typeface="arial"/>
                           <a:sym typeface="arial"/>
                         </a:rPr>
-                        <a:t>45 (33.6%)</a:t>
+                        <a:t>95 (35.4%)</a:t>
                       </a:r>
                     </a:p>
                   </a:txBody>
@@ -4560,7 +4603,7 @@
                           <a:ea typeface="arial"/>
                           <a:sym typeface="arial"/>
                         </a:rPr>
-                        <a:t>95 (35.4%)</a:t>
+                        <a:t>158 (39.5%)</a:t>
                       </a:r>
                     </a:p>
                   </a:txBody>
@@ -4619,7 +4662,7 @@
                           <a:ea typeface="arial"/>
                           <a:sym typeface="arial"/>
                         </a:rPr>
-                        <a:t>cl B.2</a:t>
+                        <a:t>dcd A.1.1.1.2</a:t>
                       </a:r>
                     </a:p>
                   </a:txBody>
@@ -4676,7 +4719,7 @@
                           <a:ea typeface="arial"/>
                           <a:sym typeface="arial"/>
                         </a:rPr>
-                        <a:t>79 (59.0%)</a:t>
+                        <a:t>48 (35.8%)</a:t>
                       </a:r>
                     </a:p>
                   </a:txBody>
@@ -4733,7 +4776,7 @@
                           <a:ea typeface="arial"/>
                           <a:sym typeface="arial"/>
                         </a:rPr>
-                        <a:t>74 (55.2%)</a:t>
+                        <a:t>48 (35.8%)</a:t>
                       </a:r>
                     </a:p>
                   </a:txBody>
@@ -4790,7 +4833,7 @@
                           <a:ea typeface="arial"/>
                           <a:sym typeface="arial"/>
                         </a:rPr>
-                        <a:t>153 (57.1%)</a:t>
+                        <a:t>96 (35.8%)</a:t>
                       </a:r>
                     </a:p>
                   </a:txBody>
@@ -4818,14 +4861,12 @@
                     </a:solidFill>
                   </a:tcPr>
                 </a:tc>
-              </a:tr>
-              <a:tr h="243582">
                 <a:tc>
                   <a:txBody>
                     <a:bodyPr/>
                     <a:lstStyle/>
                     <a:p>
-                      <a:pPr algn="l" marL="127000" marR="63500">
+                      <a:pPr algn="ctr" marL="63500" marR="63500">
                         <a:lnSpc>
                           <a:spcPct val="100000"/>
                         </a:lnSpc>
@@ -4849,7 +4890,7 @@
                           <a:ea typeface="arial"/>
                           <a:sym typeface="arial"/>
                         </a:rPr>
-                        <a:t>dcd B.2.2.3.1</a:t>
+                        <a:t>146 (36.5%)</a:t>
                       </a:r>
                     </a:p>
                   </a:txBody>
@@ -4871,18 +4912,20 @@
                       <a:prstDash val="solid"/>
                     </a:lnB>
                     <a:solidFill>
-                      <a:srgbClr val="FF7D29">
+                      <a:srgbClr val="FFBD69">
                         <a:alpha val="100000"/>
                       </a:srgbClr>
                     </a:solidFill>
                   </a:tcPr>
                 </a:tc>
+              </a:tr>
+              <a:tr h="243582">
                 <a:tc>
                   <a:txBody>
                     <a:bodyPr/>
                     <a:lstStyle/>
                     <a:p>
-                      <a:pPr algn="ctr" marL="63500" marR="63500">
+                      <a:pPr algn="l" marL="127000" marR="63500">
                         <a:lnSpc>
                           <a:spcPct val="100000"/>
                         </a:lnSpc>
@@ -4906,7 +4949,7 @@
                           <a:ea typeface="arial"/>
                           <a:sym typeface="arial"/>
                         </a:rPr>
-                        <a:t>48 (35.8%)</a:t>
+                        <a:t>cl B.2</a:t>
                       </a:r>
                     </a:p>
                   </a:txBody>
@@ -4963,7 +5006,7 @@
                           <a:ea typeface="arial"/>
                           <a:sym typeface="arial"/>
                         </a:rPr>
-                        <a:t>54 (40.3%)</a:t>
+                        <a:t>79 (59.0%)</a:t>
                       </a:r>
                     </a:p>
                   </a:txBody>
@@ -5020,7 +5063,7 @@
                           <a:ea typeface="arial"/>
                           <a:sym typeface="arial"/>
                         </a:rPr>
-                        <a:t>102 (38.1%)</a:t>
+                        <a:t>74 (55.2%)</a:t>
                       </a:r>
                     </a:p>
                   </a:txBody>
@@ -5048,14 +5091,12 @@
                     </a:solidFill>
                   </a:tcPr>
                 </a:tc>
-              </a:tr>
-              <a:tr h="243582">
                 <a:tc>
                   <a:txBody>
                     <a:bodyPr/>
                     <a:lstStyle/>
                     <a:p>
-                      <a:pPr algn="l" marL="127000" marR="63500">
+                      <a:pPr algn="ctr" marL="63500" marR="63500">
                         <a:lnSpc>
                           <a:spcPct val="100000"/>
                         </a:lnSpc>
@@ -5079,7 +5120,7 @@
                           <a:ea typeface="arial"/>
                           <a:sym typeface="arial"/>
                         </a:rPr>
-                        <a:t>dcd B.2.1.2.1</a:t>
+                        <a:t>153 (57.1%)</a:t>
                       </a:r>
                     </a:p>
                   </a:txBody>
@@ -5101,7 +5142,7 @@
                       <a:prstDash val="solid"/>
                     </a:lnB>
                     <a:solidFill>
-                      <a:srgbClr val="FFBD69">
+                      <a:srgbClr val="FF7D29">
                         <a:alpha val="100000"/>
                       </a:srgbClr>
                     </a:solidFill>
@@ -5136,7 +5177,7 @@
                           <a:ea typeface="arial"/>
                           <a:sym typeface="arial"/>
                         </a:rPr>
-                        <a:t>49 (36.6%)</a:t>
+                        <a:t>238 (59.5%)</a:t>
                       </a:r>
                     </a:p>
                   </a:txBody>
@@ -5158,18 +5199,20 @@
                       <a:prstDash val="solid"/>
                     </a:lnB>
                     <a:solidFill>
-                      <a:srgbClr val="FFBD69">
+                      <a:srgbClr val="FF7D29">
                         <a:alpha val="100000"/>
                       </a:srgbClr>
                     </a:solidFill>
                   </a:tcPr>
                 </a:tc>
+              </a:tr>
+              <a:tr h="243582">
                 <a:tc>
                   <a:txBody>
                     <a:bodyPr/>
                     <a:lstStyle/>
                     <a:p>
-                      <a:pPr algn="ctr" marL="63500" marR="63500">
+                      <a:pPr algn="l" marL="127000" marR="63500">
                         <a:lnSpc>
                           <a:spcPct val="100000"/>
                         </a:lnSpc>
@@ -5193,7 +5236,7 @@
                           <a:ea typeface="arial"/>
                           <a:sym typeface="arial"/>
                         </a:rPr>
-                        <a:t>44 (32.8%)</a:t>
+                        <a:t>dcd B.2.2.3.1</a:t>
                       </a:r>
                     </a:p>
                   </a:txBody>
@@ -5250,7 +5293,7 @@
                           <a:ea typeface="arial"/>
                           <a:sym typeface="arial"/>
                         </a:rPr>
-                        <a:t>93 (34.7%)</a:t>
+                        <a:t>48 (35.8%)</a:t>
                       </a:r>
                     </a:p>
                   </a:txBody>
@@ -5278,14 +5321,12 @@
                     </a:solidFill>
                   </a:tcPr>
                 </a:tc>
-              </a:tr>
-              <a:tr h="243582">
                 <a:tc>
                   <a:txBody>
                     <a:bodyPr/>
                     <a:lstStyle/>
                     <a:p>
-                      <a:pPr algn="l" marL="127000" marR="63500">
+                      <a:pPr algn="ctr" marL="63500" marR="63500">
                         <a:lnSpc>
                           <a:spcPct val="100000"/>
                         </a:lnSpc>
@@ -5309,7 +5350,7 @@
                           <a:ea typeface="arial"/>
                           <a:sym typeface="arial"/>
                         </a:rPr>
-                        <a:t>cl D.1</a:t>
+                        <a:t>54 (40.3%)</a:t>
                       </a:r>
                     </a:p>
                   </a:txBody>
@@ -5331,7 +5372,7 @@
                       <a:prstDash val="solid"/>
                     </a:lnB>
                     <a:solidFill>
-                      <a:srgbClr val="FF7D29">
+                      <a:srgbClr val="FFBD69">
                         <a:alpha val="100000"/>
                       </a:srgbClr>
                     </a:solidFill>
@@ -5366,7 +5407,7 @@
                           <a:ea typeface="arial"/>
                           <a:sym typeface="arial"/>
                         </a:rPr>
-                        <a:t>79 (59.0%)</a:t>
+                        <a:t>102 (38.1%)</a:t>
                       </a:r>
                     </a:p>
                   </a:txBody>
@@ -5388,7 +5429,7 @@
                       <a:prstDash val="solid"/>
                     </a:lnB>
                     <a:solidFill>
-                      <a:srgbClr val="FF7D29">
+                      <a:srgbClr val="FFBD69">
                         <a:alpha val="100000"/>
                       </a:srgbClr>
                     </a:solidFill>
@@ -5423,7 +5464,7 @@
                           <a:ea typeface="arial"/>
                           <a:sym typeface="arial"/>
                         </a:rPr>
-                        <a:t>67 (50.0%)</a:t>
+                        <a:t>153 (38.2%)</a:t>
                       </a:r>
                     </a:p>
                   </a:txBody>
@@ -5445,18 +5486,20 @@
                       <a:prstDash val="solid"/>
                     </a:lnB>
                     <a:solidFill>
-                      <a:srgbClr val="FF7D29">
+                      <a:srgbClr val="FFBD69">
                         <a:alpha val="100000"/>
                       </a:srgbClr>
                     </a:solidFill>
                   </a:tcPr>
                 </a:tc>
+              </a:tr>
+              <a:tr h="243582">
                 <a:tc>
                   <a:txBody>
                     <a:bodyPr/>
                     <a:lstStyle/>
                     <a:p>
-                      <a:pPr algn="ctr" marL="63500" marR="63500">
+                      <a:pPr algn="l" marL="127000" marR="63500">
                         <a:lnSpc>
                           <a:spcPct val="100000"/>
                         </a:lnSpc>
@@ -5480,7 +5523,7 @@
                           <a:ea typeface="arial"/>
                           <a:sym typeface="arial"/>
                         </a:rPr>
-                        <a:t>146 (54.5%)</a:t>
+                        <a:t>dcd B.2.1.2.1</a:t>
                       </a:r>
                     </a:p>
                   </a:txBody>
@@ -5508,14 +5551,12 @@
                     </a:solidFill>
                   </a:tcPr>
                 </a:tc>
-              </a:tr>
-              <a:tr h="243582">
                 <a:tc>
                   <a:txBody>
                     <a:bodyPr/>
                     <a:lstStyle/>
                     <a:p>
-                      <a:pPr algn="l" marL="127000" marR="63500">
+                      <a:pPr algn="ctr" marL="63500" marR="63500">
                         <a:lnSpc>
                           <a:spcPct val="100000"/>
                         </a:lnSpc>
@@ -5539,7 +5580,7 @@
                           <a:ea typeface="arial"/>
                           <a:sym typeface="arial"/>
                         </a:rPr>
-                        <a:t>dcd D.1.1.1.1</a:t>
+                        <a:t>49 (36.6%)</a:t>
                       </a:r>
                     </a:p>
                   </a:txBody>
@@ -5561,7 +5602,7 @@
                       <a:prstDash val="solid"/>
                     </a:lnB>
                     <a:solidFill>
-                      <a:srgbClr val="FFBD69">
+                      <a:srgbClr val="FF7D29">
                         <a:alpha val="100000"/>
                       </a:srgbClr>
                     </a:solidFill>
@@ -5596,7 +5637,7 @@
                           <a:ea typeface="arial"/>
                           <a:sym typeface="arial"/>
                         </a:rPr>
-                        <a:t>50 (37.3%)</a:t>
+                        <a:t>44 (32.8%)</a:t>
                       </a:r>
                     </a:p>
                   </a:txBody>
@@ -5618,7 +5659,7 @@
                       <a:prstDash val="solid"/>
                     </a:lnB>
                     <a:solidFill>
-                      <a:srgbClr val="FFBD69">
+                      <a:srgbClr val="FF7D29">
                         <a:alpha val="100000"/>
                       </a:srgbClr>
                     </a:solidFill>
@@ -5653,7 +5694,7 @@
                           <a:ea typeface="arial"/>
                           <a:sym typeface="arial"/>
                         </a:rPr>
-                        <a:t>42 (31.3%)</a:t>
+                        <a:t>93 (34.7%)</a:t>
                       </a:r>
                     </a:p>
                   </a:txBody>
@@ -5675,7 +5716,7 @@
                       <a:prstDash val="solid"/>
                     </a:lnB>
                     <a:solidFill>
-                      <a:srgbClr val="FFBD69">
+                      <a:srgbClr val="FF7D29">
                         <a:alpha val="100000"/>
                       </a:srgbClr>
                     </a:solidFill>
@@ -5710,7 +5751,7 @@
                           <a:ea typeface="arial"/>
                           <a:sym typeface="arial"/>
                         </a:rPr>
-                        <a:t>92 (34.3%)</a:t>
+                        <a:t>145 (36.2%)</a:t>
                       </a:r>
                     </a:p>
                   </a:txBody>
@@ -5732,7 +5773,7 @@
                       <a:prstDash val="solid"/>
                     </a:lnB>
                     <a:solidFill>
-                      <a:srgbClr val="FFBD69">
+                      <a:srgbClr val="FF7D29">
                         <a:alpha val="100000"/>
                       </a:srgbClr>
                     </a:solidFill>
@@ -5769,7 +5810,7 @@
                           <a:ea typeface="arial"/>
                           <a:sym typeface="arial"/>
                         </a:rPr>
-                        <a:t>dcd D.1.1.4.2</a:t>
+                        <a:t>cl D.1</a:t>
                       </a:r>
                     </a:p>
                   </a:txBody>
@@ -5791,7 +5832,7 @@
                       <a:prstDash val="solid"/>
                     </a:lnB>
                     <a:solidFill>
-                      <a:srgbClr val="FF7D29">
+                      <a:srgbClr val="FFBD69">
                         <a:alpha val="100000"/>
                       </a:srgbClr>
                     </a:solidFill>
@@ -5826,7 +5867,7 @@
                           <a:ea typeface="arial"/>
                           <a:sym typeface="arial"/>
                         </a:rPr>
-                        <a:t>48 (35.8%)</a:t>
+                        <a:t>79 (59.0%)</a:t>
                       </a:r>
                     </a:p>
                   </a:txBody>
@@ -5848,7 +5889,7 @@
                       <a:prstDash val="solid"/>
                     </a:lnB>
                     <a:solidFill>
-                      <a:srgbClr val="FF7D29">
+                      <a:srgbClr val="FFBD69">
                         <a:alpha val="100000"/>
                       </a:srgbClr>
                     </a:solidFill>
@@ -5883,7 +5924,7 @@
                           <a:ea typeface="arial"/>
                           <a:sym typeface="arial"/>
                         </a:rPr>
-                        <a:t>42 (31.3%)</a:t>
+                        <a:t>67 (50.0%)</a:t>
                       </a:r>
                     </a:p>
                   </a:txBody>
@@ -5905,7 +5946,7 @@
                       <a:prstDash val="solid"/>
                     </a:lnB>
                     <a:solidFill>
-                      <a:srgbClr val="FF7D29">
+                      <a:srgbClr val="FFBD69">
                         <a:alpha val="100000"/>
                       </a:srgbClr>
                     </a:solidFill>
@@ -5940,7 +5981,123 @@
                           <a:ea typeface="arial"/>
                           <a:sym typeface="arial"/>
                         </a:rPr>
-                        <a:t>90 (33.6%)</a:t>
+                        <a:t>146 (54.5%)</a:t>
+                      </a:r>
+                    </a:p>
+                  </a:txBody>
+                  <a:tcPr anchor="ctr" marB="38100" marT="38100" marR="0" marL="0">
+                    <a:lnL algn="ctr" cmpd="sng" cap="flat" w="0">
+                      <a:noFill/>
+                      <a:prstDash val="solid"/>
+                    </a:lnL>
+                    <a:lnR algn="ctr" cmpd="sng" cap="flat" w="0">
+                      <a:noFill/>
+                      <a:prstDash val="solid"/>
+                    </a:lnR>
+                    <a:lnT algn="ctr" cmpd="sng" cap="flat" w="0">
+                      <a:noFill/>
+                      <a:prstDash val="solid"/>
+                    </a:lnT>
+                    <a:lnB algn="ctr" cmpd="sng" cap="flat" w="0">
+                      <a:noFill/>
+                      <a:prstDash val="solid"/>
+                    </a:lnB>
+                    <a:solidFill>
+                      <a:srgbClr val="FFBD69">
+                        <a:alpha val="100000"/>
+                      </a:srgbClr>
+                    </a:solidFill>
+                  </a:tcPr>
+                </a:tc>
+                <a:tc>
+                  <a:txBody>
+                    <a:bodyPr/>
+                    <a:lstStyle/>
+                    <a:p>
+                      <a:pPr algn="ctr" marL="63500" marR="63500">
+                        <a:lnSpc>
+                          <a:spcPct val="100000"/>
+                        </a:lnSpc>
+                        <a:spcBef>
+                          <a:spcPts val="300"/>
+                        </a:spcBef>
+                        <a:spcAft>
+                          <a:spcPts val="300"/>
+                        </a:spcAft>
+                        <a:buNone/>
+                      </a:pPr>
+                      <a:r>
+                        <a:rPr cap="none" sz="1200" i="0" b="0" u="none">
+                          <a:solidFill>
+                            <a:srgbClr val="000000">
+                              <a:alpha val="100000"/>
+                            </a:srgbClr>
+                          </a:solidFill>
+                          <a:latin typeface="arial"/>
+                          <a:cs typeface="arial"/>
+                          <a:ea typeface="arial"/>
+                          <a:sym typeface="arial"/>
+                        </a:rPr>
+                        <a:t>226 (56.5%)</a:t>
+                      </a:r>
+                    </a:p>
+                  </a:txBody>
+                  <a:tcPr anchor="ctr" marB="38100" marT="38100" marR="0" marL="0">
+                    <a:lnL algn="ctr" cmpd="sng" cap="flat" w="0">
+                      <a:noFill/>
+                      <a:prstDash val="solid"/>
+                    </a:lnL>
+                    <a:lnR algn="ctr" cmpd="sng" cap="flat" w="0">
+                      <a:noFill/>
+                      <a:prstDash val="solid"/>
+                    </a:lnR>
+                    <a:lnT algn="ctr" cmpd="sng" cap="flat" w="0">
+                      <a:noFill/>
+                      <a:prstDash val="solid"/>
+                    </a:lnT>
+                    <a:lnB algn="ctr" cmpd="sng" cap="flat" w="0">
+                      <a:noFill/>
+                      <a:prstDash val="solid"/>
+                    </a:lnB>
+                    <a:solidFill>
+                      <a:srgbClr val="FFBD69">
+                        <a:alpha val="100000"/>
+                      </a:srgbClr>
+                    </a:solidFill>
+                  </a:tcPr>
+                </a:tc>
+              </a:tr>
+              <a:tr h="243582">
+                <a:tc>
+                  <a:txBody>
+                    <a:bodyPr/>
+                    <a:lstStyle/>
+                    <a:p>
+                      <a:pPr algn="l" marL="127000" marR="63500">
+                        <a:lnSpc>
+                          <a:spcPct val="100000"/>
+                        </a:lnSpc>
+                        <a:spcBef>
+                          <a:spcPts val="300"/>
+                        </a:spcBef>
+                        <a:spcAft>
+                          <a:spcPts val="300"/>
+                        </a:spcAft>
+                        <a:buNone/>
+                      </a:pPr>
+                      <a:r>
+                        <a:rPr cap="none" sz="1200" i="0" b="0" u="none">
+                          <a:solidFill>
+                            <a:srgbClr val="000000">
+                              <a:alpha val="100000"/>
+                            </a:srgbClr>
+                          </a:solidFill>
+                          <a:latin typeface="arial"/>
+                          <a:cs typeface="arial"/>
+                          <a:ea typeface="arial"/>
+                          <a:sym typeface="arial"/>
+                        </a:rPr>
+                        <a:t>dcd D.1.1.1.1</a:t>
                       </a:r>
                     </a:p>
                   </a:txBody>
@@ -5968,9 +6125,524 @@
                     </a:solidFill>
                   </a:tcPr>
                 </a:tc>
+                <a:tc>
+                  <a:txBody>
+                    <a:bodyPr/>
+                    <a:lstStyle/>
+                    <a:p>
+                      <a:pPr algn="ctr" marL="63500" marR="63500">
+                        <a:lnSpc>
+                          <a:spcPct val="100000"/>
+                        </a:lnSpc>
+                        <a:spcBef>
+                          <a:spcPts val="300"/>
+                        </a:spcBef>
+                        <a:spcAft>
+                          <a:spcPts val="300"/>
+                        </a:spcAft>
+                        <a:buNone/>
+                      </a:pPr>
+                      <a:r>
+                        <a:rPr cap="none" sz="1200" i="0" b="0" u="none">
+                          <a:solidFill>
+                            <a:srgbClr val="000000">
+                              <a:alpha val="100000"/>
+                            </a:srgbClr>
+                          </a:solidFill>
+                          <a:latin typeface="arial"/>
+                          <a:cs typeface="arial"/>
+                          <a:ea typeface="arial"/>
+                          <a:sym typeface="arial"/>
+                        </a:rPr>
+                        <a:t>50 (37.3%)</a:t>
+                      </a:r>
+                    </a:p>
+                  </a:txBody>
+                  <a:tcPr anchor="ctr" marB="38100" marT="38100" marR="0" marL="0">
+                    <a:lnL algn="ctr" cmpd="sng" cap="flat" w="0">
+                      <a:noFill/>
+                      <a:prstDash val="solid"/>
+                    </a:lnL>
+                    <a:lnR algn="ctr" cmpd="sng" cap="flat" w="0">
+                      <a:noFill/>
+                      <a:prstDash val="solid"/>
+                    </a:lnR>
+                    <a:lnT algn="ctr" cmpd="sng" cap="flat" w="0">
+                      <a:noFill/>
+                      <a:prstDash val="solid"/>
+                    </a:lnT>
+                    <a:lnB algn="ctr" cmpd="sng" cap="flat" w="0">
+                      <a:noFill/>
+                      <a:prstDash val="solid"/>
+                    </a:lnB>
+                    <a:solidFill>
+                      <a:srgbClr val="FF7D29">
+                        <a:alpha val="100000"/>
+                      </a:srgbClr>
+                    </a:solidFill>
+                  </a:tcPr>
+                </a:tc>
+                <a:tc>
+                  <a:txBody>
+                    <a:bodyPr/>
+                    <a:lstStyle/>
+                    <a:p>
+                      <a:pPr algn="ctr" marL="63500" marR="63500">
+                        <a:lnSpc>
+                          <a:spcPct val="100000"/>
+                        </a:lnSpc>
+                        <a:spcBef>
+                          <a:spcPts val="300"/>
+                        </a:spcBef>
+                        <a:spcAft>
+                          <a:spcPts val="300"/>
+                        </a:spcAft>
+                        <a:buNone/>
+                      </a:pPr>
+                      <a:r>
+                        <a:rPr cap="none" sz="1200" i="0" b="0" u="none">
+                          <a:solidFill>
+                            <a:srgbClr val="000000">
+                              <a:alpha val="100000"/>
+                            </a:srgbClr>
+                          </a:solidFill>
+                          <a:latin typeface="arial"/>
+                          <a:cs typeface="arial"/>
+                          <a:ea typeface="arial"/>
+                          <a:sym typeface="arial"/>
+                        </a:rPr>
+                        <a:t>42 (31.3%)</a:t>
+                      </a:r>
+                    </a:p>
+                  </a:txBody>
+                  <a:tcPr anchor="ctr" marB="38100" marT="38100" marR="0" marL="0">
+                    <a:lnL algn="ctr" cmpd="sng" cap="flat" w="0">
+                      <a:noFill/>
+                      <a:prstDash val="solid"/>
+                    </a:lnL>
+                    <a:lnR algn="ctr" cmpd="sng" cap="flat" w="0">
+                      <a:noFill/>
+                      <a:prstDash val="solid"/>
+                    </a:lnR>
+                    <a:lnT algn="ctr" cmpd="sng" cap="flat" w="0">
+                      <a:noFill/>
+                      <a:prstDash val="solid"/>
+                    </a:lnT>
+                    <a:lnB algn="ctr" cmpd="sng" cap="flat" w="0">
+                      <a:noFill/>
+                      <a:prstDash val="solid"/>
+                    </a:lnB>
+                    <a:solidFill>
+                      <a:srgbClr val="FF7D29">
+                        <a:alpha val="100000"/>
+                      </a:srgbClr>
+                    </a:solidFill>
+                  </a:tcPr>
+                </a:tc>
+                <a:tc>
+                  <a:txBody>
+                    <a:bodyPr/>
+                    <a:lstStyle/>
+                    <a:p>
+                      <a:pPr algn="ctr" marL="63500" marR="63500">
+                        <a:lnSpc>
+                          <a:spcPct val="100000"/>
+                        </a:lnSpc>
+                        <a:spcBef>
+                          <a:spcPts val="300"/>
+                        </a:spcBef>
+                        <a:spcAft>
+                          <a:spcPts val="300"/>
+                        </a:spcAft>
+                        <a:buNone/>
+                      </a:pPr>
+                      <a:r>
+                        <a:rPr cap="none" sz="1200" i="0" b="0" u="none">
+                          <a:solidFill>
+                            <a:srgbClr val="000000">
+                              <a:alpha val="100000"/>
+                            </a:srgbClr>
+                          </a:solidFill>
+                          <a:latin typeface="arial"/>
+                          <a:cs typeface="arial"/>
+                          <a:ea typeface="arial"/>
+                          <a:sym typeface="arial"/>
+                        </a:rPr>
+                        <a:t>92 (34.3%)</a:t>
+                      </a:r>
+                    </a:p>
+                  </a:txBody>
+                  <a:tcPr anchor="ctr" marB="38100" marT="38100" marR="0" marL="0">
+                    <a:lnL algn="ctr" cmpd="sng" cap="flat" w="0">
+                      <a:noFill/>
+                      <a:prstDash val="solid"/>
+                    </a:lnL>
+                    <a:lnR algn="ctr" cmpd="sng" cap="flat" w="0">
+                      <a:noFill/>
+                      <a:prstDash val="solid"/>
+                    </a:lnR>
+                    <a:lnT algn="ctr" cmpd="sng" cap="flat" w="0">
+                      <a:noFill/>
+                      <a:prstDash val="solid"/>
+                    </a:lnT>
+                    <a:lnB algn="ctr" cmpd="sng" cap="flat" w="0">
+                      <a:noFill/>
+                      <a:prstDash val="solid"/>
+                    </a:lnB>
+                    <a:solidFill>
+                      <a:srgbClr val="FF7D29">
+                        <a:alpha val="100000"/>
+                      </a:srgbClr>
+                    </a:solidFill>
+                  </a:tcPr>
+                </a:tc>
+                <a:tc>
+                  <a:txBody>
+                    <a:bodyPr/>
+                    <a:lstStyle/>
+                    <a:p>
+                      <a:pPr algn="ctr" marL="63500" marR="63500">
+                        <a:lnSpc>
+                          <a:spcPct val="100000"/>
+                        </a:lnSpc>
+                        <a:spcBef>
+                          <a:spcPts val="300"/>
+                        </a:spcBef>
+                        <a:spcAft>
+                          <a:spcPts val="300"/>
+                        </a:spcAft>
+                        <a:buNone/>
+                      </a:pPr>
+                      <a:r>
+                        <a:rPr cap="none" sz="1200" i="0" b="0" u="none">
+                          <a:solidFill>
+                            <a:srgbClr val="000000">
+                              <a:alpha val="100000"/>
+                            </a:srgbClr>
+                          </a:solidFill>
+                          <a:latin typeface="arial"/>
+                          <a:cs typeface="arial"/>
+                          <a:ea typeface="arial"/>
+                          <a:sym typeface="arial"/>
+                        </a:rPr>
+                        <a:t>143 (35.8%)</a:t>
+                      </a:r>
+                    </a:p>
+                  </a:txBody>
+                  <a:tcPr anchor="ctr" marB="38100" marT="38100" marR="0" marL="0">
+                    <a:lnL algn="ctr" cmpd="sng" cap="flat" w="0">
+                      <a:noFill/>
+                      <a:prstDash val="solid"/>
+                    </a:lnL>
+                    <a:lnR algn="ctr" cmpd="sng" cap="flat" w="0">
+                      <a:noFill/>
+                      <a:prstDash val="solid"/>
+                    </a:lnR>
+                    <a:lnT algn="ctr" cmpd="sng" cap="flat" w="0">
+                      <a:noFill/>
+                      <a:prstDash val="solid"/>
+                    </a:lnT>
+                    <a:lnB algn="ctr" cmpd="sng" cap="flat" w="0">
+                      <a:noFill/>
+                      <a:prstDash val="solid"/>
+                    </a:lnB>
+                    <a:solidFill>
+                      <a:srgbClr val="FF7D29">
+                        <a:alpha val="100000"/>
+                      </a:srgbClr>
+                    </a:solidFill>
+                  </a:tcPr>
+                </a:tc>
+              </a:tr>
+              <a:tr h="243582">
+                <a:tc>
+                  <a:txBody>
+                    <a:bodyPr/>
+                    <a:lstStyle/>
+                    <a:p>
+                      <a:pPr algn="ctr" marL="63500" marR="63500">
+                        <a:lnSpc>
+                          <a:spcPct val="100000"/>
+                        </a:lnSpc>
+                        <a:spcBef>
+                          <a:spcPts val="300"/>
+                        </a:spcBef>
+                        <a:spcAft>
+                          <a:spcPts val="300"/>
+                        </a:spcAft>
+                        <a:buNone/>
+                      </a:pPr>
+                      <a:r>
+                        <a:rPr cap="none" sz="1200" i="0" b="0" u="none">
+                          <a:solidFill>
+                            <a:srgbClr val="000000">
+                              <a:alpha val="100000"/>
+                            </a:srgbClr>
+                          </a:solidFill>
+                          <a:latin typeface="arial"/>
+                          <a:cs typeface="arial"/>
+                          <a:ea typeface="arial"/>
+                          <a:sym typeface="arial"/>
+                        </a:rPr>
+                        <a:t>dcd D.1.1.4.2</a:t>
+                      </a:r>
+                    </a:p>
+                  </a:txBody>
+                  <a:tcPr anchor="ctr" marB="38100" marT="38100" marR="0" marL="0">
+                    <a:lnL algn="ctr" cmpd="sng" cap="flat" w="0">
+                      <a:noFill/>
+                      <a:prstDash val="solid"/>
+                    </a:lnL>
+                    <a:lnR algn="ctr" cmpd="sng" cap="flat" w="0">
+                      <a:noFill/>
+                      <a:prstDash val="solid"/>
+                    </a:lnR>
+                    <a:lnT algn="ctr" cmpd="sng" cap="flat" w="0">
+                      <a:noFill/>
+                      <a:prstDash val="solid"/>
+                    </a:lnT>
+                    <a:lnB algn="ctr" cmpd="sng" cap="flat" w="0">
+                      <a:noFill/>
+                      <a:prstDash val="solid"/>
+                    </a:lnB>
+                    <a:solidFill>
+                      <a:srgbClr val="FFBD69">
+                        <a:alpha val="100000"/>
+                      </a:srgbClr>
+                    </a:solidFill>
+                  </a:tcPr>
+                </a:tc>
+                <a:tc>
+                  <a:txBody>
+                    <a:bodyPr/>
+                    <a:lstStyle/>
+                    <a:p>
+                      <a:pPr algn="ctr" marL="63500" marR="63500">
+                        <a:lnSpc>
+                          <a:spcPct val="100000"/>
+                        </a:lnSpc>
+                        <a:spcBef>
+                          <a:spcPts val="300"/>
+                        </a:spcBef>
+                        <a:spcAft>
+                          <a:spcPts val="300"/>
+                        </a:spcAft>
+                        <a:buNone/>
+                      </a:pPr>
+                      <a:r>
+                        <a:rPr cap="none" sz="1200" i="0" b="0" u="none">
+                          <a:solidFill>
+                            <a:srgbClr val="000000">
+                              <a:alpha val="100000"/>
+                            </a:srgbClr>
+                          </a:solidFill>
+                          <a:latin typeface="arial"/>
+                          <a:cs typeface="arial"/>
+                          <a:ea typeface="arial"/>
+                          <a:sym typeface="arial"/>
+                        </a:rPr>
+                        <a:t>48 (35.8%)</a:t>
+                      </a:r>
+                    </a:p>
+                  </a:txBody>
+                  <a:tcPr anchor="ctr" marB="38100" marT="38100" marR="0" marL="0">
+                    <a:lnL algn="ctr" cmpd="sng" cap="flat" w="0">
+                      <a:noFill/>
+                      <a:prstDash val="solid"/>
+                    </a:lnL>
+                    <a:lnR algn="ctr" cmpd="sng" cap="flat" w="0">
+                      <a:noFill/>
+                      <a:prstDash val="solid"/>
+                    </a:lnR>
+                    <a:lnT algn="ctr" cmpd="sng" cap="flat" w="0">
+                      <a:noFill/>
+                      <a:prstDash val="solid"/>
+                    </a:lnT>
+                    <a:lnB algn="ctr" cmpd="sng" cap="flat" w="0">
+                      <a:noFill/>
+                      <a:prstDash val="solid"/>
+                    </a:lnB>
+                    <a:solidFill>
+                      <a:srgbClr val="FFBD69">
+                        <a:alpha val="100000"/>
+                      </a:srgbClr>
+                    </a:solidFill>
+                  </a:tcPr>
+                </a:tc>
+                <a:tc>
+                  <a:txBody>
+                    <a:bodyPr/>
+                    <a:lstStyle/>
+                    <a:p>
+                      <a:pPr algn="ctr" marL="63500" marR="63500">
+                        <a:lnSpc>
+                          <a:spcPct val="100000"/>
+                        </a:lnSpc>
+                        <a:spcBef>
+                          <a:spcPts val="300"/>
+                        </a:spcBef>
+                        <a:spcAft>
+                          <a:spcPts val="300"/>
+                        </a:spcAft>
+                        <a:buNone/>
+                      </a:pPr>
+                      <a:r>
+                        <a:rPr cap="none" sz="1200" i="0" b="0" u="none">
+                          <a:solidFill>
+                            <a:srgbClr val="000000">
+                              <a:alpha val="100000"/>
+                            </a:srgbClr>
+                          </a:solidFill>
+                          <a:latin typeface="arial"/>
+                          <a:cs typeface="arial"/>
+                          <a:ea typeface="arial"/>
+                          <a:sym typeface="arial"/>
+                        </a:rPr>
+                        <a:t>42 (31.3%)</a:t>
+                      </a:r>
+                    </a:p>
+                  </a:txBody>
+                  <a:tcPr anchor="ctr" marB="38100" marT="38100" marR="0" marL="0">
+                    <a:lnL algn="ctr" cmpd="sng" cap="flat" w="0">
+                      <a:noFill/>
+                      <a:prstDash val="solid"/>
+                    </a:lnL>
+                    <a:lnR algn="ctr" cmpd="sng" cap="flat" w="0">
+                      <a:noFill/>
+                      <a:prstDash val="solid"/>
+                    </a:lnR>
+                    <a:lnT algn="ctr" cmpd="sng" cap="flat" w="0">
+                      <a:noFill/>
+                      <a:prstDash val="solid"/>
+                    </a:lnT>
+                    <a:lnB algn="ctr" cmpd="sng" cap="flat" w="0">
+                      <a:noFill/>
+                      <a:prstDash val="solid"/>
+                    </a:lnB>
+                    <a:solidFill>
+                      <a:srgbClr val="FFBD69">
+                        <a:alpha val="100000"/>
+                      </a:srgbClr>
+                    </a:solidFill>
+                  </a:tcPr>
+                </a:tc>
+                <a:tc>
+                  <a:txBody>
+                    <a:bodyPr/>
+                    <a:lstStyle/>
+                    <a:p>
+                      <a:pPr algn="ctr" marL="63500" marR="63500">
+                        <a:lnSpc>
+                          <a:spcPct val="100000"/>
+                        </a:lnSpc>
+                        <a:spcBef>
+                          <a:spcPts val="300"/>
+                        </a:spcBef>
+                        <a:spcAft>
+                          <a:spcPts val="300"/>
+                        </a:spcAft>
+                        <a:buNone/>
+                      </a:pPr>
+                      <a:r>
+                        <a:rPr cap="none" sz="1200" i="0" b="0" u="none">
+                          <a:solidFill>
+                            <a:srgbClr val="000000">
+                              <a:alpha val="100000"/>
+                            </a:srgbClr>
+                          </a:solidFill>
+                          <a:latin typeface="arial"/>
+                          <a:cs typeface="arial"/>
+                          <a:ea typeface="arial"/>
+                          <a:sym typeface="arial"/>
+                        </a:rPr>
+                        <a:t>90 (33.6%)</a:t>
+                      </a:r>
+                    </a:p>
+                  </a:txBody>
+                  <a:tcPr anchor="ctr" marB="38100" marT="38100" marR="0" marL="0">
+                    <a:lnL algn="ctr" cmpd="sng" cap="flat" w="0">
+                      <a:noFill/>
+                      <a:prstDash val="solid"/>
+                    </a:lnL>
+                    <a:lnR algn="ctr" cmpd="sng" cap="flat" w="0">
+                      <a:noFill/>
+                      <a:prstDash val="solid"/>
+                    </a:lnR>
+                    <a:lnT algn="ctr" cmpd="sng" cap="flat" w="0">
+                      <a:noFill/>
+                      <a:prstDash val="solid"/>
+                    </a:lnT>
+                    <a:lnB algn="ctr" cmpd="sng" cap="flat" w="0">
+                      <a:noFill/>
+                      <a:prstDash val="solid"/>
+                    </a:lnB>
+                    <a:solidFill>
+                      <a:srgbClr val="FFBD69">
+                        <a:alpha val="100000"/>
+                      </a:srgbClr>
+                    </a:solidFill>
+                  </a:tcPr>
+                </a:tc>
+                <a:tc>
+                  <a:txBody>
+                    <a:bodyPr/>
+                    <a:lstStyle/>
+                    <a:p>
+                      <a:pPr algn="ctr" marL="63500" marR="63500">
+                        <a:lnSpc>
+                          <a:spcPct val="100000"/>
+                        </a:lnSpc>
+                        <a:spcBef>
+                          <a:spcPts val="300"/>
+                        </a:spcBef>
+                        <a:spcAft>
+                          <a:spcPts val="300"/>
+                        </a:spcAft>
+                        <a:buNone/>
+                      </a:pPr>
+                      <a:r>
+                        <a:rPr cap="none" sz="1200" i="0" b="0" u="none">
+                          <a:solidFill>
+                            <a:srgbClr val="000000">
+                              <a:alpha val="100000"/>
+                            </a:srgbClr>
+                          </a:solidFill>
+                          <a:latin typeface="arial"/>
+                          <a:cs typeface="arial"/>
+                          <a:ea typeface="arial"/>
+                          <a:sym typeface="arial"/>
+                        </a:rPr>
+                        <a:t>140 (35.0%)</a:t>
+                      </a:r>
+                    </a:p>
+                  </a:txBody>
+                  <a:tcPr anchor="ctr" marB="38100" marT="38100" marR="0" marL="0">
+                    <a:lnL algn="ctr" cmpd="sng" cap="flat" w="0">
+                      <a:noFill/>
+                      <a:prstDash val="solid"/>
+                    </a:lnL>
+                    <a:lnR algn="ctr" cmpd="sng" cap="flat" w="0">
+                      <a:noFill/>
+                      <a:prstDash val="solid"/>
+                    </a:lnR>
+                    <a:lnT algn="ctr" cmpd="sng" cap="flat" w="0">
+                      <a:noFill/>
+                      <a:prstDash val="solid"/>
+                    </a:lnT>
+                    <a:lnB algn="ctr" cmpd="sng" cap="flat" w="0">
+                      <a:noFill/>
+                      <a:prstDash val="solid"/>
+                    </a:lnB>
+                    <a:solidFill>
+                      <a:srgbClr val="FFBD69">
+                        <a:alpha val="100000"/>
+                      </a:srgbClr>
+                    </a:solidFill>
+                  </a:tcPr>
+                </a:tc>
               </a:tr>
               <a:tr h="228600">
-                <a:tc gridSpan="4">
+                <a:tc gridSpan="5">
                   <a:txBody>
                     <a:bodyPr/>
                     <a:lstStyle/>
@@ -6042,6 +6714,74 @@
                           <a:sym typeface="DejaVu Sans"/>
                         </a:rPr>
                         <a:t>; </a:t>
+                      </a:r>
+                    </a:p>
+                  </a:txBody>
+                  <a:tcPr anchor="ctr" marB="63500" marT="63500" marR="0" marL="0">
+                    <a:lnL algn="ctr" cmpd="sng" cap="flat" w="0">
+                      <a:noFill/>
+                      <a:prstDash val="solid"/>
+                    </a:lnL>
+                    <a:lnR algn="ctr" cmpd="sng" cap="flat" w="0">
+                      <a:noFill/>
+                      <a:prstDash val="solid"/>
+                    </a:lnR>
+                    <a:lnT algn="ctr" cmpd="sng" cap="flat" w="0">
+                      <a:noFill/>
+                      <a:prstDash val="solid"/>
+                    </a:lnT>
+                    <a:lnB algn="ctr" cmpd="sng" cap="flat" w="0">
+                      <a:noFill/>
+                      <a:prstDash val="solid"/>
+                    </a:lnB>
+                    <a:solidFill>
+                      <a:srgbClr val="FFFFFF">
+                        <a:alpha val="0"/>
+                      </a:srgbClr>
+                    </a:solidFill>
+                  </a:tcPr>
+                </a:tc>
+                <a:tc hMerge="true">
+                  <a:txBody>
+                    <a:bodyPr/>
+                    <a:lstStyle/>
+                    <a:p>
+                      <a:pPr algn="l" marL="63500" marR="63500">
+                        <a:lnSpc>
+                          <a:spcPct val="100000"/>
+                        </a:lnSpc>
+                        <a:spcBef>
+                          <a:spcPts val="500"/>
+                        </a:spcBef>
+                        <a:spcAft>
+                          <a:spcPts val="500"/>
+                        </a:spcAft>
+                        <a:buNone/>
+                      </a:pPr>
+                      <a:endParaRPr cap="none" sz="1100" i="0" b="0" u="none">
+                        <a:solidFill>
+                          <a:srgbClr val="000000">
+                            <a:alpha val="100000"/>
+                          </a:srgbClr>
+                        </a:solidFill>
+                        <a:latin typeface="DejaVu Sans"/>
+                        <a:cs typeface="DejaVu Sans"/>
+                        <a:ea typeface="DejaVu Sans"/>
+                        <a:sym typeface="DejaVu Sans"/>
+                      </a:endParaRPr>
+                      <a:r>
+                        <a:rPr cap="none" sz="1100" i="0" b="0" u="none">
+                          <a:solidFill>
+                            <a:srgbClr val="000000">
+                              <a:alpha val="100000"/>
+                            </a:srgbClr>
+                          </a:solidFill>
+                          <a:latin typeface="DejaVu Sans"/>
+                          <a:cs typeface="DejaVu Sans"/>
+                          <a:ea typeface="DejaVu Sans"/>
+                          <a:sym typeface="DejaVu Sans"/>
+                        </a:rPr>
+                        <a:t/>
                       </a:r>
                     </a:p>
                   </a:txBody>
@@ -6361,7 +7101,7 @@
           <p:nvPr/>
         </p:nvGraphicFramePr>
         <p:xfrm rot="0">
-          <a:off x="2862526" y="1165860"/>
+          <a:off x="2608556" y="1165860"/>
           <a:ext cx="3657600" cy="2743200"/>
         </p:xfrm>
         <a:graphic>
@@ -6369,10 +7109,11 @@
             <a:tbl>
               <a:tblPr/>
               <a:tblGrid>
-                <a:gridCol w="2977693"/>
-                <a:gridCol w="1163085"/>
-                <a:gridCol w="1163085"/>
-                <a:gridCol w="1163085"/>
+                <a:gridCol w="2780359"/>
+                <a:gridCol w="1048632"/>
+                <a:gridCol w="1048632"/>
+                <a:gridCol w="1048632"/>
+                <a:gridCol w="1048632"/>
               </a:tblGrid>
               <a:tr h="268114">
                 <a:tc>
@@ -6463,6 +7204,17 @@
                         </a:spcAft>
                         <a:buNone/>
                       </a:pPr>
+                      <a:endParaRPr cap="none" sz="1400" i="0" b="1" u="none">
+                        <a:solidFill>
+                          <a:srgbClr val="FFFFFF">
+                            <a:alpha val="100000"/>
+                          </a:srgbClr>
+                        </a:solidFill>
+                        <a:latin typeface="arial"/>
+                        <a:cs typeface="arial"/>
+                        <a:ea typeface="arial"/>
+                        <a:sym typeface="arial"/>
+                      </a:endParaRPr>
                       <a:r>
                         <a:rPr cap="none" sz="1400" i="0" b="1" u="none">
                           <a:solidFill>
@@ -6475,7 +7227,7 @@
                           <a:ea typeface="arial"/>
                           <a:sym typeface="arial"/>
                         </a:rPr>
-                        <a:t>A: Drug X</a:t>
+                        <a:t/>
                       </a:r>
                     </a:p>
                   </a:txBody>
@@ -6520,6 +7272,17 @@
                         </a:spcAft>
                         <a:buNone/>
                       </a:pPr>
+                      <a:endParaRPr cap="none" sz="1400" i="0" b="1" u="none">
+                        <a:solidFill>
+                          <a:srgbClr val="FFFFFF">
+                            <a:alpha val="100000"/>
+                          </a:srgbClr>
+                        </a:solidFill>
+                        <a:latin typeface="arial"/>
+                        <a:cs typeface="arial"/>
+                        <a:ea typeface="arial"/>
+                        <a:sym typeface="arial"/>
+                      </a:endParaRPr>
                       <a:r>
                         <a:rPr cap="none" sz="1400" i="0" b="1" u="none">
                           <a:solidFill>
@@ -6532,7 +7295,7 @@
                           <a:ea typeface="arial"/>
                           <a:sym typeface="arial"/>
                         </a:rPr>
-                        <a:t>B: Placebo</a:t>
+                        <a:t/>
                       </a:r>
                     </a:p>
                   </a:txBody>
@@ -6577,6 +7340,17 @@
                         </a:spcAft>
                         <a:buNone/>
                       </a:pPr>
+                      <a:endParaRPr cap="none" sz="1400" i="0" b="1" u="none">
+                        <a:solidFill>
+                          <a:srgbClr val="FFFFFF">
+                            <a:alpha val="100000"/>
+                          </a:srgbClr>
+                        </a:solidFill>
+                        <a:latin typeface="arial"/>
+                        <a:cs typeface="arial"/>
+                        <a:ea typeface="arial"/>
+                        <a:sym typeface="arial"/>
+                      </a:endParaRPr>
                       <a:r>
                         <a:rPr cap="none" sz="1400" i="0" b="1" u="none">
                           <a:solidFill>
@@ -6589,7 +7363,7 @@
                           <a:ea typeface="arial"/>
                           <a:sym typeface="arial"/>
                         </a:rPr>
-                        <a:t>All Patients</a:t>
+                        <a:t/>
                       </a:r>
                     </a:p>
                   </a:txBody>
@@ -6617,8 +7391,6 @@
                     </a:solidFill>
                   </a:tcPr>
                 </a:tc>
-              </a:tr>
-              <a:tr h="267333">
                 <a:tc>
                   <a:txBody>
                     <a:bodyPr/>
@@ -6636,6 +7408,17 @@
                         </a:spcAft>
                         <a:buNone/>
                       </a:pPr>
+                      <a:endParaRPr cap="none" sz="1400" i="0" b="1" u="none">
+                        <a:solidFill>
+                          <a:srgbClr val="FFFFFF">
+                            <a:alpha val="100000"/>
+                          </a:srgbClr>
+                        </a:solidFill>
+                        <a:latin typeface="arial"/>
+                        <a:cs typeface="arial"/>
+                        <a:ea typeface="arial"/>
+                        <a:sym typeface="arial"/>
+                      </a:endParaRPr>
                       <a:r>
                         <a:rPr cap="none" sz="1400" i="0" b="1" u="none">
                           <a:solidFill>
@@ -6648,7 +7431,7 @@
                           <a:ea typeface="arial"/>
                           <a:sym typeface="arial"/>
                         </a:rPr>
-                        <a:t>   MedDRA Preferred Term N (%)</a:t>
+                        <a:t/>
                       </a:r>
                     </a:p>
                   </a:txBody>
@@ -6676,27 +7459,29 @@
                     </a:solidFill>
                   </a:tcPr>
                 </a:tc>
+              </a:tr>
+              <a:tr h="243582">
                 <a:tc>
                   <a:txBody>
                     <a:bodyPr/>
                     <a:lstStyle/>
                     <a:p>
-                      <a:pPr algn="ctr" marL="63500" marR="63500">
-                        <a:lnSpc>
-                          <a:spcPct val="100000"/>
-                        </a:lnSpc>
-                        <a:spcBef>
-                          <a:spcPts val="300"/>
-                        </a:spcBef>
-                        <a:spcAft>
-                          <a:spcPts val="300"/>
-                        </a:spcAft>
-                        <a:buNone/>
-                      </a:pPr>
-                      <a:r>
-                        <a:rPr cap="none" sz="1400" i="0" b="1" u="none">
-                          <a:solidFill>
-                            <a:srgbClr val="FFFFFF">
+                      <a:pPr algn="l" marL="127000" marR="63500">
+                        <a:lnSpc>
+                          <a:spcPct val="100000"/>
+                        </a:lnSpc>
+                        <a:spcBef>
+                          <a:spcPts val="300"/>
+                        </a:spcBef>
+                        <a:spcAft>
+                          <a:spcPts val="300"/>
+                        </a:spcAft>
+                        <a:buNone/>
+                      </a:pPr>
+                      <a:r>
+                        <a:rPr cap="none" sz="1200" i="0" b="0" u="none">
+                          <a:solidFill>
+                            <a:srgbClr val="000000">
                               <a:alpha val="100000"/>
                             </a:srgbClr>
                           </a:solidFill>
@@ -6705,7 +7490,7 @@
                           <a:ea typeface="arial"/>
                           <a:sym typeface="arial"/>
                         </a:rPr>
-                        <a:t>(N=134)</a:t>
+                        <a:t>   MedDRA Preferred Term N (%)</a:t>
                       </a:r>
                     </a:p>
                   </a:txBody>
@@ -6727,7 +7512,7 @@
                       <a:prstDash val="solid"/>
                     </a:lnB>
                     <a:solidFill>
-                      <a:srgbClr val="ED4A0D">
+                      <a:srgbClr val="FF7D29">
                         <a:alpha val="100000"/>
                       </a:srgbClr>
                     </a:solidFill>
@@ -6751,9 +7536,9 @@
                         <a:buNone/>
                       </a:pPr>
                       <a:r>
-                        <a:rPr cap="none" sz="1400" i="0" b="1" u="none">
-                          <a:solidFill>
-                            <a:srgbClr val="FFFFFF">
+                        <a:rPr cap="none" sz="1200" i="0" b="0" u="none">
+                          <a:solidFill>
+                            <a:srgbClr val="000000">
                               <a:alpha val="100000"/>
                             </a:srgbClr>
                           </a:solidFill>
@@ -6762,7 +7547,7 @@
                           <a:ea typeface="arial"/>
                           <a:sym typeface="arial"/>
                         </a:rPr>
-                        <a:t>(N=134)</a:t>
+                        <a:t>A: Drug X</a:t>
                       </a:r>
                     </a:p>
                   </a:txBody>
@@ -6784,7 +7569,7 @@
                       <a:prstDash val="solid"/>
                     </a:lnB>
                     <a:solidFill>
-                      <a:srgbClr val="ED4A0D">
+                      <a:srgbClr val="FF7D29">
                         <a:alpha val="100000"/>
                       </a:srgbClr>
                     </a:solidFill>
@@ -6808,9 +7593,9 @@
                         <a:buNone/>
                       </a:pPr>
                       <a:r>
-                        <a:rPr cap="none" sz="1400" i="0" b="1" u="none">
-                          <a:solidFill>
-                            <a:srgbClr val="FFFFFF">
+                        <a:rPr cap="none" sz="1200" i="0" b="0" u="none">
+                          <a:solidFill>
+                            <a:srgbClr val="000000">
                               <a:alpha val="100000"/>
                             </a:srgbClr>
                           </a:solidFill>
@@ -6819,7 +7604,7 @@
                           <a:ea typeface="arial"/>
                           <a:sym typeface="arial"/>
                         </a:rPr>
-                        <a:t>(N=268)</a:t>
+                        <a:t>B: Placebo</a:t>
                       </a:r>
                     </a:p>
                   </a:txBody>
@@ -6841,20 +7626,18 @@
                       <a:prstDash val="solid"/>
                     </a:lnB>
                     <a:solidFill>
-                      <a:srgbClr val="ED4A0D">
+                      <a:srgbClr val="FF7D29">
                         <a:alpha val="100000"/>
                       </a:srgbClr>
                     </a:solidFill>
                   </a:tcPr>
                 </a:tc>
-              </a:tr>
-              <a:tr h="243582">
                 <a:tc>
                   <a:txBody>
                     <a:bodyPr/>
                     <a:lstStyle/>
                     <a:p>
-                      <a:pPr algn="l" marL="127000" marR="63500">
+                      <a:pPr algn="ctr" marL="63500" marR="63500">
                         <a:lnSpc>
                           <a:spcPct val="100000"/>
                         </a:lnSpc>
@@ -6878,7 +7661,7 @@
                           <a:ea typeface="arial"/>
                           <a:sym typeface="arial"/>
                         </a:rPr>
-                        <a:t>cl D.2</a:t>
+                        <a:t>All Patients</a:t>
                       </a:r>
                     </a:p>
                   </a:txBody>
@@ -6935,7 +7718,7 @@
                           <a:ea typeface="arial"/>
                           <a:sym typeface="arial"/>
                         </a:rPr>
-                        <a:t>47 (35.1%)</a:t>
+                        <a:t>All Patients</a:t>
                       </a:r>
                     </a:p>
                   </a:txBody>
@@ -6963,12 +7746,14 @@
                     </a:solidFill>
                   </a:tcPr>
                 </a:tc>
+              </a:tr>
+              <a:tr h="243582">
                 <a:tc>
                   <a:txBody>
                     <a:bodyPr/>
                     <a:lstStyle/>
                     <a:p>
-                      <a:pPr algn="ctr" marL="63500" marR="63500">
+                      <a:pPr algn="l" marL="127000" marR="63500">
                         <a:lnSpc>
                           <a:spcPct val="100000"/>
                         </a:lnSpc>
@@ -6992,7 +7777,7 @@
                           <a:ea typeface="arial"/>
                           <a:sym typeface="arial"/>
                         </a:rPr>
-                        <a:t>58 (43.3%)</a:t>
+                        <a:t>cl D.2</a:t>
                       </a:r>
                     </a:p>
                   </a:txBody>
@@ -7014,7 +7799,7 @@
                       <a:prstDash val="solid"/>
                     </a:lnB>
                     <a:solidFill>
-                      <a:srgbClr val="FF7D29">
+                      <a:srgbClr val="FFBD69">
                         <a:alpha val="100000"/>
                       </a:srgbClr>
                     </a:solidFill>
@@ -7049,7 +7834,7 @@
                           <a:ea typeface="arial"/>
                           <a:sym typeface="arial"/>
                         </a:rPr>
-                        <a:t>105 (39.2%)</a:t>
+                        <a:t>47 (35.1%)</a:t>
                       </a:r>
                     </a:p>
                   </a:txBody>
@@ -7071,20 +7856,18 @@
                       <a:prstDash val="solid"/>
                     </a:lnB>
                     <a:solidFill>
-                      <a:srgbClr val="FF7D29">
+                      <a:srgbClr val="FFBD69">
                         <a:alpha val="100000"/>
                       </a:srgbClr>
                     </a:solidFill>
                   </a:tcPr>
                 </a:tc>
-              </a:tr>
-              <a:tr h="243582">
                 <a:tc>
                   <a:txBody>
                     <a:bodyPr/>
                     <a:lstStyle/>
                     <a:p>
-                      <a:pPr algn="l" marL="127000" marR="63500">
+                      <a:pPr algn="ctr" marL="63500" marR="63500">
                         <a:lnSpc>
                           <a:spcPct val="100000"/>
                         </a:lnSpc>
@@ -7108,7 +7891,7 @@
                           <a:ea typeface="arial"/>
                           <a:sym typeface="arial"/>
                         </a:rPr>
-                        <a:t>dcd D.2.1.5.3</a:t>
+                        <a:t>58 (43.3%)</a:t>
                       </a:r>
                     </a:p>
                   </a:txBody>
@@ -7165,7 +7948,7 @@
                           <a:ea typeface="arial"/>
                           <a:sym typeface="arial"/>
                         </a:rPr>
-                        <a:t>47 (35.1%)</a:t>
+                        <a:t>105 (39.2%)</a:t>
                       </a:r>
                     </a:p>
                   </a:txBody>
@@ -7222,7 +8005,7 @@
                           <a:ea typeface="arial"/>
                           <a:sym typeface="arial"/>
                         </a:rPr>
-                        <a:t>58 (43.3%)</a:t>
+                        <a:t>162 (40.5%)</a:t>
                       </a:r>
                     </a:p>
                   </a:txBody>
@@ -7250,12 +8033,14 @@
                     </a:solidFill>
                   </a:tcPr>
                 </a:tc>
+              </a:tr>
+              <a:tr h="243582">
                 <a:tc>
                   <a:txBody>
                     <a:bodyPr/>
                     <a:lstStyle/>
                     <a:p>
-                      <a:pPr algn="ctr" marL="63500" marR="63500">
+                      <a:pPr algn="l" marL="127000" marR="63500">
                         <a:lnSpc>
                           <a:spcPct val="100000"/>
                         </a:lnSpc>
@@ -7279,7 +8064,7 @@
                           <a:ea typeface="arial"/>
                           <a:sym typeface="arial"/>
                         </a:rPr>
-                        <a:t>105 (39.2%)</a:t>
+                        <a:t>dcd D.2.1.5.3</a:t>
                       </a:r>
                     </a:p>
                   </a:txBody>
@@ -7301,20 +8086,18 @@
                       <a:prstDash val="solid"/>
                     </a:lnB>
                     <a:solidFill>
-                      <a:srgbClr val="FFBD69">
+                      <a:srgbClr val="FF7D29">
                         <a:alpha val="100000"/>
                       </a:srgbClr>
                     </a:solidFill>
                   </a:tcPr>
                 </a:tc>
-              </a:tr>
-              <a:tr h="243582">
                 <a:tc>
                   <a:txBody>
                     <a:bodyPr/>
                     <a:lstStyle/>
                     <a:p>
-                      <a:pPr algn="l" marL="127000" marR="63500">
+                      <a:pPr algn="ctr" marL="63500" marR="63500">
                         <a:lnSpc>
                           <a:spcPct val="100000"/>
                         </a:lnSpc>
@@ -7338,7 +8121,7 @@
                           <a:ea typeface="arial"/>
                           <a:sym typeface="arial"/>
                         </a:rPr>
-                        <a:t>cl B.1</a:t>
+                        <a:t>47 (35.1%)</a:t>
                       </a:r>
                     </a:p>
                   </a:txBody>
@@ -7395,7 +8178,7 @@
                           <a:ea typeface="arial"/>
                           <a:sym typeface="arial"/>
                         </a:rPr>
-                        <a:t>47 (35.1%)</a:t>
+                        <a:t>58 (43.3%)</a:t>
                       </a:r>
                     </a:p>
                   </a:txBody>
@@ -7452,7 +8235,7 @@
                           <a:ea typeface="arial"/>
                           <a:sym typeface="arial"/>
                         </a:rPr>
-                        <a:t>49 (36.6%)</a:t>
+                        <a:t>105 (39.2%)</a:t>
                       </a:r>
                     </a:p>
                   </a:txBody>
@@ -7509,7 +8292,7 @@
                           <a:ea typeface="arial"/>
                           <a:sym typeface="arial"/>
                         </a:rPr>
-                        <a:t>96 (35.8%)</a:t>
+                        <a:t>162 (40.5%)</a:t>
                       </a:r>
                     </a:p>
                   </a:txBody>
@@ -7568,7 +8351,7 @@
                           <a:ea typeface="arial"/>
                           <a:sym typeface="arial"/>
                         </a:rPr>
-                        <a:t>dcd B.1.1.1.1</a:t>
+                        <a:t>cl B.1</a:t>
                       </a:r>
                     </a:p>
                   </a:txBody>
@@ -7767,14 +8550,12 @@
                     </a:solidFill>
                   </a:tcPr>
                 </a:tc>
-              </a:tr>
-              <a:tr h="243582">
                 <a:tc>
                   <a:txBody>
                     <a:bodyPr/>
                     <a:lstStyle/>
                     <a:p>
-                      <a:pPr algn="l" marL="127000" marR="63500">
+                      <a:pPr algn="ctr" marL="63500" marR="63500">
                         <a:lnSpc>
                           <a:spcPct val="100000"/>
                         </a:lnSpc>
@@ -7798,7 +8579,7 @@
                           <a:ea typeface="arial"/>
                           <a:sym typeface="arial"/>
                         </a:rPr>
-                        <a:t>cl C.1</a:t>
+                        <a:t>139 (34.8%)</a:t>
                       </a:r>
                     </a:p>
                   </a:txBody>
@@ -7820,18 +8601,20 @@
                       <a:prstDash val="solid"/>
                     </a:lnB>
                     <a:solidFill>
-                      <a:srgbClr val="FF7D29">
+                      <a:srgbClr val="FFBD69">
                         <a:alpha val="100000"/>
                       </a:srgbClr>
                     </a:solidFill>
                   </a:tcPr>
                 </a:tc>
+              </a:tr>
+              <a:tr h="243582">
                 <a:tc>
                   <a:txBody>
                     <a:bodyPr/>
                     <a:lstStyle/>
                     <a:p>
-                      <a:pPr algn="ctr" marL="63500" marR="63500">
+                      <a:pPr algn="l" marL="127000" marR="63500">
                         <a:lnSpc>
                           <a:spcPct val="100000"/>
                         </a:lnSpc>
@@ -7855,7 +8638,7 @@
                           <a:ea typeface="arial"/>
                           <a:sym typeface="arial"/>
                         </a:rPr>
-                        <a:t>43 (32.1%)</a:t>
+                        <a:t>dcd B.1.1.1.1</a:t>
                       </a:r>
                     </a:p>
                   </a:txBody>
@@ -7912,7 +8695,7 @@
                           <a:ea typeface="arial"/>
                           <a:sym typeface="arial"/>
                         </a:rPr>
-                        <a:t>46 (34.3%)</a:t>
+                        <a:t>47 (35.1%)</a:t>
                       </a:r>
                     </a:p>
                   </a:txBody>
@@ -7969,7 +8752,7 @@
                           <a:ea typeface="arial"/>
                           <a:sym typeface="arial"/>
                         </a:rPr>
-                        <a:t>89 (33.2%)</a:t>
+                        <a:t>49 (36.6%)</a:t>
                       </a:r>
                     </a:p>
                   </a:txBody>
@@ -7997,14 +8780,12 @@
                     </a:solidFill>
                   </a:tcPr>
                 </a:tc>
-              </a:tr>
-              <a:tr h="243582">
                 <a:tc>
                   <a:txBody>
                     <a:bodyPr/>
                     <a:lstStyle/>
                     <a:p>
-                      <a:pPr algn="l" marL="127000" marR="63500">
+                      <a:pPr algn="ctr" marL="63500" marR="63500">
                         <a:lnSpc>
                           <a:spcPct val="100000"/>
                         </a:lnSpc>
@@ -8028,7 +8809,7 @@
                           <a:ea typeface="arial"/>
                           <a:sym typeface="arial"/>
                         </a:rPr>
-                        <a:t>dcd C.1.1.1.3</a:t>
+                        <a:t>96 (35.8%)</a:t>
                       </a:r>
                     </a:p>
                   </a:txBody>
@@ -8050,7 +8831,7 @@
                       <a:prstDash val="solid"/>
                     </a:lnB>
                     <a:solidFill>
-                      <a:srgbClr val="FFBD69">
+                      <a:srgbClr val="FF7D29">
                         <a:alpha val="100000"/>
                       </a:srgbClr>
                     </a:solidFill>
@@ -8085,7 +8866,7 @@
                           <a:ea typeface="arial"/>
                           <a:sym typeface="arial"/>
                         </a:rPr>
-                        <a:t>43 (32.1%)</a:t>
+                        <a:t>139 (34.8%)</a:t>
                       </a:r>
                     </a:p>
                   </a:txBody>
@@ -8107,18 +8888,20 @@
                       <a:prstDash val="solid"/>
                     </a:lnB>
                     <a:solidFill>
-                      <a:srgbClr val="FFBD69">
+                      <a:srgbClr val="FF7D29">
                         <a:alpha val="100000"/>
                       </a:srgbClr>
                     </a:solidFill>
                   </a:tcPr>
                 </a:tc>
+              </a:tr>
+              <a:tr h="243582">
                 <a:tc>
                   <a:txBody>
                     <a:bodyPr/>
                     <a:lstStyle/>
                     <a:p>
-                      <a:pPr algn="ctr" marL="63500" marR="63500">
+                      <a:pPr algn="l" marL="127000" marR="63500">
                         <a:lnSpc>
                           <a:spcPct val="100000"/>
                         </a:lnSpc>
@@ -8142,7 +8925,7 @@
                           <a:ea typeface="arial"/>
                           <a:sym typeface="arial"/>
                         </a:rPr>
-                        <a:t>46 (34.3%)</a:t>
+                        <a:t>cl C.1</a:t>
                       </a:r>
                     </a:p>
                   </a:txBody>
@@ -8199,7 +8982,7 @@
                           <a:ea typeface="arial"/>
                           <a:sym typeface="arial"/>
                         </a:rPr>
-                        <a:t>89 (33.2%)</a:t>
+                        <a:t>43 (32.1%)</a:t>
                       </a:r>
                     </a:p>
                   </a:txBody>
@@ -8227,14 +9010,12 @@
                     </a:solidFill>
                   </a:tcPr>
                 </a:tc>
-              </a:tr>
-              <a:tr h="243582">
                 <a:tc>
                   <a:txBody>
                     <a:bodyPr/>
                     <a:lstStyle/>
                     <a:p>
-                      <a:pPr algn="l" marL="127000" marR="63500">
+                      <a:pPr algn="ctr" marL="63500" marR="63500">
                         <a:lnSpc>
                           <a:spcPct val="100000"/>
                         </a:lnSpc>
@@ -8258,7 +9039,7 @@
                           <a:ea typeface="arial"/>
                           <a:sym typeface="arial"/>
                         </a:rPr>
-                        <a:t>cl C.2</a:t>
+                        <a:t>46 (34.3%)</a:t>
                       </a:r>
                     </a:p>
                   </a:txBody>
@@ -8280,7 +9061,7 @@
                       <a:prstDash val="solid"/>
                     </a:lnB>
                     <a:solidFill>
-                      <a:srgbClr val="FF7D29">
+                      <a:srgbClr val="FFBD69">
                         <a:alpha val="100000"/>
                       </a:srgbClr>
                     </a:solidFill>
@@ -8315,7 +9096,7 @@
                           <a:ea typeface="arial"/>
                           <a:sym typeface="arial"/>
                         </a:rPr>
-                        <a:t>35 (26.1%)</a:t>
+                        <a:t>89 (33.2%)</a:t>
                       </a:r>
                     </a:p>
                   </a:txBody>
@@ -8337,7 +9118,7 @@
                       <a:prstDash val="solid"/>
                     </a:lnB>
                     <a:solidFill>
-                      <a:srgbClr val="FF7D29">
+                      <a:srgbClr val="FFBD69">
                         <a:alpha val="100000"/>
                       </a:srgbClr>
                     </a:solidFill>
@@ -8372,7 +9153,7 @@
                           <a:ea typeface="arial"/>
                           <a:sym typeface="arial"/>
                         </a:rPr>
-                        <a:t>48 (35.8%)</a:t>
+                        <a:t>132 (33.0%)</a:t>
                       </a:r>
                     </a:p>
                   </a:txBody>
@@ -8394,18 +9175,20 @@
                       <a:prstDash val="solid"/>
                     </a:lnB>
                     <a:solidFill>
-                      <a:srgbClr val="FF7D29">
+                      <a:srgbClr val="FFBD69">
                         <a:alpha val="100000"/>
                       </a:srgbClr>
                     </a:solidFill>
                   </a:tcPr>
                 </a:tc>
+              </a:tr>
+              <a:tr h="243582">
                 <a:tc>
                   <a:txBody>
                     <a:bodyPr/>
                     <a:lstStyle/>
                     <a:p>
-                      <a:pPr algn="ctr" marL="63500" marR="63500">
+                      <a:pPr algn="l" marL="127000" marR="63500">
                         <a:lnSpc>
                           <a:spcPct val="100000"/>
                         </a:lnSpc>
@@ -8429,7 +9212,7 @@
                           <a:ea typeface="arial"/>
                           <a:sym typeface="arial"/>
                         </a:rPr>
-                        <a:t>83 (31.0%)</a:t>
+                        <a:t>dcd C.1.1.1.3</a:t>
                       </a:r>
                     </a:p>
                   </a:txBody>
@@ -8457,14 +9240,12 @@
                     </a:solidFill>
                   </a:tcPr>
                 </a:tc>
-              </a:tr>
-              <a:tr h="243582">
                 <a:tc>
                   <a:txBody>
                     <a:bodyPr/>
                     <a:lstStyle/>
                     <a:p>
-                      <a:pPr algn="l" marL="127000" marR="63500">
+                      <a:pPr algn="ctr" marL="63500" marR="63500">
                         <a:lnSpc>
                           <a:spcPct val="100000"/>
                         </a:lnSpc>
@@ -8488,7 +9269,7 @@
                           <a:ea typeface="arial"/>
                           <a:sym typeface="arial"/>
                         </a:rPr>
-                        <a:t>dcd C.2.1.2.1</a:t>
+                        <a:t>43 (32.1%)</a:t>
                       </a:r>
                     </a:p>
                   </a:txBody>
@@ -8510,7 +9291,7 @@
                       <a:prstDash val="solid"/>
                     </a:lnB>
                     <a:solidFill>
-                      <a:srgbClr val="FFBD69">
+                      <a:srgbClr val="FF7D29">
                         <a:alpha val="100000"/>
                       </a:srgbClr>
                     </a:solidFill>
@@ -8545,7 +9326,7 @@
                           <a:ea typeface="arial"/>
                           <a:sym typeface="arial"/>
                         </a:rPr>
-                        <a:t>35 (26.1%)</a:t>
+                        <a:t>46 (34.3%)</a:t>
                       </a:r>
                     </a:p>
                   </a:txBody>
@@ -8567,7 +9348,7 @@
                       <a:prstDash val="solid"/>
                     </a:lnB>
                     <a:solidFill>
-                      <a:srgbClr val="FFBD69">
+                      <a:srgbClr val="FF7D29">
                         <a:alpha val="100000"/>
                       </a:srgbClr>
                     </a:solidFill>
@@ -8602,7 +9383,7 @@
                           <a:ea typeface="arial"/>
                           <a:sym typeface="arial"/>
                         </a:rPr>
-                        <a:t>48 (35.8%)</a:t>
+                        <a:t>89 (33.2%)</a:t>
                       </a:r>
                     </a:p>
                   </a:txBody>
@@ -8624,7 +9405,7 @@
                       <a:prstDash val="solid"/>
                     </a:lnB>
                     <a:solidFill>
-                      <a:srgbClr val="FFBD69">
+                      <a:srgbClr val="FF7D29">
                         <a:alpha val="100000"/>
                       </a:srgbClr>
                     </a:solidFill>
@@ -8659,7 +9440,66 @@
                           <a:ea typeface="arial"/>
                           <a:sym typeface="arial"/>
                         </a:rPr>
-                        <a:t>83 (31.0%)</a:t>
+                        <a:t>132 (33.0%)</a:t>
+                      </a:r>
+                    </a:p>
+                  </a:txBody>
+                  <a:tcPr anchor="ctr" marB="38100" marT="38100" marR="0" marL="0">
+                    <a:lnL algn="ctr" cmpd="sng" cap="flat" w="0">
+                      <a:noFill/>
+                      <a:prstDash val="solid"/>
+                    </a:lnL>
+                    <a:lnR algn="ctr" cmpd="sng" cap="flat" w="0">
+                      <a:noFill/>
+                      <a:prstDash val="solid"/>
+                    </a:lnR>
+                    <a:lnT algn="ctr" cmpd="sng" cap="flat" w="0">
+                      <a:noFill/>
+                      <a:prstDash val="solid"/>
+                    </a:lnT>
+                    <a:lnB algn="ctr" cmpd="sng" cap="flat" w="0">
+                      <a:noFill/>
+                      <a:prstDash val="solid"/>
+                    </a:lnB>
+                    <a:solidFill>
+                      <a:srgbClr val="FF7D29">
+                        <a:alpha val="100000"/>
+                      </a:srgbClr>
+                    </a:solidFill>
+                  </a:tcPr>
+                </a:tc>
+              </a:tr>
+              <a:tr h="243582">
+                <a:tc>
+                  <a:txBody>
+                    <a:bodyPr/>
+                    <a:lstStyle/>
+                    <a:p>
+                      <a:pPr algn="l" marL="127000" marR="63500">
+                        <a:lnSpc>
+                          <a:spcPct val="100000"/>
+                        </a:lnSpc>
+                        <a:spcBef>
+                          <a:spcPts val="300"/>
+                        </a:spcBef>
+                        <a:spcAft>
+                          <a:spcPts val="300"/>
+                        </a:spcAft>
+                        <a:buNone/>
+                      </a:pPr>
+                      <a:r>
+                        <a:rPr cap="none" sz="1200" i="0" b="0" u="none">
+                          <a:solidFill>
+                            <a:srgbClr val="000000">
+                              <a:alpha val="100000"/>
+                            </a:srgbClr>
+                          </a:solidFill>
+                          <a:latin typeface="arial"/>
+                          <a:cs typeface="arial"/>
+                          <a:ea typeface="arial"/>
+                          <a:sym typeface="arial"/>
+                        </a:rPr>
+                        <a:t>cl C.2</a:t>
                       </a:r>
                     </a:p>
                   </a:txBody>
@@ -8687,9 +9527,524 @@
                     </a:solidFill>
                   </a:tcPr>
                 </a:tc>
+                <a:tc>
+                  <a:txBody>
+                    <a:bodyPr/>
+                    <a:lstStyle/>
+                    <a:p>
+                      <a:pPr algn="ctr" marL="63500" marR="63500">
+                        <a:lnSpc>
+                          <a:spcPct val="100000"/>
+                        </a:lnSpc>
+                        <a:spcBef>
+                          <a:spcPts val="300"/>
+                        </a:spcBef>
+                        <a:spcAft>
+                          <a:spcPts val="300"/>
+                        </a:spcAft>
+                        <a:buNone/>
+                      </a:pPr>
+                      <a:r>
+                        <a:rPr cap="none" sz="1200" i="0" b="0" u="none">
+                          <a:solidFill>
+                            <a:srgbClr val="000000">
+                              <a:alpha val="100000"/>
+                            </a:srgbClr>
+                          </a:solidFill>
+                          <a:latin typeface="arial"/>
+                          <a:cs typeface="arial"/>
+                          <a:ea typeface="arial"/>
+                          <a:sym typeface="arial"/>
+                        </a:rPr>
+                        <a:t>35 (26.1%)</a:t>
+                      </a:r>
+                    </a:p>
+                  </a:txBody>
+                  <a:tcPr anchor="ctr" marB="38100" marT="38100" marR="0" marL="0">
+                    <a:lnL algn="ctr" cmpd="sng" cap="flat" w="0">
+                      <a:noFill/>
+                      <a:prstDash val="solid"/>
+                    </a:lnL>
+                    <a:lnR algn="ctr" cmpd="sng" cap="flat" w="0">
+                      <a:noFill/>
+                      <a:prstDash val="solid"/>
+                    </a:lnR>
+                    <a:lnT algn="ctr" cmpd="sng" cap="flat" w="0">
+                      <a:noFill/>
+                      <a:prstDash val="solid"/>
+                    </a:lnT>
+                    <a:lnB algn="ctr" cmpd="sng" cap="flat" w="0">
+                      <a:noFill/>
+                      <a:prstDash val="solid"/>
+                    </a:lnB>
+                    <a:solidFill>
+                      <a:srgbClr val="FFBD69">
+                        <a:alpha val="100000"/>
+                      </a:srgbClr>
+                    </a:solidFill>
+                  </a:tcPr>
+                </a:tc>
+                <a:tc>
+                  <a:txBody>
+                    <a:bodyPr/>
+                    <a:lstStyle/>
+                    <a:p>
+                      <a:pPr algn="ctr" marL="63500" marR="63500">
+                        <a:lnSpc>
+                          <a:spcPct val="100000"/>
+                        </a:lnSpc>
+                        <a:spcBef>
+                          <a:spcPts val="300"/>
+                        </a:spcBef>
+                        <a:spcAft>
+                          <a:spcPts val="300"/>
+                        </a:spcAft>
+                        <a:buNone/>
+                      </a:pPr>
+                      <a:r>
+                        <a:rPr cap="none" sz="1200" i="0" b="0" u="none">
+                          <a:solidFill>
+                            <a:srgbClr val="000000">
+                              <a:alpha val="100000"/>
+                            </a:srgbClr>
+                          </a:solidFill>
+                          <a:latin typeface="arial"/>
+                          <a:cs typeface="arial"/>
+                          <a:ea typeface="arial"/>
+                          <a:sym typeface="arial"/>
+                        </a:rPr>
+                        <a:t>48 (35.8%)</a:t>
+                      </a:r>
+                    </a:p>
+                  </a:txBody>
+                  <a:tcPr anchor="ctr" marB="38100" marT="38100" marR="0" marL="0">
+                    <a:lnL algn="ctr" cmpd="sng" cap="flat" w="0">
+                      <a:noFill/>
+                      <a:prstDash val="solid"/>
+                    </a:lnL>
+                    <a:lnR algn="ctr" cmpd="sng" cap="flat" w="0">
+                      <a:noFill/>
+                      <a:prstDash val="solid"/>
+                    </a:lnR>
+                    <a:lnT algn="ctr" cmpd="sng" cap="flat" w="0">
+                      <a:noFill/>
+                      <a:prstDash val="solid"/>
+                    </a:lnT>
+                    <a:lnB algn="ctr" cmpd="sng" cap="flat" w="0">
+                      <a:noFill/>
+                      <a:prstDash val="solid"/>
+                    </a:lnB>
+                    <a:solidFill>
+                      <a:srgbClr val="FFBD69">
+                        <a:alpha val="100000"/>
+                      </a:srgbClr>
+                    </a:solidFill>
+                  </a:tcPr>
+                </a:tc>
+                <a:tc>
+                  <a:txBody>
+                    <a:bodyPr/>
+                    <a:lstStyle/>
+                    <a:p>
+                      <a:pPr algn="ctr" marL="63500" marR="63500">
+                        <a:lnSpc>
+                          <a:spcPct val="100000"/>
+                        </a:lnSpc>
+                        <a:spcBef>
+                          <a:spcPts val="300"/>
+                        </a:spcBef>
+                        <a:spcAft>
+                          <a:spcPts val="300"/>
+                        </a:spcAft>
+                        <a:buNone/>
+                      </a:pPr>
+                      <a:r>
+                        <a:rPr cap="none" sz="1200" i="0" b="0" u="none">
+                          <a:solidFill>
+                            <a:srgbClr val="000000">
+                              <a:alpha val="100000"/>
+                            </a:srgbClr>
+                          </a:solidFill>
+                          <a:latin typeface="arial"/>
+                          <a:cs typeface="arial"/>
+                          <a:ea typeface="arial"/>
+                          <a:sym typeface="arial"/>
+                        </a:rPr>
+                        <a:t>83 (31.0%)</a:t>
+                      </a:r>
+                    </a:p>
+                  </a:txBody>
+                  <a:tcPr anchor="ctr" marB="38100" marT="38100" marR="0" marL="0">
+                    <a:lnL algn="ctr" cmpd="sng" cap="flat" w="0">
+                      <a:noFill/>
+                      <a:prstDash val="solid"/>
+                    </a:lnL>
+                    <a:lnR algn="ctr" cmpd="sng" cap="flat" w="0">
+                      <a:noFill/>
+                      <a:prstDash val="solid"/>
+                    </a:lnR>
+                    <a:lnT algn="ctr" cmpd="sng" cap="flat" w="0">
+                      <a:noFill/>
+                      <a:prstDash val="solid"/>
+                    </a:lnT>
+                    <a:lnB algn="ctr" cmpd="sng" cap="flat" w="0">
+                      <a:noFill/>
+                      <a:prstDash val="solid"/>
+                    </a:lnB>
+                    <a:solidFill>
+                      <a:srgbClr val="FFBD69">
+                        <a:alpha val="100000"/>
+                      </a:srgbClr>
+                    </a:solidFill>
+                  </a:tcPr>
+                </a:tc>
+                <a:tc>
+                  <a:txBody>
+                    <a:bodyPr/>
+                    <a:lstStyle/>
+                    <a:p>
+                      <a:pPr algn="ctr" marL="63500" marR="63500">
+                        <a:lnSpc>
+                          <a:spcPct val="100000"/>
+                        </a:lnSpc>
+                        <a:spcBef>
+                          <a:spcPts val="300"/>
+                        </a:spcBef>
+                        <a:spcAft>
+                          <a:spcPts val="300"/>
+                        </a:spcAft>
+                        <a:buNone/>
+                      </a:pPr>
+                      <a:r>
+                        <a:rPr cap="none" sz="1200" i="0" b="0" u="none">
+                          <a:solidFill>
+                            <a:srgbClr val="000000">
+                              <a:alpha val="100000"/>
+                            </a:srgbClr>
+                          </a:solidFill>
+                          <a:latin typeface="arial"/>
+                          <a:cs typeface="arial"/>
+                          <a:ea typeface="arial"/>
+                          <a:sym typeface="arial"/>
+                        </a:rPr>
+                        <a:t>138 (34.5%)</a:t>
+                      </a:r>
+                    </a:p>
+                  </a:txBody>
+                  <a:tcPr anchor="ctr" marB="38100" marT="38100" marR="0" marL="0">
+                    <a:lnL algn="ctr" cmpd="sng" cap="flat" w="0">
+                      <a:noFill/>
+                      <a:prstDash val="solid"/>
+                    </a:lnL>
+                    <a:lnR algn="ctr" cmpd="sng" cap="flat" w="0">
+                      <a:noFill/>
+                      <a:prstDash val="solid"/>
+                    </a:lnR>
+                    <a:lnT algn="ctr" cmpd="sng" cap="flat" w="0">
+                      <a:noFill/>
+                      <a:prstDash val="solid"/>
+                    </a:lnT>
+                    <a:lnB algn="ctr" cmpd="sng" cap="flat" w="0">
+                      <a:noFill/>
+                      <a:prstDash val="solid"/>
+                    </a:lnB>
+                    <a:solidFill>
+                      <a:srgbClr val="FFBD69">
+                        <a:alpha val="100000"/>
+                      </a:srgbClr>
+                    </a:solidFill>
+                  </a:tcPr>
+                </a:tc>
+              </a:tr>
+              <a:tr h="243582">
+                <a:tc>
+                  <a:txBody>
+                    <a:bodyPr/>
+                    <a:lstStyle/>
+                    <a:p>
+                      <a:pPr algn="ctr" marL="63500" marR="63500">
+                        <a:lnSpc>
+                          <a:spcPct val="100000"/>
+                        </a:lnSpc>
+                        <a:spcBef>
+                          <a:spcPts val="300"/>
+                        </a:spcBef>
+                        <a:spcAft>
+                          <a:spcPts val="300"/>
+                        </a:spcAft>
+                        <a:buNone/>
+                      </a:pPr>
+                      <a:r>
+                        <a:rPr cap="none" sz="1200" i="0" b="0" u="none">
+                          <a:solidFill>
+                            <a:srgbClr val="000000">
+                              <a:alpha val="100000"/>
+                            </a:srgbClr>
+                          </a:solidFill>
+                          <a:latin typeface="arial"/>
+                          <a:cs typeface="arial"/>
+                          <a:ea typeface="arial"/>
+                          <a:sym typeface="arial"/>
+                        </a:rPr>
+                        <a:t>dcd C.2.1.2.1</a:t>
+                      </a:r>
+                    </a:p>
+                  </a:txBody>
+                  <a:tcPr anchor="ctr" marB="38100" marT="38100" marR="0" marL="0">
+                    <a:lnL algn="ctr" cmpd="sng" cap="flat" w="0">
+                      <a:noFill/>
+                      <a:prstDash val="solid"/>
+                    </a:lnL>
+                    <a:lnR algn="ctr" cmpd="sng" cap="flat" w="0">
+                      <a:noFill/>
+                      <a:prstDash val="solid"/>
+                    </a:lnR>
+                    <a:lnT algn="ctr" cmpd="sng" cap="flat" w="0">
+                      <a:noFill/>
+                      <a:prstDash val="solid"/>
+                    </a:lnT>
+                    <a:lnB algn="ctr" cmpd="sng" cap="flat" w="0">
+                      <a:noFill/>
+                      <a:prstDash val="solid"/>
+                    </a:lnB>
+                    <a:solidFill>
+                      <a:srgbClr val="FF7D29">
+                        <a:alpha val="100000"/>
+                      </a:srgbClr>
+                    </a:solidFill>
+                  </a:tcPr>
+                </a:tc>
+                <a:tc>
+                  <a:txBody>
+                    <a:bodyPr/>
+                    <a:lstStyle/>
+                    <a:p>
+                      <a:pPr algn="ctr" marL="63500" marR="63500">
+                        <a:lnSpc>
+                          <a:spcPct val="100000"/>
+                        </a:lnSpc>
+                        <a:spcBef>
+                          <a:spcPts val="300"/>
+                        </a:spcBef>
+                        <a:spcAft>
+                          <a:spcPts val="300"/>
+                        </a:spcAft>
+                        <a:buNone/>
+                      </a:pPr>
+                      <a:r>
+                        <a:rPr cap="none" sz="1200" i="0" b="0" u="none">
+                          <a:solidFill>
+                            <a:srgbClr val="000000">
+                              <a:alpha val="100000"/>
+                            </a:srgbClr>
+                          </a:solidFill>
+                          <a:latin typeface="arial"/>
+                          <a:cs typeface="arial"/>
+                          <a:ea typeface="arial"/>
+                          <a:sym typeface="arial"/>
+                        </a:rPr>
+                        <a:t>35 (26.1%)</a:t>
+                      </a:r>
+                    </a:p>
+                  </a:txBody>
+                  <a:tcPr anchor="ctr" marB="38100" marT="38100" marR="0" marL="0">
+                    <a:lnL algn="ctr" cmpd="sng" cap="flat" w="0">
+                      <a:noFill/>
+                      <a:prstDash val="solid"/>
+                    </a:lnL>
+                    <a:lnR algn="ctr" cmpd="sng" cap="flat" w="0">
+                      <a:noFill/>
+                      <a:prstDash val="solid"/>
+                    </a:lnR>
+                    <a:lnT algn="ctr" cmpd="sng" cap="flat" w="0">
+                      <a:noFill/>
+                      <a:prstDash val="solid"/>
+                    </a:lnT>
+                    <a:lnB algn="ctr" cmpd="sng" cap="flat" w="0">
+                      <a:noFill/>
+                      <a:prstDash val="solid"/>
+                    </a:lnB>
+                    <a:solidFill>
+                      <a:srgbClr val="FF7D29">
+                        <a:alpha val="100000"/>
+                      </a:srgbClr>
+                    </a:solidFill>
+                  </a:tcPr>
+                </a:tc>
+                <a:tc>
+                  <a:txBody>
+                    <a:bodyPr/>
+                    <a:lstStyle/>
+                    <a:p>
+                      <a:pPr algn="ctr" marL="63500" marR="63500">
+                        <a:lnSpc>
+                          <a:spcPct val="100000"/>
+                        </a:lnSpc>
+                        <a:spcBef>
+                          <a:spcPts val="300"/>
+                        </a:spcBef>
+                        <a:spcAft>
+                          <a:spcPts val="300"/>
+                        </a:spcAft>
+                        <a:buNone/>
+                      </a:pPr>
+                      <a:r>
+                        <a:rPr cap="none" sz="1200" i="0" b="0" u="none">
+                          <a:solidFill>
+                            <a:srgbClr val="000000">
+                              <a:alpha val="100000"/>
+                            </a:srgbClr>
+                          </a:solidFill>
+                          <a:latin typeface="arial"/>
+                          <a:cs typeface="arial"/>
+                          <a:ea typeface="arial"/>
+                          <a:sym typeface="arial"/>
+                        </a:rPr>
+                        <a:t>48 (35.8%)</a:t>
+                      </a:r>
+                    </a:p>
+                  </a:txBody>
+                  <a:tcPr anchor="ctr" marB="38100" marT="38100" marR="0" marL="0">
+                    <a:lnL algn="ctr" cmpd="sng" cap="flat" w="0">
+                      <a:noFill/>
+                      <a:prstDash val="solid"/>
+                    </a:lnL>
+                    <a:lnR algn="ctr" cmpd="sng" cap="flat" w="0">
+                      <a:noFill/>
+                      <a:prstDash val="solid"/>
+                    </a:lnR>
+                    <a:lnT algn="ctr" cmpd="sng" cap="flat" w="0">
+                      <a:noFill/>
+                      <a:prstDash val="solid"/>
+                    </a:lnT>
+                    <a:lnB algn="ctr" cmpd="sng" cap="flat" w="0">
+                      <a:noFill/>
+                      <a:prstDash val="solid"/>
+                    </a:lnB>
+                    <a:solidFill>
+                      <a:srgbClr val="FF7D29">
+                        <a:alpha val="100000"/>
+                      </a:srgbClr>
+                    </a:solidFill>
+                  </a:tcPr>
+                </a:tc>
+                <a:tc>
+                  <a:txBody>
+                    <a:bodyPr/>
+                    <a:lstStyle/>
+                    <a:p>
+                      <a:pPr algn="ctr" marL="63500" marR="63500">
+                        <a:lnSpc>
+                          <a:spcPct val="100000"/>
+                        </a:lnSpc>
+                        <a:spcBef>
+                          <a:spcPts val="300"/>
+                        </a:spcBef>
+                        <a:spcAft>
+                          <a:spcPts val="300"/>
+                        </a:spcAft>
+                        <a:buNone/>
+                      </a:pPr>
+                      <a:r>
+                        <a:rPr cap="none" sz="1200" i="0" b="0" u="none">
+                          <a:solidFill>
+                            <a:srgbClr val="000000">
+                              <a:alpha val="100000"/>
+                            </a:srgbClr>
+                          </a:solidFill>
+                          <a:latin typeface="arial"/>
+                          <a:cs typeface="arial"/>
+                          <a:ea typeface="arial"/>
+                          <a:sym typeface="arial"/>
+                        </a:rPr>
+                        <a:t>83 (31.0%)</a:t>
+                      </a:r>
+                    </a:p>
+                  </a:txBody>
+                  <a:tcPr anchor="ctr" marB="38100" marT="38100" marR="0" marL="0">
+                    <a:lnL algn="ctr" cmpd="sng" cap="flat" w="0">
+                      <a:noFill/>
+                      <a:prstDash val="solid"/>
+                    </a:lnL>
+                    <a:lnR algn="ctr" cmpd="sng" cap="flat" w="0">
+                      <a:noFill/>
+                      <a:prstDash val="solid"/>
+                    </a:lnR>
+                    <a:lnT algn="ctr" cmpd="sng" cap="flat" w="0">
+                      <a:noFill/>
+                      <a:prstDash val="solid"/>
+                    </a:lnT>
+                    <a:lnB algn="ctr" cmpd="sng" cap="flat" w="0">
+                      <a:noFill/>
+                      <a:prstDash val="solid"/>
+                    </a:lnB>
+                    <a:solidFill>
+                      <a:srgbClr val="FF7D29">
+                        <a:alpha val="100000"/>
+                      </a:srgbClr>
+                    </a:solidFill>
+                  </a:tcPr>
+                </a:tc>
+                <a:tc>
+                  <a:txBody>
+                    <a:bodyPr/>
+                    <a:lstStyle/>
+                    <a:p>
+                      <a:pPr algn="ctr" marL="63500" marR="63500">
+                        <a:lnSpc>
+                          <a:spcPct val="100000"/>
+                        </a:lnSpc>
+                        <a:spcBef>
+                          <a:spcPts val="300"/>
+                        </a:spcBef>
+                        <a:spcAft>
+                          <a:spcPts val="300"/>
+                        </a:spcAft>
+                        <a:buNone/>
+                      </a:pPr>
+                      <a:r>
+                        <a:rPr cap="none" sz="1200" i="0" b="0" u="none">
+                          <a:solidFill>
+                            <a:srgbClr val="000000">
+                              <a:alpha val="100000"/>
+                            </a:srgbClr>
+                          </a:solidFill>
+                          <a:latin typeface="arial"/>
+                          <a:cs typeface="arial"/>
+                          <a:ea typeface="arial"/>
+                          <a:sym typeface="arial"/>
+                        </a:rPr>
+                        <a:t>138 (34.5%)</a:t>
+                      </a:r>
+                    </a:p>
+                  </a:txBody>
+                  <a:tcPr anchor="ctr" marB="38100" marT="38100" marR="0" marL="0">
+                    <a:lnL algn="ctr" cmpd="sng" cap="flat" w="0">
+                      <a:noFill/>
+                      <a:prstDash val="solid"/>
+                    </a:lnL>
+                    <a:lnR algn="ctr" cmpd="sng" cap="flat" w="0">
+                      <a:noFill/>
+                      <a:prstDash val="solid"/>
+                    </a:lnR>
+                    <a:lnT algn="ctr" cmpd="sng" cap="flat" w="0">
+                      <a:noFill/>
+                      <a:prstDash val="solid"/>
+                    </a:lnT>
+                    <a:lnB algn="ctr" cmpd="sng" cap="flat" w="0">
+                      <a:noFill/>
+                      <a:prstDash val="solid"/>
+                    </a:lnB>
+                    <a:solidFill>
+                      <a:srgbClr val="FF7D29">
+                        <a:alpha val="100000"/>
+                      </a:srgbClr>
+                    </a:solidFill>
+                  </a:tcPr>
+                </a:tc>
               </a:tr>
               <a:tr h="228600">
-                <a:tc gridSpan="4">
+                <a:tc gridSpan="5">
                   <a:txBody>
                     <a:bodyPr/>
                     <a:lstStyle/>
@@ -8761,6 +10116,74 @@
                           <a:sym typeface="DejaVu Sans"/>
                         </a:rPr>
                         <a:t>; </a:t>
+                      </a:r>
+                    </a:p>
+                  </a:txBody>
+                  <a:tcPr anchor="ctr" marB="63500" marT="63500" marR="0" marL="0">
+                    <a:lnL algn="ctr" cmpd="sng" cap="flat" w="0">
+                      <a:noFill/>
+                      <a:prstDash val="solid"/>
+                    </a:lnL>
+                    <a:lnR algn="ctr" cmpd="sng" cap="flat" w="0">
+                      <a:noFill/>
+                      <a:prstDash val="solid"/>
+                    </a:lnR>
+                    <a:lnT algn="ctr" cmpd="sng" cap="flat" w="0">
+                      <a:noFill/>
+                      <a:prstDash val="solid"/>
+                    </a:lnT>
+                    <a:lnB algn="ctr" cmpd="sng" cap="flat" w="0">
+                      <a:noFill/>
+                      <a:prstDash val="solid"/>
+                    </a:lnB>
+                    <a:solidFill>
+                      <a:srgbClr val="FFFFFF">
+                        <a:alpha val="0"/>
+                      </a:srgbClr>
+                    </a:solidFill>
+                  </a:tcPr>
+                </a:tc>
+                <a:tc hMerge="true">
+                  <a:txBody>
+                    <a:bodyPr/>
+                    <a:lstStyle/>
+                    <a:p>
+                      <a:pPr algn="l" marL="63500" marR="63500">
+                        <a:lnSpc>
+                          <a:spcPct val="100000"/>
+                        </a:lnSpc>
+                        <a:spcBef>
+                          <a:spcPts val="500"/>
+                        </a:spcBef>
+                        <a:spcAft>
+                          <a:spcPts val="500"/>
+                        </a:spcAft>
+                        <a:buNone/>
+                      </a:pPr>
+                      <a:endParaRPr cap="none" sz="1100" i="0" b="0" u="none">
+                        <a:solidFill>
+                          <a:srgbClr val="000000">
+                            <a:alpha val="100000"/>
+                          </a:srgbClr>
+                        </a:solidFill>
+                        <a:latin typeface="DejaVu Sans"/>
+                        <a:cs typeface="DejaVu Sans"/>
+                        <a:ea typeface="DejaVu Sans"/>
+                        <a:sym typeface="DejaVu Sans"/>
+                      </a:endParaRPr>
+                      <a:r>
+                        <a:rPr cap="none" sz="1100" i="0" b="0" u="none">
+                          <a:solidFill>
+                            <a:srgbClr val="000000">
+                              <a:alpha val="100000"/>
+                            </a:srgbClr>
+                          </a:solidFill>
+                          <a:latin typeface="DejaVu Sans"/>
+                          <a:cs typeface="DejaVu Sans"/>
+                          <a:ea typeface="DejaVu Sans"/>
+                          <a:sym typeface="DejaVu Sans"/>
+                        </a:rPr>
+                        <a:t/>
                       </a:r>
                     </a:p>
                   </a:txBody>

</xml_diff>

<commit_message>
Update pkgdown documentation e0db37beb299d04a30cd7bb0aeb1b69d43d273e0
</commit_message>
<xml_diff>
--- a/main/reference/ae.pptx
+++ b/main/reference/ae.pptx
@@ -3412,7 +3412,7 @@
           <p:nvPr/>
         </p:nvGraphicFramePr>
         <p:xfrm rot="0">
-          <a:off x="2608556" y="1165860"/>
+          <a:off x="3154062" y="1165860"/>
           <a:ext cx="3657600" cy="2743200"/>
         </p:xfrm>
         <a:graphic>
@@ -3421,10 +3421,9 @@
               <a:tblPr/>
               <a:tblGrid>
                 <a:gridCol w="2780359"/>
-                <a:gridCol w="1048632"/>
-                <a:gridCol w="1048632"/>
-                <a:gridCol w="1048632"/>
-                <a:gridCol w="1048632"/>
+                <a:gridCol w="1034506"/>
+                <a:gridCol w="1034506"/>
+                <a:gridCol w="1034506"/>
               </a:tblGrid>
               <a:tr h="268114">
                 <a:tc>
@@ -3471,74 +3470,6 @@
                           <a:sym typeface="arial"/>
                         </a:rPr>
                         <a:t> </a:t>
-                      </a:r>
-                    </a:p>
-                  </a:txBody>
-                  <a:tcPr anchor="ctr" marB="38100" marT="38100" marR="0" marL="0">
-                    <a:lnL algn="ctr" cmpd="sng" cap="flat" w="0">
-                      <a:noFill/>
-                      <a:prstDash val="solid"/>
-                    </a:lnL>
-                    <a:lnR algn="ctr" cmpd="sng" cap="flat" w="0">
-                      <a:noFill/>
-                      <a:prstDash val="solid"/>
-                    </a:lnR>
-                    <a:lnT algn="ctr" cmpd="sng" cap="flat" w="0">
-                      <a:noFill/>
-                      <a:prstDash val="solid"/>
-                    </a:lnT>
-                    <a:lnB algn="ctr" cmpd="sng" cap="flat" w="0">
-                      <a:noFill/>
-                      <a:prstDash val="solid"/>
-                    </a:lnB>
-                    <a:solidFill>
-                      <a:srgbClr val="ED4A0D">
-                        <a:alpha val="100000"/>
-                      </a:srgbClr>
-                    </a:solidFill>
-                  </a:tcPr>
-                </a:tc>
-                <a:tc>
-                  <a:txBody>
-                    <a:bodyPr/>
-                    <a:lstStyle/>
-                    <a:p>
-                      <a:pPr algn="ctr" marL="63500" marR="63500">
-                        <a:lnSpc>
-                          <a:spcPct val="100000"/>
-                        </a:lnSpc>
-                        <a:spcBef>
-                          <a:spcPts val="300"/>
-                        </a:spcBef>
-                        <a:spcAft>
-                          <a:spcPts val="300"/>
-                        </a:spcAft>
-                        <a:buNone/>
-                      </a:pPr>
-                      <a:endParaRPr cap="none" sz="1400" i="0" b="1" u="none">
-                        <a:solidFill>
-                          <a:srgbClr val="FFFFFF">
-                            <a:alpha val="100000"/>
-                          </a:srgbClr>
-                        </a:solidFill>
-                        <a:latin typeface="arial"/>
-                        <a:cs typeface="arial"/>
-                        <a:ea typeface="arial"/>
-                        <a:sym typeface="arial"/>
-                      </a:endParaRPr>
-                      <a:r>
-                        <a:rPr cap="none" sz="1400" i="0" b="1" u="none">
-                          <a:solidFill>
-                            <a:srgbClr val="FFFFFF">
-                              <a:alpha val="100000"/>
-                            </a:srgbClr>
-                          </a:solidFill>
-                          <a:latin typeface="arial"/>
-                          <a:cs typeface="arial"/>
-                          <a:ea typeface="arial"/>
-                          <a:sym typeface="arial"/>
-                        </a:rPr>
-                        <a:t/>
                       </a:r>
                     </a:p>
                   </a:txBody>
@@ -4000,6 +3931,65 @@
                     </a:solidFill>
                   </a:tcPr>
                 </a:tc>
+              </a:tr>
+              <a:tr h="243582">
+                <a:tc>
+                  <a:txBody>
+                    <a:bodyPr/>
+                    <a:lstStyle/>
+                    <a:p>
+                      <a:pPr algn="l" marL="127000" marR="63500">
+                        <a:lnSpc>
+                          <a:spcPct val="100000"/>
+                        </a:lnSpc>
+                        <a:spcBef>
+                          <a:spcPts val="300"/>
+                        </a:spcBef>
+                        <a:spcAft>
+                          <a:spcPts val="300"/>
+                        </a:spcAft>
+                        <a:buNone/>
+                      </a:pPr>
+                      <a:r>
+                        <a:rPr cap="none" sz="1200" i="0" b="0" u="none">
+                          <a:solidFill>
+                            <a:srgbClr val="000000">
+                              <a:alpha val="100000"/>
+                            </a:srgbClr>
+                          </a:solidFill>
+                          <a:latin typeface="arial"/>
+                          <a:cs typeface="arial"/>
+                          <a:ea typeface="arial"/>
+                          <a:sym typeface="arial"/>
+                        </a:rPr>
+                        <a:t>cl A.1</a:t>
+                      </a:r>
+                    </a:p>
+                  </a:txBody>
+                  <a:tcPr anchor="ctr" marB="38100" marT="38100" marR="0" marL="0">
+                    <a:lnL algn="ctr" cmpd="sng" cap="flat" w="0">
+                      <a:noFill/>
+                      <a:prstDash val="solid"/>
+                    </a:lnL>
+                    <a:lnR algn="ctr" cmpd="sng" cap="flat" w="0">
+                      <a:noFill/>
+                      <a:prstDash val="solid"/>
+                    </a:lnR>
+                    <a:lnT algn="ctr" cmpd="sng" cap="flat" w="0">
+                      <a:noFill/>
+                      <a:prstDash val="solid"/>
+                    </a:lnT>
+                    <a:lnB algn="ctr" cmpd="sng" cap="flat" w="0">
+                      <a:noFill/>
+                      <a:prstDash val="solid"/>
+                    </a:lnB>
+                    <a:solidFill>
+                      <a:srgbClr val="FFBD69">
+                        <a:alpha val="100000"/>
+                      </a:srgbClr>
+                    </a:solidFill>
+                  </a:tcPr>
+                </a:tc>
                 <a:tc>
                   <a:txBody>
                     <a:bodyPr/>
@@ -4029,7 +4019,351 @@
                           <a:ea typeface="arial"/>
                           <a:sym typeface="arial"/>
                         </a:rPr>
-                        <a:t>All Patients</a:t>
+                        <a:t>78 (58.2%)</a:t>
+                      </a:r>
+                    </a:p>
+                  </a:txBody>
+                  <a:tcPr anchor="ctr" marB="38100" marT="38100" marR="0" marL="0">
+                    <a:lnL algn="ctr" cmpd="sng" cap="flat" w="0">
+                      <a:noFill/>
+                      <a:prstDash val="solid"/>
+                    </a:lnL>
+                    <a:lnR algn="ctr" cmpd="sng" cap="flat" w="0">
+                      <a:noFill/>
+                      <a:prstDash val="solid"/>
+                    </a:lnR>
+                    <a:lnT algn="ctr" cmpd="sng" cap="flat" w="0">
+                      <a:noFill/>
+                      <a:prstDash val="solid"/>
+                    </a:lnT>
+                    <a:lnB algn="ctr" cmpd="sng" cap="flat" w="0">
+                      <a:noFill/>
+                      <a:prstDash val="solid"/>
+                    </a:lnB>
+                    <a:solidFill>
+                      <a:srgbClr val="FFBD69">
+                        <a:alpha val="100000"/>
+                      </a:srgbClr>
+                    </a:solidFill>
+                  </a:tcPr>
+                </a:tc>
+                <a:tc>
+                  <a:txBody>
+                    <a:bodyPr/>
+                    <a:lstStyle/>
+                    <a:p>
+                      <a:pPr algn="ctr" marL="63500" marR="63500">
+                        <a:lnSpc>
+                          <a:spcPct val="100000"/>
+                        </a:lnSpc>
+                        <a:spcBef>
+                          <a:spcPts val="300"/>
+                        </a:spcBef>
+                        <a:spcAft>
+                          <a:spcPts val="300"/>
+                        </a:spcAft>
+                        <a:buNone/>
+                      </a:pPr>
+                      <a:r>
+                        <a:rPr cap="none" sz="1200" i="0" b="0" u="none">
+                          <a:solidFill>
+                            <a:srgbClr val="000000">
+                              <a:alpha val="100000"/>
+                            </a:srgbClr>
+                          </a:solidFill>
+                          <a:latin typeface="arial"/>
+                          <a:cs typeface="arial"/>
+                          <a:ea typeface="arial"/>
+                          <a:sym typeface="arial"/>
+                        </a:rPr>
+                        <a:t>75 (56.0%)</a:t>
+                      </a:r>
+                    </a:p>
+                  </a:txBody>
+                  <a:tcPr anchor="ctr" marB="38100" marT="38100" marR="0" marL="0">
+                    <a:lnL algn="ctr" cmpd="sng" cap="flat" w="0">
+                      <a:noFill/>
+                      <a:prstDash val="solid"/>
+                    </a:lnL>
+                    <a:lnR algn="ctr" cmpd="sng" cap="flat" w="0">
+                      <a:noFill/>
+                      <a:prstDash val="solid"/>
+                    </a:lnR>
+                    <a:lnT algn="ctr" cmpd="sng" cap="flat" w="0">
+                      <a:noFill/>
+                      <a:prstDash val="solid"/>
+                    </a:lnT>
+                    <a:lnB algn="ctr" cmpd="sng" cap="flat" w="0">
+                      <a:noFill/>
+                      <a:prstDash val="solid"/>
+                    </a:lnB>
+                    <a:solidFill>
+                      <a:srgbClr val="FFBD69">
+                        <a:alpha val="100000"/>
+                      </a:srgbClr>
+                    </a:solidFill>
+                  </a:tcPr>
+                </a:tc>
+                <a:tc>
+                  <a:txBody>
+                    <a:bodyPr/>
+                    <a:lstStyle/>
+                    <a:p>
+                      <a:pPr algn="ctr" marL="63500" marR="63500">
+                        <a:lnSpc>
+                          <a:spcPct val="100000"/>
+                        </a:lnSpc>
+                        <a:spcBef>
+                          <a:spcPts val="300"/>
+                        </a:spcBef>
+                        <a:spcAft>
+                          <a:spcPts val="300"/>
+                        </a:spcAft>
+                        <a:buNone/>
+                      </a:pPr>
+                      <a:r>
+                        <a:rPr cap="none" sz="1200" i="0" b="0" u="none">
+                          <a:solidFill>
+                            <a:srgbClr val="000000">
+                              <a:alpha val="100000"/>
+                            </a:srgbClr>
+                          </a:solidFill>
+                          <a:latin typeface="arial"/>
+                          <a:cs typeface="arial"/>
+                          <a:ea typeface="arial"/>
+                          <a:sym typeface="arial"/>
+                        </a:rPr>
+                        <a:t>242 (60.5%)</a:t>
+                      </a:r>
+                    </a:p>
+                  </a:txBody>
+                  <a:tcPr anchor="ctr" marB="38100" marT="38100" marR="0" marL="0">
+                    <a:lnL algn="ctr" cmpd="sng" cap="flat" w="0">
+                      <a:noFill/>
+                      <a:prstDash val="solid"/>
+                    </a:lnL>
+                    <a:lnR algn="ctr" cmpd="sng" cap="flat" w="0">
+                      <a:noFill/>
+                      <a:prstDash val="solid"/>
+                    </a:lnR>
+                    <a:lnT algn="ctr" cmpd="sng" cap="flat" w="0">
+                      <a:noFill/>
+                      <a:prstDash val="solid"/>
+                    </a:lnT>
+                    <a:lnB algn="ctr" cmpd="sng" cap="flat" w="0">
+                      <a:noFill/>
+                      <a:prstDash val="solid"/>
+                    </a:lnB>
+                    <a:solidFill>
+                      <a:srgbClr val="FFBD69">
+                        <a:alpha val="100000"/>
+                      </a:srgbClr>
+                    </a:solidFill>
+                  </a:tcPr>
+                </a:tc>
+              </a:tr>
+              <a:tr h="243582">
+                <a:tc>
+                  <a:txBody>
+                    <a:bodyPr/>
+                    <a:lstStyle/>
+                    <a:p>
+                      <a:pPr algn="l" marL="127000" marR="63500">
+                        <a:lnSpc>
+                          <a:spcPct val="100000"/>
+                        </a:lnSpc>
+                        <a:spcBef>
+                          <a:spcPts val="300"/>
+                        </a:spcBef>
+                        <a:spcAft>
+                          <a:spcPts val="300"/>
+                        </a:spcAft>
+                        <a:buNone/>
+                      </a:pPr>
+                      <a:r>
+                        <a:rPr cap="none" sz="1200" i="0" b="0" u="none">
+                          <a:solidFill>
+                            <a:srgbClr val="000000">
+                              <a:alpha val="100000"/>
+                            </a:srgbClr>
+                          </a:solidFill>
+                          <a:latin typeface="arial"/>
+                          <a:cs typeface="arial"/>
+                          <a:ea typeface="arial"/>
+                          <a:sym typeface="arial"/>
+                        </a:rPr>
+                        <a:t>dcd A.1.1.1.1</a:t>
+                      </a:r>
+                    </a:p>
+                  </a:txBody>
+                  <a:tcPr anchor="ctr" marB="38100" marT="38100" marR="0" marL="0">
+                    <a:lnL algn="ctr" cmpd="sng" cap="flat" w="0">
+                      <a:noFill/>
+                      <a:prstDash val="solid"/>
+                    </a:lnL>
+                    <a:lnR algn="ctr" cmpd="sng" cap="flat" w="0">
+                      <a:noFill/>
+                      <a:prstDash val="solid"/>
+                    </a:lnR>
+                    <a:lnT algn="ctr" cmpd="sng" cap="flat" w="0">
+                      <a:noFill/>
+                      <a:prstDash val="solid"/>
+                    </a:lnT>
+                    <a:lnB algn="ctr" cmpd="sng" cap="flat" w="0">
+                      <a:noFill/>
+                      <a:prstDash val="solid"/>
+                    </a:lnB>
+                    <a:solidFill>
+                      <a:srgbClr val="FF7D29">
+                        <a:alpha val="100000"/>
+                      </a:srgbClr>
+                    </a:solidFill>
+                  </a:tcPr>
+                </a:tc>
+                <a:tc>
+                  <a:txBody>
+                    <a:bodyPr/>
+                    <a:lstStyle/>
+                    <a:p>
+                      <a:pPr algn="ctr" marL="63500" marR="63500">
+                        <a:lnSpc>
+                          <a:spcPct val="100000"/>
+                        </a:lnSpc>
+                        <a:spcBef>
+                          <a:spcPts val="300"/>
+                        </a:spcBef>
+                        <a:spcAft>
+                          <a:spcPts val="300"/>
+                        </a:spcAft>
+                        <a:buNone/>
+                      </a:pPr>
+                      <a:r>
+                        <a:rPr cap="none" sz="1200" i="0" b="0" u="none">
+                          <a:solidFill>
+                            <a:srgbClr val="000000">
+                              <a:alpha val="100000"/>
+                            </a:srgbClr>
+                          </a:solidFill>
+                          <a:latin typeface="arial"/>
+                          <a:cs typeface="arial"/>
+                          <a:ea typeface="arial"/>
+                          <a:sym typeface="arial"/>
+                        </a:rPr>
+                        <a:t>50 (37.3%)</a:t>
+                      </a:r>
+                    </a:p>
+                  </a:txBody>
+                  <a:tcPr anchor="ctr" marB="38100" marT="38100" marR="0" marL="0">
+                    <a:lnL algn="ctr" cmpd="sng" cap="flat" w="0">
+                      <a:noFill/>
+                      <a:prstDash val="solid"/>
+                    </a:lnL>
+                    <a:lnR algn="ctr" cmpd="sng" cap="flat" w="0">
+                      <a:noFill/>
+                      <a:prstDash val="solid"/>
+                    </a:lnR>
+                    <a:lnT algn="ctr" cmpd="sng" cap="flat" w="0">
+                      <a:noFill/>
+                      <a:prstDash val="solid"/>
+                    </a:lnT>
+                    <a:lnB algn="ctr" cmpd="sng" cap="flat" w="0">
+                      <a:noFill/>
+                      <a:prstDash val="solid"/>
+                    </a:lnB>
+                    <a:solidFill>
+                      <a:srgbClr val="FF7D29">
+                        <a:alpha val="100000"/>
+                      </a:srgbClr>
+                    </a:solidFill>
+                  </a:tcPr>
+                </a:tc>
+                <a:tc>
+                  <a:txBody>
+                    <a:bodyPr/>
+                    <a:lstStyle/>
+                    <a:p>
+                      <a:pPr algn="ctr" marL="63500" marR="63500">
+                        <a:lnSpc>
+                          <a:spcPct val="100000"/>
+                        </a:lnSpc>
+                        <a:spcBef>
+                          <a:spcPts val="300"/>
+                        </a:spcBef>
+                        <a:spcAft>
+                          <a:spcPts val="300"/>
+                        </a:spcAft>
+                        <a:buNone/>
+                      </a:pPr>
+                      <a:r>
+                        <a:rPr cap="none" sz="1200" i="0" b="0" u="none">
+                          <a:solidFill>
+                            <a:srgbClr val="000000">
+                              <a:alpha val="100000"/>
+                            </a:srgbClr>
+                          </a:solidFill>
+                          <a:latin typeface="arial"/>
+                          <a:cs typeface="arial"/>
+                          <a:ea typeface="arial"/>
+                          <a:sym typeface="arial"/>
+                        </a:rPr>
+                        <a:t>45 (33.6%)</a:t>
+                      </a:r>
+                    </a:p>
+                  </a:txBody>
+                  <a:tcPr anchor="ctr" marB="38100" marT="38100" marR="0" marL="0">
+                    <a:lnL algn="ctr" cmpd="sng" cap="flat" w="0">
+                      <a:noFill/>
+                      <a:prstDash val="solid"/>
+                    </a:lnL>
+                    <a:lnR algn="ctr" cmpd="sng" cap="flat" w="0">
+                      <a:noFill/>
+                      <a:prstDash val="solid"/>
+                    </a:lnR>
+                    <a:lnT algn="ctr" cmpd="sng" cap="flat" w="0">
+                      <a:noFill/>
+                      <a:prstDash val="solid"/>
+                    </a:lnT>
+                    <a:lnB algn="ctr" cmpd="sng" cap="flat" w="0">
+                      <a:noFill/>
+                      <a:prstDash val="solid"/>
+                    </a:lnB>
+                    <a:solidFill>
+                      <a:srgbClr val="FF7D29">
+                        <a:alpha val="100000"/>
+                      </a:srgbClr>
+                    </a:solidFill>
+                  </a:tcPr>
+                </a:tc>
+                <a:tc>
+                  <a:txBody>
+                    <a:bodyPr/>
+                    <a:lstStyle/>
+                    <a:p>
+                      <a:pPr algn="ctr" marL="63500" marR="63500">
+                        <a:lnSpc>
+                          <a:spcPct val="100000"/>
+                        </a:lnSpc>
+                        <a:spcBef>
+                          <a:spcPts val="300"/>
+                        </a:spcBef>
+                        <a:spcAft>
+                          <a:spcPts val="300"/>
+                        </a:spcAft>
+                        <a:buNone/>
+                      </a:pPr>
+                      <a:r>
+                        <a:rPr cap="none" sz="1200" i="0" b="0" u="none">
+                          <a:solidFill>
+                            <a:srgbClr val="000000">
+                              <a:alpha val="100000"/>
+                            </a:srgbClr>
+                          </a:solidFill>
+                          <a:latin typeface="arial"/>
+                          <a:cs typeface="arial"/>
+                          <a:ea typeface="arial"/>
+                          <a:sym typeface="arial"/>
+                        </a:rPr>
+                        <a:t>158 (39.5%)</a:t>
                       </a:r>
                     </a:p>
                   </a:txBody>
@@ -4088,7 +4422,7 @@
                           <a:ea typeface="arial"/>
                           <a:sym typeface="arial"/>
                         </a:rPr>
-                        <a:t>cl A.1</a:t>
+                        <a:t>dcd A.1.1.1.2</a:t>
                       </a:r>
                     </a:p>
                   </a:txBody>
@@ -4145,7 +4479,7 @@
                           <a:ea typeface="arial"/>
                           <a:sym typeface="arial"/>
                         </a:rPr>
-                        <a:t>78 (58.2%)</a:t>
+                        <a:t>48 (35.8%)</a:t>
                       </a:r>
                     </a:p>
                   </a:txBody>
@@ -4202,7 +4536,7 @@
                           <a:ea typeface="arial"/>
                           <a:sym typeface="arial"/>
                         </a:rPr>
-                        <a:t>75 (56.0%)</a:t>
+                        <a:t>48 (35.8%)</a:t>
                       </a:r>
                     </a:p>
                   </a:txBody>
@@ -4259,64 +4593,7 @@
                           <a:ea typeface="arial"/>
                           <a:sym typeface="arial"/>
                         </a:rPr>
-                        <a:t>153 (57.1%)</a:t>
-                      </a:r>
-                    </a:p>
-                  </a:txBody>
-                  <a:tcPr anchor="ctr" marB="38100" marT="38100" marR="0" marL="0">
-                    <a:lnL algn="ctr" cmpd="sng" cap="flat" w="0">
-                      <a:noFill/>
-                      <a:prstDash val="solid"/>
-                    </a:lnL>
-                    <a:lnR algn="ctr" cmpd="sng" cap="flat" w="0">
-                      <a:noFill/>
-                      <a:prstDash val="solid"/>
-                    </a:lnR>
-                    <a:lnT algn="ctr" cmpd="sng" cap="flat" w="0">
-                      <a:noFill/>
-                      <a:prstDash val="solid"/>
-                    </a:lnT>
-                    <a:lnB algn="ctr" cmpd="sng" cap="flat" w="0">
-                      <a:noFill/>
-                      <a:prstDash val="solid"/>
-                    </a:lnB>
-                    <a:solidFill>
-                      <a:srgbClr val="FFBD69">
-                        <a:alpha val="100000"/>
-                      </a:srgbClr>
-                    </a:solidFill>
-                  </a:tcPr>
-                </a:tc>
-                <a:tc>
-                  <a:txBody>
-                    <a:bodyPr/>
-                    <a:lstStyle/>
-                    <a:p>
-                      <a:pPr algn="ctr" marL="63500" marR="63500">
-                        <a:lnSpc>
-                          <a:spcPct val="100000"/>
-                        </a:lnSpc>
-                        <a:spcBef>
-                          <a:spcPts val="300"/>
-                        </a:spcBef>
-                        <a:spcAft>
-                          <a:spcPts val="300"/>
-                        </a:spcAft>
-                        <a:buNone/>
-                      </a:pPr>
-                      <a:r>
-                        <a:rPr cap="none" sz="1200" i="0" b="0" u="none">
-                          <a:solidFill>
-                            <a:srgbClr val="000000">
-                              <a:alpha val="100000"/>
-                            </a:srgbClr>
-                          </a:solidFill>
-                          <a:latin typeface="arial"/>
-                          <a:cs typeface="arial"/>
-                          <a:ea typeface="arial"/>
-                          <a:sym typeface="arial"/>
-                        </a:rPr>
-                        <a:t>242 (60.5%)</a:t>
+                        <a:t>146 (36.5%)</a:t>
                       </a:r>
                     </a:p>
                   </a:txBody>
@@ -4375,7 +4652,7 @@
                           <a:ea typeface="arial"/>
                           <a:sym typeface="arial"/>
                         </a:rPr>
-                        <a:t>dcd A.1.1.1.1</a:t>
+                        <a:t>cl B.2</a:t>
                       </a:r>
                     </a:p>
                   </a:txBody>
@@ -4432,7 +4709,7 @@
                           <a:ea typeface="arial"/>
                           <a:sym typeface="arial"/>
                         </a:rPr>
-                        <a:t>50 (37.3%)</a:t>
+                        <a:t>79 (59.0%)</a:t>
                       </a:r>
                     </a:p>
                   </a:txBody>
@@ -4489,7 +4766,7 @@
                           <a:ea typeface="arial"/>
                           <a:sym typeface="arial"/>
                         </a:rPr>
-                        <a:t>45 (33.6%)</a:t>
+                        <a:t>74 (55.2%)</a:t>
                       </a:r>
                     </a:p>
                   </a:txBody>
@@ -4546,64 +4823,7 @@
                           <a:ea typeface="arial"/>
                           <a:sym typeface="arial"/>
                         </a:rPr>
-                        <a:t>95 (35.4%)</a:t>
-                      </a:r>
-                    </a:p>
-                  </a:txBody>
-                  <a:tcPr anchor="ctr" marB="38100" marT="38100" marR="0" marL="0">
-                    <a:lnL algn="ctr" cmpd="sng" cap="flat" w="0">
-                      <a:noFill/>
-                      <a:prstDash val="solid"/>
-                    </a:lnL>
-                    <a:lnR algn="ctr" cmpd="sng" cap="flat" w="0">
-                      <a:noFill/>
-                      <a:prstDash val="solid"/>
-                    </a:lnR>
-                    <a:lnT algn="ctr" cmpd="sng" cap="flat" w="0">
-                      <a:noFill/>
-                      <a:prstDash val="solid"/>
-                    </a:lnT>
-                    <a:lnB algn="ctr" cmpd="sng" cap="flat" w="0">
-                      <a:noFill/>
-                      <a:prstDash val="solid"/>
-                    </a:lnB>
-                    <a:solidFill>
-                      <a:srgbClr val="FF7D29">
-                        <a:alpha val="100000"/>
-                      </a:srgbClr>
-                    </a:solidFill>
-                  </a:tcPr>
-                </a:tc>
-                <a:tc>
-                  <a:txBody>
-                    <a:bodyPr/>
-                    <a:lstStyle/>
-                    <a:p>
-                      <a:pPr algn="ctr" marL="63500" marR="63500">
-                        <a:lnSpc>
-                          <a:spcPct val="100000"/>
-                        </a:lnSpc>
-                        <a:spcBef>
-                          <a:spcPts val="300"/>
-                        </a:spcBef>
-                        <a:spcAft>
-                          <a:spcPts val="300"/>
-                        </a:spcAft>
-                        <a:buNone/>
-                      </a:pPr>
-                      <a:r>
-                        <a:rPr cap="none" sz="1200" i="0" b="0" u="none">
-                          <a:solidFill>
-                            <a:srgbClr val="000000">
-                              <a:alpha val="100000"/>
-                            </a:srgbClr>
-                          </a:solidFill>
-                          <a:latin typeface="arial"/>
-                          <a:cs typeface="arial"/>
-                          <a:ea typeface="arial"/>
-                          <a:sym typeface="arial"/>
-                        </a:rPr>
-                        <a:t>158 (39.5%)</a:t>
+                        <a:t>238 (59.5%)</a:t>
                       </a:r>
                     </a:p>
                   </a:txBody>
@@ -4662,7 +4882,7 @@
                           <a:ea typeface="arial"/>
                           <a:sym typeface="arial"/>
                         </a:rPr>
-                        <a:t>dcd A.1.1.1.2</a:t>
+                        <a:t>dcd B.2.2.3.1</a:t>
                       </a:r>
                     </a:p>
                   </a:txBody>
@@ -4776,7 +4996,7 @@
                           <a:ea typeface="arial"/>
                           <a:sym typeface="arial"/>
                         </a:rPr>
-                        <a:t>48 (35.8%)</a:t>
+                        <a:t>54 (40.3%)</a:t>
                       </a:r>
                     </a:p>
                   </a:txBody>
@@ -4833,64 +5053,7 @@
                           <a:ea typeface="arial"/>
                           <a:sym typeface="arial"/>
                         </a:rPr>
-                        <a:t>96 (35.8%)</a:t>
-                      </a:r>
-                    </a:p>
-                  </a:txBody>
-                  <a:tcPr anchor="ctr" marB="38100" marT="38100" marR="0" marL="0">
-                    <a:lnL algn="ctr" cmpd="sng" cap="flat" w="0">
-                      <a:noFill/>
-                      <a:prstDash val="solid"/>
-                    </a:lnL>
-                    <a:lnR algn="ctr" cmpd="sng" cap="flat" w="0">
-                      <a:noFill/>
-                      <a:prstDash val="solid"/>
-                    </a:lnR>
-                    <a:lnT algn="ctr" cmpd="sng" cap="flat" w="0">
-                      <a:noFill/>
-                      <a:prstDash val="solid"/>
-                    </a:lnT>
-                    <a:lnB algn="ctr" cmpd="sng" cap="flat" w="0">
-                      <a:noFill/>
-                      <a:prstDash val="solid"/>
-                    </a:lnB>
-                    <a:solidFill>
-                      <a:srgbClr val="FFBD69">
-                        <a:alpha val="100000"/>
-                      </a:srgbClr>
-                    </a:solidFill>
-                  </a:tcPr>
-                </a:tc>
-                <a:tc>
-                  <a:txBody>
-                    <a:bodyPr/>
-                    <a:lstStyle/>
-                    <a:p>
-                      <a:pPr algn="ctr" marL="63500" marR="63500">
-                        <a:lnSpc>
-                          <a:spcPct val="100000"/>
-                        </a:lnSpc>
-                        <a:spcBef>
-                          <a:spcPts val="300"/>
-                        </a:spcBef>
-                        <a:spcAft>
-                          <a:spcPts val="300"/>
-                        </a:spcAft>
-                        <a:buNone/>
-                      </a:pPr>
-                      <a:r>
-                        <a:rPr cap="none" sz="1200" i="0" b="0" u="none">
-                          <a:solidFill>
-                            <a:srgbClr val="000000">
-                              <a:alpha val="100000"/>
-                            </a:srgbClr>
-                          </a:solidFill>
-                          <a:latin typeface="arial"/>
-                          <a:cs typeface="arial"/>
-                          <a:ea typeface="arial"/>
-                          <a:sym typeface="arial"/>
-                        </a:rPr>
-                        <a:t>146 (36.5%)</a:t>
+                        <a:t>153 (38.2%)</a:t>
                       </a:r>
                     </a:p>
                   </a:txBody>
@@ -4949,7 +5112,7 @@
                           <a:ea typeface="arial"/>
                           <a:sym typeface="arial"/>
                         </a:rPr>
-                        <a:t>cl B.2</a:t>
+                        <a:t>dcd B.2.1.2.1</a:t>
                       </a:r>
                     </a:p>
                   </a:txBody>
@@ -5006,7 +5169,7 @@
                           <a:ea typeface="arial"/>
                           <a:sym typeface="arial"/>
                         </a:rPr>
-                        <a:t>79 (59.0%)</a:t>
+                        <a:t>49 (36.6%)</a:t>
                       </a:r>
                     </a:p>
                   </a:txBody>
@@ -5063,7 +5226,7 @@
                           <a:ea typeface="arial"/>
                           <a:sym typeface="arial"/>
                         </a:rPr>
-                        <a:t>74 (55.2%)</a:t>
+                        <a:t>44 (32.8%)</a:t>
                       </a:r>
                     </a:p>
                   </a:txBody>
@@ -5120,64 +5283,7 @@
                           <a:ea typeface="arial"/>
                           <a:sym typeface="arial"/>
                         </a:rPr>
-                        <a:t>153 (57.1%)</a:t>
-                      </a:r>
-                    </a:p>
-                  </a:txBody>
-                  <a:tcPr anchor="ctr" marB="38100" marT="38100" marR="0" marL="0">
-                    <a:lnL algn="ctr" cmpd="sng" cap="flat" w="0">
-                      <a:noFill/>
-                      <a:prstDash val="solid"/>
-                    </a:lnL>
-                    <a:lnR algn="ctr" cmpd="sng" cap="flat" w="0">
-                      <a:noFill/>
-                      <a:prstDash val="solid"/>
-                    </a:lnR>
-                    <a:lnT algn="ctr" cmpd="sng" cap="flat" w="0">
-                      <a:noFill/>
-                      <a:prstDash val="solid"/>
-                    </a:lnT>
-                    <a:lnB algn="ctr" cmpd="sng" cap="flat" w="0">
-                      <a:noFill/>
-                      <a:prstDash val="solid"/>
-                    </a:lnB>
-                    <a:solidFill>
-                      <a:srgbClr val="FF7D29">
-                        <a:alpha val="100000"/>
-                      </a:srgbClr>
-                    </a:solidFill>
-                  </a:tcPr>
-                </a:tc>
-                <a:tc>
-                  <a:txBody>
-                    <a:bodyPr/>
-                    <a:lstStyle/>
-                    <a:p>
-                      <a:pPr algn="ctr" marL="63500" marR="63500">
-                        <a:lnSpc>
-                          <a:spcPct val="100000"/>
-                        </a:lnSpc>
-                        <a:spcBef>
-                          <a:spcPts val="300"/>
-                        </a:spcBef>
-                        <a:spcAft>
-                          <a:spcPts val="300"/>
-                        </a:spcAft>
-                        <a:buNone/>
-                      </a:pPr>
-                      <a:r>
-                        <a:rPr cap="none" sz="1200" i="0" b="0" u="none">
-                          <a:solidFill>
-                            <a:srgbClr val="000000">
-                              <a:alpha val="100000"/>
-                            </a:srgbClr>
-                          </a:solidFill>
-                          <a:latin typeface="arial"/>
-                          <a:cs typeface="arial"/>
-                          <a:ea typeface="arial"/>
-                          <a:sym typeface="arial"/>
-                        </a:rPr>
-                        <a:t>238 (59.5%)</a:t>
+                        <a:t>145 (36.2%)</a:t>
                       </a:r>
                     </a:p>
                   </a:txBody>
@@ -5236,7 +5342,7 @@
                           <a:ea typeface="arial"/>
                           <a:sym typeface="arial"/>
                         </a:rPr>
-                        <a:t>dcd B.2.2.3.1</a:t>
+                        <a:t>cl D.1</a:t>
                       </a:r>
                     </a:p>
                   </a:txBody>
@@ -5293,7 +5399,7 @@
                           <a:ea typeface="arial"/>
                           <a:sym typeface="arial"/>
                         </a:rPr>
-                        <a:t>48 (35.8%)</a:t>
+                        <a:t>79 (59.0%)</a:t>
                       </a:r>
                     </a:p>
                   </a:txBody>
@@ -5350,7 +5456,7 @@
                           <a:ea typeface="arial"/>
                           <a:sym typeface="arial"/>
                         </a:rPr>
-                        <a:t>54 (40.3%)</a:t>
+                        <a:t>67 (50.0%)</a:t>
                       </a:r>
                     </a:p>
                   </a:txBody>
@@ -5407,64 +5513,7 @@
                           <a:ea typeface="arial"/>
                           <a:sym typeface="arial"/>
                         </a:rPr>
-                        <a:t>102 (38.1%)</a:t>
-                      </a:r>
-                    </a:p>
-                  </a:txBody>
-                  <a:tcPr anchor="ctr" marB="38100" marT="38100" marR="0" marL="0">
-                    <a:lnL algn="ctr" cmpd="sng" cap="flat" w="0">
-                      <a:noFill/>
-                      <a:prstDash val="solid"/>
-                    </a:lnL>
-                    <a:lnR algn="ctr" cmpd="sng" cap="flat" w="0">
-                      <a:noFill/>
-                      <a:prstDash val="solid"/>
-                    </a:lnR>
-                    <a:lnT algn="ctr" cmpd="sng" cap="flat" w="0">
-                      <a:noFill/>
-                      <a:prstDash val="solid"/>
-                    </a:lnT>
-                    <a:lnB algn="ctr" cmpd="sng" cap="flat" w="0">
-                      <a:noFill/>
-                      <a:prstDash val="solid"/>
-                    </a:lnB>
-                    <a:solidFill>
-                      <a:srgbClr val="FFBD69">
-                        <a:alpha val="100000"/>
-                      </a:srgbClr>
-                    </a:solidFill>
-                  </a:tcPr>
-                </a:tc>
-                <a:tc>
-                  <a:txBody>
-                    <a:bodyPr/>
-                    <a:lstStyle/>
-                    <a:p>
-                      <a:pPr algn="ctr" marL="63500" marR="63500">
-                        <a:lnSpc>
-                          <a:spcPct val="100000"/>
-                        </a:lnSpc>
-                        <a:spcBef>
-                          <a:spcPts val="300"/>
-                        </a:spcBef>
-                        <a:spcAft>
-                          <a:spcPts val="300"/>
-                        </a:spcAft>
-                        <a:buNone/>
-                      </a:pPr>
-                      <a:r>
-                        <a:rPr cap="none" sz="1200" i="0" b="0" u="none">
-                          <a:solidFill>
-                            <a:srgbClr val="000000">
-                              <a:alpha val="100000"/>
-                            </a:srgbClr>
-                          </a:solidFill>
-                          <a:latin typeface="arial"/>
-                          <a:cs typeface="arial"/>
-                          <a:ea typeface="arial"/>
-                          <a:sym typeface="arial"/>
-                        </a:rPr>
-                        <a:t>153 (38.2%)</a:t>
+                        <a:t>226 (56.5%)</a:t>
                       </a:r>
                     </a:p>
                   </a:txBody>
@@ -5523,7 +5572,7 @@
                           <a:ea typeface="arial"/>
                           <a:sym typeface="arial"/>
                         </a:rPr>
-                        <a:t>dcd B.2.1.2.1</a:t>
+                        <a:t>dcd D.1.1.1.1</a:t>
                       </a:r>
                     </a:p>
                   </a:txBody>
@@ -5580,7 +5629,7 @@
                           <a:ea typeface="arial"/>
                           <a:sym typeface="arial"/>
                         </a:rPr>
-                        <a:t>49 (36.6%)</a:t>
+                        <a:t>50 (37.3%)</a:t>
                       </a:r>
                     </a:p>
                   </a:txBody>
@@ -5637,638 +5686,7 @@
                           <a:ea typeface="arial"/>
                           <a:sym typeface="arial"/>
                         </a:rPr>
-                        <a:t>44 (32.8%)</a:t>
-                      </a:r>
-                    </a:p>
-                  </a:txBody>
-                  <a:tcPr anchor="ctr" marB="38100" marT="38100" marR="0" marL="0">
-                    <a:lnL algn="ctr" cmpd="sng" cap="flat" w="0">
-                      <a:noFill/>
-                      <a:prstDash val="solid"/>
-                    </a:lnL>
-                    <a:lnR algn="ctr" cmpd="sng" cap="flat" w="0">
-                      <a:noFill/>
-                      <a:prstDash val="solid"/>
-                    </a:lnR>
-                    <a:lnT algn="ctr" cmpd="sng" cap="flat" w="0">
-                      <a:noFill/>
-                      <a:prstDash val="solid"/>
-                    </a:lnT>
-                    <a:lnB algn="ctr" cmpd="sng" cap="flat" w="0">
-                      <a:noFill/>
-                      <a:prstDash val="solid"/>
-                    </a:lnB>
-                    <a:solidFill>
-                      <a:srgbClr val="FF7D29">
-                        <a:alpha val="100000"/>
-                      </a:srgbClr>
-                    </a:solidFill>
-                  </a:tcPr>
-                </a:tc>
-                <a:tc>
-                  <a:txBody>
-                    <a:bodyPr/>
-                    <a:lstStyle/>
-                    <a:p>
-                      <a:pPr algn="ctr" marL="63500" marR="63500">
-                        <a:lnSpc>
-                          <a:spcPct val="100000"/>
-                        </a:lnSpc>
-                        <a:spcBef>
-                          <a:spcPts val="300"/>
-                        </a:spcBef>
-                        <a:spcAft>
-                          <a:spcPts val="300"/>
-                        </a:spcAft>
-                        <a:buNone/>
-                      </a:pPr>
-                      <a:r>
-                        <a:rPr cap="none" sz="1200" i="0" b="0" u="none">
-                          <a:solidFill>
-                            <a:srgbClr val="000000">
-                              <a:alpha val="100000"/>
-                            </a:srgbClr>
-                          </a:solidFill>
-                          <a:latin typeface="arial"/>
-                          <a:cs typeface="arial"/>
-                          <a:ea typeface="arial"/>
-                          <a:sym typeface="arial"/>
-                        </a:rPr>
-                        <a:t>93 (34.7%)</a:t>
-                      </a:r>
-                    </a:p>
-                  </a:txBody>
-                  <a:tcPr anchor="ctr" marB="38100" marT="38100" marR="0" marL="0">
-                    <a:lnL algn="ctr" cmpd="sng" cap="flat" w="0">
-                      <a:noFill/>
-                      <a:prstDash val="solid"/>
-                    </a:lnL>
-                    <a:lnR algn="ctr" cmpd="sng" cap="flat" w="0">
-                      <a:noFill/>
-                      <a:prstDash val="solid"/>
-                    </a:lnR>
-                    <a:lnT algn="ctr" cmpd="sng" cap="flat" w="0">
-                      <a:noFill/>
-                      <a:prstDash val="solid"/>
-                    </a:lnT>
-                    <a:lnB algn="ctr" cmpd="sng" cap="flat" w="0">
-                      <a:noFill/>
-                      <a:prstDash val="solid"/>
-                    </a:lnB>
-                    <a:solidFill>
-                      <a:srgbClr val="FF7D29">
-                        <a:alpha val="100000"/>
-                      </a:srgbClr>
-                    </a:solidFill>
-                  </a:tcPr>
-                </a:tc>
-                <a:tc>
-                  <a:txBody>
-                    <a:bodyPr/>
-                    <a:lstStyle/>
-                    <a:p>
-                      <a:pPr algn="ctr" marL="63500" marR="63500">
-                        <a:lnSpc>
-                          <a:spcPct val="100000"/>
-                        </a:lnSpc>
-                        <a:spcBef>
-                          <a:spcPts val="300"/>
-                        </a:spcBef>
-                        <a:spcAft>
-                          <a:spcPts val="300"/>
-                        </a:spcAft>
-                        <a:buNone/>
-                      </a:pPr>
-                      <a:r>
-                        <a:rPr cap="none" sz="1200" i="0" b="0" u="none">
-                          <a:solidFill>
-                            <a:srgbClr val="000000">
-                              <a:alpha val="100000"/>
-                            </a:srgbClr>
-                          </a:solidFill>
-                          <a:latin typeface="arial"/>
-                          <a:cs typeface="arial"/>
-                          <a:ea typeface="arial"/>
-                          <a:sym typeface="arial"/>
-                        </a:rPr>
-                        <a:t>145 (36.2%)</a:t>
-                      </a:r>
-                    </a:p>
-                  </a:txBody>
-                  <a:tcPr anchor="ctr" marB="38100" marT="38100" marR="0" marL="0">
-                    <a:lnL algn="ctr" cmpd="sng" cap="flat" w="0">
-                      <a:noFill/>
-                      <a:prstDash val="solid"/>
-                    </a:lnL>
-                    <a:lnR algn="ctr" cmpd="sng" cap="flat" w="0">
-                      <a:noFill/>
-                      <a:prstDash val="solid"/>
-                    </a:lnR>
-                    <a:lnT algn="ctr" cmpd="sng" cap="flat" w="0">
-                      <a:noFill/>
-                      <a:prstDash val="solid"/>
-                    </a:lnT>
-                    <a:lnB algn="ctr" cmpd="sng" cap="flat" w="0">
-                      <a:noFill/>
-                      <a:prstDash val="solid"/>
-                    </a:lnB>
-                    <a:solidFill>
-                      <a:srgbClr val="FF7D29">
-                        <a:alpha val="100000"/>
-                      </a:srgbClr>
-                    </a:solidFill>
-                  </a:tcPr>
-                </a:tc>
-              </a:tr>
-              <a:tr h="243582">
-                <a:tc>
-                  <a:txBody>
-                    <a:bodyPr/>
-                    <a:lstStyle/>
-                    <a:p>
-                      <a:pPr algn="l" marL="127000" marR="63500">
-                        <a:lnSpc>
-                          <a:spcPct val="100000"/>
-                        </a:lnSpc>
-                        <a:spcBef>
-                          <a:spcPts val="300"/>
-                        </a:spcBef>
-                        <a:spcAft>
-                          <a:spcPts val="300"/>
-                        </a:spcAft>
-                        <a:buNone/>
-                      </a:pPr>
-                      <a:r>
-                        <a:rPr cap="none" sz="1200" i="0" b="0" u="none">
-                          <a:solidFill>
-                            <a:srgbClr val="000000">
-                              <a:alpha val="100000"/>
-                            </a:srgbClr>
-                          </a:solidFill>
-                          <a:latin typeface="arial"/>
-                          <a:cs typeface="arial"/>
-                          <a:ea typeface="arial"/>
-                          <a:sym typeface="arial"/>
-                        </a:rPr>
-                        <a:t>cl D.1</a:t>
-                      </a:r>
-                    </a:p>
-                  </a:txBody>
-                  <a:tcPr anchor="ctr" marB="38100" marT="38100" marR="0" marL="0">
-                    <a:lnL algn="ctr" cmpd="sng" cap="flat" w="0">
-                      <a:noFill/>
-                      <a:prstDash val="solid"/>
-                    </a:lnL>
-                    <a:lnR algn="ctr" cmpd="sng" cap="flat" w="0">
-                      <a:noFill/>
-                      <a:prstDash val="solid"/>
-                    </a:lnR>
-                    <a:lnT algn="ctr" cmpd="sng" cap="flat" w="0">
-                      <a:noFill/>
-                      <a:prstDash val="solid"/>
-                    </a:lnT>
-                    <a:lnB algn="ctr" cmpd="sng" cap="flat" w="0">
-                      <a:noFill/>
-                      <a:prstDash val="solid"/>
-                    </a:lnB>
-                    <a:solidFill>
-                      <a:srgbClr val="FFBD69">
-                        <a:alpha val="100000"/>
-                      </a:srgbClr>
-                    </a:solidFill>
-                  </a:tcPr>
-                </a:tc>
-                <a:tc>
-                  <a:txBody>
-                    <a:bodyPr/>
-                    <a:lstStyle/>
-                    <a:p>
-                      <a:pPr algn="ctr" marL="63500" marR="63500">
-                        <a:lnSpc>
-                          <a:spcPct val="100000"/>
-                        </a:lnSpc>
-                        <a:spcBef>
-                          <a:spcPts val="300"/>
-                        </a:spcBef>
-                        <a:spcAft>
-                          <a:spcPts val="300"/>
-                        </a:spcAft>
-                        <a:buNone/>
-                      </a:pPr>
-                      <a:r>
-                        <a:rPr cap="none" sz="1200" i="0" b="0" u="none">
-                          <a:solidFill>
-                            <a:srgbClr val="000000">
-                              <a:alpha val="100000"/>
-                            </a:srgbClr>
-                          </a:solidFill>
-                          <a:latin typeface="arial"/>
-                          <a:cs typeface="arial"/>
-                          <a:ea typeface="arial"/>
-                          <a:sym typeface="arial"/>
-                        </a:rPr>
-                        <a:t>79 (59.0%)</a:t>
-                      </a:r>
-                    </a:p>
-                  </a:txBody>
-                  <a:tcPr anchor="ctr" marB="38100" marT="38100" marR="0" marL="0">
-                    <a:lnL algn="ctr" cmpd="sng" cap="flat" w="0">
-                      <a:noFill/>
-                      <a:prstDash val="solid"/>
-                    </a:lnL>
-                    <a:lnR algn="ctr" cmpd="sng" cap="flat" w="0">
-                      <a:noFill/>
-                      <a:prstDash val="solid"/>
-                    </a:lnR>
-                    <a:lnT algn="ctr" cmpd="sng" cap="flat" w="0">
-                      <a:noFill/>
-                      <a:prstDash val="solid"/>
-                    </a:lnT>
-                    <a:lnB algn="ctr" cmpd="sng" cap="flat" w="0">
-                      <a:noFill/>
-                      <a:prstDash val="solid"/>
-                    </a:lnB>
-                    <a:solidFill>
-                      <a:srgbClr val="FFBD69">
-                        <a:alpha val="100000"/>
-                      </a:srgbClr>
-                    </a:solidFill>
-                  </a:tcPr>
-                </a:tc>
-                <a:tc>
-                  <a:txBody>
-                    <a:bodyPr/>
-                    <a:lstStyle/>
-                    <a:p>
-                      <a:pPr algn="ctr" marL="63500" marR="63500">
-                        <a:lnSpc>
-                          <a:spcPct val="100000"/>
-                        </a:lnSpc>
-                        <a:spcBef>
-                          <a:spcPts val="300"/>
-                        </a:spcBef>
-                        <a:spcAft>
-                          <a:spcPts val="300"/>
-                        </a:spcAft>
-                        <a:buNone/>
-                      </a:pPr>
-                      <a:r>
-                        <a:rPr cap="none" sz="1200" i="0" b="0" u="none">
-                          <a:solidFill>
-                            <a:srgbClr val="000000">
-                              <a:alpha val="100000"/>
-                            </a:srgbClr>
-                          </a:solidFill>
-                          <a:latin typeface="arial"/>
-                          <a:cs typeface="arial"/>
-                          <a:ea typeface="arial"/>
-                          <a:sym typeface="arial"/>
-                        </a:rPr>
-                        <a:t>67 (50.0%)</a:t>
-                      </a:r>
-                    </a:p>
-                  </a:txBody>
-                  <a:tcPr anchor="ctr" marB="38100" marT="38100" marR="0" marL="0">
-                    <a:lnL algn="ctr" cmpd="sng" cap="flat" w="0">
-                      <a:noFill/>
-                      <a:prstDash val="solid"/>
-                    </a:lnL>
-                    <a:lnR algn="ctr" cmpd="sng" cap="flat" w="0">
-                      <a:noFill/>
-                      <a:prstDash val="solid"/>
-                    </a:lnR>
-                    <a:lnT algn="ctr" cmpd="sng" cap="flat" w="0">
-                      <a:noFill/>
-                      <a:prstDash val="solid"/>
-                    </a:lnT>
-                    <a:lnB algn="ctr" cmpd="sng" cap="flat" w="0">
-                      <a:noFill/>
-                      <a:prstDash val="solid"/>
-                    </a:lnB>
-                    <a:solidFill>
-                      <a:srgbClr val="FFBD69">
-                        <a:alpha val="100000"/>
-                      </a:srgbClr>
-                    </a:solidFill>
-                  </a:tcPr>
-                </a:tc>
-                <a:tc>
-                  <a:txBody>
-                    <a:bodyPr/>
-                    <a:lstStyle/>
-                    <a:p>
-                      <a:pPr algn="ctr" marL="63500" marR="63500">
-                        <a:lnSpc>
-                          <a:spcPct val="100000"/>
-                        </a:lnSpc>
-                        <a:spcBef>
-                          <a:spcPts val="300"/>
-                        </a:spcBef>
-                        <a:spcAft>
-                          <a:spcPts val="300"/>
-                        </a:spcAft>
-                        <a:buNone/>
-                      </a:pPr>
-                      <a:r>
-                        <a:rPr cap="none" sz="1200" i="0" b="0" u="none">
-                          <a:solidFill>
-                            <a:srgbClr val="000000">
-                              <a:alpha val="100000"/>
-                            </a:srgbClr>
-                          </a:solidFill>
-                          <a:latin typeface="arial"/>
-                          <a:cs typeface="arial"/>
-                          <a:ea typeface="arial"/>
-                          <a:sym typeface="arial"/>
-                        </a:rPr>
-                        <a:t>146 (54.5%)</a:t>
-                      </a:r>
-                    </a:p>
-                  </a:txBody>
-                  <a:tcPr anchor="ctr" marB="38100" marT="38100" marR="0" marL="0">
-                    <a:lnL algn="ctr" cmpd="sng" cap="flat" w="0">
-                      <a:noFill/>
-                      <a:prstDash val="solid"/>
-                    </a:lnL>
-                    <a:lnR algn="ctr" cmpd="sng" cap="flat" w="0">
-                      <a:noFill/>
-                      <a:prstDash val="solid"/>
-                    </a:lnR>
-                    <a:lnT algn="ctr" cmpd="sng" cap="flat" w="0">
-                      <a:noFill/>
-                      <a:prstDash val="solid"/>
-                    </a:lnT>
-                    <a:lnB algn="ctr" cmpd="sng" cap="flat" w="0">
-                      <a:noFill/>
-                      <a:prstDash val="solid"/>
-                    </a:lnB>
-                    <a:solidFill>
-                      <a:srgbClr val="FFBD69">
-                        <a:alpha val="100000"/>
-                      </a:srgbClr>
-                    </a:solidFill>
-                  </a:tcPr>
-                </a:tc>
-                <a:tc>
-                  <a:txBody>
-                    <a:bodyPr/>
-                    <a:lstStyle/>
-                    <a:p>
-                      <a:pPr algn="ctr" marL="63500" marR="63500">
-                        <a:lnSpc>
-                          <a:spcPct val="100000"/>
-                        </a:lnSpc>
-                        <a:spcBef>
-                          <a:spcPts val="300"/>
-                        </a:spcBef>
-                        <a:spcAft>
-                          <a:spcPts val="300"/>
-                        </a:spcAft>
-                        <a:buNone/>
-                      </a:pPr>
-                      <a:r>
-                        <a:rPr cap="none" sz="1200" i="0" b="0" u="none">
-                          <a:solidFill>
-                            <a:srgbClr val="000000">
-                              <a:alpha val="100000"/>
-                            </a:srgbClr>
-                          </a:solidFill>
-                          <a:latin typeface="arial"/>
-                          <a:cs typeface="arial"/>
-                          <a:ea typeface="arial"/>
-                          <a:sym typeface="arial"/>
-                        </a:rPr>
-                        <a:t>226 (56.5%)</a:t>
-                      </a:r>
-                    </a:p>
-                  </a:txBody>
-                  <a:tcPr anchor="ctr" marB="38100" marT="38100" marR="0" marL="0">
-                    <a:lnL algn="ctr" cmpd="sng" cap="flat" w="0">
-                      <a:noFill/>
-                      <a:prstDash val="solid"/>
-                    </a:lnL>
-                    <a:lnR algn="ctr" cmpd="sng" cap="flat" w="0">
-                      <a:noFill/>
-                      <a:prstDash val="solid"/>
-                    </a:lnR>
-                    <a:lnT algn="ctr" cmpd="sng" cap="flat" w="0">
-                      <a:noFill/>
-                      <a:prstDash val="solid"/>
-                    </a:lnT>
-                    <a:lnB algn="ctr" cmpd="sng" cap="flat" w="0">
-                      <a:noFill/>
-                      <a:prstDash val="solid"/>
-                    </a:lnB>
-                    <a:solidFill>
-                      <a:srgbClr val="FFBD69">
-                        <a:alpha val="100000"/>
-                      </a:srgbClr>
-                    </a:solidFill>
-                  </a:tcPr>
-                </a:tc>
-              </a:tr>
-              <a:tr h="243582">
-                <a:tc>
-                  <a:txBody>
-                    <a:bodyPr/>
-                    <a:lstStyle/>
-                    <a:p>
-                      <a:pPr algn="l" marL="127000" marR="63500">
-                        <a:lnSpc>
-                          <a:spcPct val="100000"/>
-                        </a:lnSpc>
-                        <a:spcBef>
-                          <a:spcPts val="300"/>
-                        </a:spcBef>
-                        <a:spcAft>
-                          <a:spcPts val="300"/>
-                        </a:spcAft>
-                        <a:buNone/>
-                      </a:pPr>
-                      <a:r>
-                        <a:rPr cap="none" sz="1200" i="0" b="0" u="none">
-                          <a:solidFill>
-                            <a:srgbClr val="000000">
-                              <a:alpha val="100000"/>
-                            </a:srgbClr>
-                          </a:solidFill>
-                          <a:latin typeface="arial"/>
-                          <a:cs typeface="arial"/>
-                          <a:ea typeface="arial"/>
-                          <a:sym typeface="arial"/>
-                        </a:rPr>
-                        <a:t>dcd D.1.1.1.1</a:t>
-                      </a:r>
-                    </a:p>
-                  </a:txBody>
-                  <a:tcPr anchor="ctr" marB="38100" marT="38100" marR="0" marL="0">
-                    <a:lnL algn="ctr" cmpd="sng" cap="flat" w="0">
-                      <a:noFill/>
-                      <a:prstDash val="solid"/>
-                    </a:lnL>
-                    <a:lnR algn="ctr" cmpd="sng" cap="flat" w="0">
-                      <a:noFill/>
-                      <a:prstDash val="solid"/>
-                    </a:lnR>
-                    <a:lnT algn="ctr" cmpd="sng" cap="flat" w="0">
-                      <a:noFill/>
-                      <a:prstDash val="solid"/>
-                    </a:lnT>
-                    <a:lnB algn="ctr" cmpd="sng" cap="flat" w="0">
-                      <a:noFill/>
-                      <a:prstDash val="solid"/>
-                    </a:lnB>
-                    <a:solidFill>
-                      <a:srgbClr val="FF7D29">
-                        <a:alpha val="100000"/>
-                      </a:srgbClr>
-                    </a:solidFill>
-                  </a:tcPr>
-                </a:tc>
-                <a:tc>
-                  <a:txBody>
-                    <a:bodyPr/>
-                    <a:lstStyle/>
-                    <a:p>
-                      <a:pPr algn="ctr" marL="63500" marR="63500">
-                        <a:lnSpc>
-                          <a:spcPct val="100000"/>
-                        </a:lnSpc>
-                        <a:spcBef>
-                          <a:spcPts val="300"/>
-                        </a:spcBef>
-                        <a:spcAft>
-                          <a:spcPts val="300"/>
-                        </a:spcAft>
-                        <a:buNone/>
-                      </a:pPr>
-                      <a:r>
-                        <a:rPr cap="none" sz="1200" i="0" b="0" u="none">
-                          <a:solidFill>
-                            <a:srgbClr val="000000">
-                              <a:alpha val="100000"/>
-                            </a:srgbClr>
-                          </a:solidFill>
-                          <a:latin typeface="arial"/>
-                          <a:cs typeface="arial"/>
-                          <a:ea typeface="arial"/>
-                          <a:sym typeface="arial"/>
-                        </a:rPr>
-                        <a:t>50 (37.3%)</a:t>
-                      </a:r>
-                    </a:p>
-                  </a:txBody>
-                  <a:tcPr anchor="ctr" marB="38100" marT="38100" marR="0" marL="0">
-                    <a:lnL algn="ctr" cmpd="sng" cap="flat" w="0">
-                      <a:noFill/>
-                      <a:prstDash val="solid"/>
-                    </a:lnL>
-                    <a:lnR algn="ctr" cmpd="sng" cap="flat" w="0">
-                      <a:noFill/>
-                      <a:prstDash val="solid"/>
-                    </a:lnR>
-                    <a:lnT algn="ctr" cmpd="sng" cap="flat" w="0">
-                      <a:noFill/>
-                      <a:prstDash val="solid"/>
-                    </a:lnT>
-                    <a:lnB algn="ctr" cmpd="sng" cap="flat" w="0">
-                      <a:noFill/>
-                      <a:prstDash val="solid"/>
-                    </a:lnB>
-                    <a:solidFill>
-                      <a:srgbClr val="FF7D29">
-                        <a:alpha val="100000"/>
-                      </a:srgbClr>
-                    </a:solidFill>
-                  </a:tcPr>
-                </a:tc>
-                <a:tc>
-                  <a:txBody>
-                    <a:bodyPr/>
-                    <a:lstStyle/>
-                    <a:p>
-                      <a:pPr algn="ctr" marL="63500" marR="63500">
-                        <a:lnSpc>
-                          <a:spcPct val="100000"/>
-                        </a:lnSpc>
-                        <a:spcBef>
-                          <a:spcPts val="300"/>
-                        </a:spcBef>
-                        <a:spcAft>
-                          <a:spcPts val="300"/>
-                        </a:spcAft>
-                        <a:buNone/>
-                      </a:pPr>
-                      <a:r>
-                        <a:rPr cap="none" sz="1200" i="0" b="0" u="none">
-                          <a:solidFill>
-                            <a:srgbClr val="000000">
-                              <a:alpha val="100000"/>
-                            </a:srgbClr>
-                          </a:solidFill>
-                          <a:latin typeface="arial"/>
-                          <a:cs typeface="arial"/>
-                          <a:ea typeface="arial"/>
-                          <a:sym typeface="arial"/>
-                        </a:rPr>
                         <a:t>42 (31.3%)</a:t>
-                      </a:r>
-                    </a:p>
-                  </a:txBody>
-                  <a:tcPr anchor="ctr" marB="38100" marT="38100" marR="0" marL="0">
-                    <a:lnL algn="ctr" cmpd="sng" cap="flat" w="0">
-                      <a:noFill/>
-                      <a:prstDash val="solid"/>
-                    </a:lnL>
-                    <a:lnR algn="ctr" cmpd="sng" cap="flat" w="0">
-                      <a:noFill/>
-                      <a:prstDash val="solid"/>
-                    </a:lnR>
-                    <a:lnT algn="ctr" cmpd="sng" cap="flat" w="0">
-                      <a:noFill/>
-                      <a:prstDash val="solid"/>
-                    </a:lnT>
-                    <a:lnB algn="ctr" cmpd="sng" cap="flat" w="0">
-                      <a:noFill/>
-                      <a:prstDash val="solid"/>
-                    </a:lnB>
-                    <a:solidFill>
-                      <a:srgbClr val="FF7D29">
-                        <a:alpha val="100000"/>
-                      </a:srgbClr>
-                    </a:solidFill>
-                  </a:tcPr>
-                </a:tc>
-                <a:tc>
-                  <a:txBody>
-                    <a:bodyPr/>
-                    <a:lstStyle/>
-                    <a:p>
-                      <a:pPr algn="ctr" marL="63500" marR="63500">
-                        <a:lnSpc>
-                          <a:spcPct val="100000"/>
-                        </a:lnSpc>
-                        <a:spcBef>
-                          <a:spcPts val="300"/>
-                        </a:spcBef>
-                        <a:spcAft>
-                          <a:spcPts val="300"/>
-                        </a:spcAft>
-                        <a:buNone/>
-                      </a:pPr>
-                      <a:r>
-                        <a:rPr cap="none" sz="1200" i="0" b="0" u="none">
-                          <a:solidFill>
-                            <a:srgbClr val="000000">
-                              <a:alpha val="100000"/>
-                            </a:srgbClr>
-                          </a:solidFill>
-                          <a:latin typeface="arial"/>
-                          <a:cs typeface="arial"/>
-                          <a:ea typeface="arial"/>
-                          <a:sym typeface="arial"/>
-                        </a:rPr>
-                        <a:t>92 (34.3%)</a:t>
                       </a:r>
                     </a:p>
                   </a:txBody>
@@ -6555,63 +5973,6 @@
                           <a:ea typeface="arial"/>
                           <a:sym typeface="arial"/>
                         </a:rPr>
-                        <a:t>90 (33.6%)</a:t>
-                      </a:r>
-                    </a:p>
-                  </a:txBody>
-                  <a:tcPr anchor="ctr" marB="38100" marT="38100" marR="0" marL="0">
-                    <a:lnL algn="ctr" cmpd="sng" cap="flat" w="0">
-                      <a:noFill/>
-                      <a:prstDash val="solid"/>
-                    </a:lnL>
-                    <a:lnR algn="ctr" cmpd="sng" cap="flat" w="0">
-                      <a:noFill/>
-                      <a:prstDash val="solid"/>
-                    </a:lnR>
-                    <a:lnT algn="ctr" cmpd="sng" cap="flat" w="0">
-                      <a:noFill/>
-                      <a:prstDash val="solid"/>
-                    </a:lnT>
-                    <a:lnB algn="ctr" cmpd="sng" cap="flat" w="0">
-                      <a:noFill/>
-                      <a:prstDash val="solid"/>
-                    </a:lnB>
-                    <a:solidFill>
-                      <a:srgbClr val="FFBD69">
-                        <a:alpha val="100000"/>
-                      </a:srgbClr>
-                    </a:solidFill>
-                  </a:tcPr>
-                </a:tc>
-                <a:tc>
-                  <a:txBody>
-                    <a:bodyPr/>
-                    <a:lstStyle/>
-                    <a:p>
-                      <a:pPr algn="ctr" marL="63500" marR="63500">
-                        <a:lnSpc>
-                          <a:spcPct val="100000"/>
-                        </a:lnSpc>
-                        <a:spcBef>
-                          <a:spcPts val="300"/>
-                        </a:spcBef>
-                        <a:spcAft>
-                          <a:spcPts val="300"/>
-                        </a:spcAft>
-                        <a:buNone/>
-                      </a:pPr>
-                      <a:r>
-                        <a:rPr cap="none" sz="1200" i="0" b="0" u="none">
-                          <a:solidFill>
-                            <a:srgbClr val="000000">
-                              <a:alpha val="100000"/>
-                            </a:srgbClr>
-                          </a:solidFill>
-                          <a:latin typeface="arial"/>
-                          <a:cs typeface="arial"/>
-                          <a:ea typeface="arial"/>
-                          <a:sym typeface="arial"/>
-                        </a:rPr>
                         <a:t>140 (35.0%)</a:t>
                       </a:r>
                     </a:p>
@@ -6642,7 +6003,7 @@
                 </a:tc>
               </a:tr>
               <a:tr h="228600">
-                <a:tc gridSpan="5">
+                <a:tc gridSpan="4">
                   <a:txBody>
                     <a:bodyPr/>
                     <a:lstStyle/>
@@ -6945,74 +6306,6 @@
                     </a:solidFill>
                   </a:tcPr>
                 </a:tc>
-                <a:tc hMerge="true">
-                  <a:txBody>
-                    <a:bodyPr/>
-                    <a:lstStyle/>
-                    <a:p>
-                      <a:pPr algn="l" marL="63500" marR="63500">
-                        <a:lnSpc>
-                          <a:spcPct val="100000"/>
-                        </a:lnSpc>
-                        <a:spcBef>
-                          <a:spcPts val="500"/>
-                        </a:spcBef>
-                        <a:spcAft>
-                          <a:spcPts val="500"/>
-                        </a:spcAft>
-                        <a:buNone/>
-                      </a:pPr>
-                      <a:endParaRPr cap="none" sz="1100" i="0" b="0" u="none">
-                        <a:solidFill>
-                          <a:srgbClr val="000000">
-                            <a:alpha val="100000"/>
-                          </a:srgbClr>
-                        </a:solidFill>
-                        <a:latin typeface="DejaVu Sans"/>
-                        <a:cs typeface="DejaVu Sans"/>
-                        <a:ea typeface="DejaVu Sans"/>
-                        <a:sym typeface="DejaVu Sans"/>
-                      </a:endParaRPr>
-                      <a:r>
-                        <a:rPr cap="none" sz="1100" i="0" b="0" u="none">
-                          <a:solidFill>
-                            <a:srgbClr val="000000">
-                              <a:alpha val="100000"/>
-                            </a:srgbClr>
-                          </a:solidFill>
-                          <a:latin typeface="DejaVu Sans"/>
-                          <a:cs typeface="DejaVu Sans"/>
-                          <a:ea typeface="DejaVu Sans"/>
-                          <a:sym typeface="DejaVu Sans"/>
-                        </a:rPr>
-                        <a:t/>
-                      </a:r>
-                    </a:p>
-                  </a:txBody>
-                  <a:tcPr anchor="ctr" marB="63500" marT="63500" marR="0" marL="0">
-                    <a:lnL algn="ctr" cmpd="sng" cap="flat" w="0">
-                      <a:noFill/>
-                      <a:prstDash val="solid"/>
-                    </a:lnL>
-                    <a:lnR algn="ctr" cmpd="sng" cap="flat" w="0">
-                      <a:noFill/>
-                      <a:prstDash val="solid"/>
-                    </a:lnR>
-                    <a:lnT algn="ctr" cmpd="sng" cap="flat" w="0">
-                      <a:noFill/>
-                      <a:prstDash val="solid"/>
-                    </a:lnT>
-                    <a:lnB algn="ctr" cmpd="sng" cap="flat" w="0">
-                      <a:noFill/>
-                      <a:prstDash val="solid"/>
-                    </a:lnB>
-                    <a:solidFill>
-                      <a:srgbClr val="FFFFFF">
-                        <a:alpha val="0"/>
-                      </a:srgbClr>
-                    </a:solidFill>
-                  </a:tcPr>
-                </a:tc>
               </a:tr>
             </a:tbl>
           </a:graphicData>
@@ -7101,7 +6394,7 @@
           <p:nvPr/>
         </p:nvGraphicFramePr>
         <p:xfrm rot="0">
-          <a:off x="2608556" y="1165860"/>
+          <a:off x="3154062" y="1165860"/>
           <a:ext cx="3657600" cy="2743200"/>
         </p:xfrm>
         <a:graphic>
@@ -7110,10 +6403,9 @@
               <a:tblPr/>
               <a:tblGrid>
                 <a:gridCol w="2780359"/>
-                <a:gridCol w="1048632"/>
-                <a:gridCol w="1048632"/>
-                <a:gridCol w="1048632"/>
-                <a:gridCol w="1048632"/>
+                <a:gridCol w="1034506"/>
+                <a:gridCol w="1034506"/>
+                <a:gridCol w="1034506"/>
               </a:tblGrid>
               <a:tr h="268114">
                 <a:tc>
@@ -7160,74 +6452,6 @@
                           <a:sym typeface="arial"/>
                         </a:rPr>
                         <a:t> </a:t>
-                      </a:r>
-                    </a:p>
-                  </a:txBody>
-                  <a:tcPr anchor="ctr" marB="38100" marT="38100" marR="0" marL="0">
-                    <a:lnL algn="ctr" cmpd="sng" cap="flat" w="0">
-                      <a:noFill/>
-                      <a:prstDash val="solid"/>
-                    </a:lnL>
-                    <a:lnR algn="ctr" cmpd="sng" cap="flat" w="0">
-                      <a:noFill/>
-                      <a:prstDash val="solid"/>
-                    </a:lnR>
-                    <a:lnT algn="ctr" cmpd="sng" cap="flat" w="0">
-                      <a:noFill/>
-                      <a:prstDash val="solid"/>
-                    </a:lnT>
-                    <a:lnB algn="ctr" cmpd="sng" cap="flat" w="0">
-                      <a:noFill/>
-                      <a:prstDash val="solid"/>
-                    </a:lnB>
-                    <a:solidFill>
-                      <a:srgbClr val="ED4A0D">
-                        <a:alpha val="100000"/>
-                      </a:srgbClr>
-                    </a:solidFill>
-                  </a:tcPr>
-                </a:tc>
-                <a:tc>
-                  <a:txBody>
-                    <a:bodyPr/>
-                    <a:lstStyle/>
-                    <a:p>
-                      <a:pPr algn="ctr" marL="63500" marR="63500">
-                        <a:lnSpc>
-                          <a:spcPct val="100000"/>
-                        </a:lnSpc>
-                        <a:spcBef>
-                          <a:spcPts val="300"/>
-                        </a:spcBef>
-                        <a:spcAft>
-                          <a:spcPts val="300"/>
-                        </a:spcAft>
-                        <a:buNone/>
-                      </a:pPr>
-                      <a:endParaRPr cap="none" sz="1400" i="0" b="1" u="none">
-                        <a:solidFill>
-                          <a:srgbClr val="FFFFFF">
-                            <a:alpha val="100000"/>
-                          </a:srgbClr>
-                        </a:solidFill>
-                        <a:latin typeface="arial"/>
-                        <a:cs typeface="arial"/>
-                        <a:ea typeface="arial"/>
-                        <a:sym typeface="arial"/>
-                      </a:endParaRPr>
-                      <a:r>
-                        <a:rPr cap="none" sz="1400" i="0" b="1" u="none">
-                          <a:solidFill>
-                            <a:srgbClr val="FFFFFF">
-                              <a:alpha val="100000"/>
-                            </a:srgbClr>
-                          </a:solidFill>
-                          <a:latin typeface="arial"/>
-                          <a:cs typeface="arial"/>
-                          <a:ea typeface="arial"/>
-                          <a:sym typeface="arial"/>
-                        </a:rPr>
-                        <a:t/>
                       </a:r>
                     </a:p>
                   </a:txBody>
@@ -7689,6 +6913,65 @@
                     </a:solidFill>
                   </a:tcPr>
                 </a:tc>
+              </a:tr>
+              <a:tr h="243582">
+                <a:tc>
+                  <a:txBody>
+                    <a:bodyPr/>
+                    <a:lstStyle/>
+                    <a:p>
+                      <a:pPr algn="l" marL="127000" marR="63500">
+                        <a:lnSpc>
+                          <a:spcPct val="100000"/>
+                        </a:lnSpc>
+                        <a:spcBef>
+                          <a:spcPts val="300"/>
+                        </a:spcBef>
+                        <a:spcAft>
+                          <a:spcPts val="300"/>
+                        </a:spcAft>
+                        <a:buNone/>
+                      </a:pPr>
+                      <a:r>
+                        <a:rPr cap="none" sz="1200" i="0" b="0" u="none">
+                          <a:solidFill>
+                            <a:srgbClr val="000000">
+                              <a:alpha val="100000"/>
+                            </a:srgbClr>
+                          </a:solidFill>
+                          <a:latin typeface="arial"/>
+                          <a:cs typeface="arial"/>
+                          <a:ea typeface="arial"/>
+                          <a:sym typeface="arial"/>
+                        </a:rPr>
+                        <a:t>cl D.2</a:t>
+                      </a:r>
+                    </a:p>
+                  </a:txBody>
+                  <a:tcPr anchor="ctr" marB="38100" marT="38100" marR="0" marL="0">
+                    <a:lnL algn="ctr" cmpd="sng" cap="flat" w="0">
+                      <a:noFill/>
+                      <a:prstDash val="solid"/>
+                    </a:lnL>
+                    <a:lnR algn="ctr" cmpd="sng" cap="flat" w="0">
+                      <a:noFill/>
+                      <a:prstDash val="solid"/>
+                    </a:lnR>
+                    <a:lnT algn="ctr" cmpd="sng" cap="flat" w="0">
+                      <a:noFill/>
+                      <a:prstDash val="solid"/>
+                    </a:lnT>
+                    <a:lnB algn="ctr" cmpd="sng" cap="flat" w="0">
+                      <a:noFill/>
+                      <a:prstDash val="solid"/>
+                    </a:lnB>
+                    <a:solidFill>
+                      <a:srgbClr val="FFBD69">
+                        <a:alpha val="100000"/>
+                      </a:srgbClr>
+                    </a:solidFill>
+                  </a:tcPr>
+                </a:tc>
                 <a:tc>
                   <a:txBody>
                     <a:bodyPr/>
@@ -7718,7 +7001,351 @@
                           <a:ea typeface="arial"/>
                           <a:sym typeface="arial"/>
                         </a:rPr>
-                        <a:t>All Patients</a:t>
+                        <a:t>47 (35.1%)</a:t>
+                      </a:r>
+                    </a:p>
+                  </a:txBody>
+                  <a:tcPr anchor="ctr" marB="38100" marT="38100" marR="0" marL="0">
+                    <a:lnL algn="ctr" cmpd="sng" cap="flat" w="0">
+                      <a:noFill/>
+                      <a:prstDash val="solid"/>
+                    </a:lnL>
+                    <a:lnR algn="ctr" cmpd="sng" cap="flat" w="0">
+                      <a:noFill/>
+                      <a:prstDash val="solid"/>
+                    </a:lnR>
+                    <a:lnT algn="ctr" cmpd="sng" cap="flat" w="0">
+                      <a:noFill/>
+                      <a:prstDash val="solid"/>
+                    </a:lnT>
+                    <a:lnB algn="ctr" cmpd="sng" cap="flat" w="0">
+                      <a:noFill/>
+                      <a:prstDash val="solid"/>
+                    </a:lnB>
+                    <a:solidFill>
+                      <a:srgbClr val="FFBD69">
+                        <a:alpha val="100000"/>
+                      </a:srgbClr>
+                    </a:solidFill>
+                  </a:tcPr>
+                </a:tc>
+                <a:tc>
+                  <a:txBody>
+                    <a:bodyPr/>
+                    <a:lstStyle/>
+                    <a:p>
+                      <a:pPr algn="ctr" marL="63500" marR="63500">
+                        <a:lnSpc>
+                          <a:spcPct val="100000"/>
+                        </a:lnSpc>
+                        <a:spcBef>
+                          <a:spcPts val="300"/>
+                        </a:spcBef>
+                        <a:spcAft>
+                          <a:spcPts val="300"/>
+                        </a:spcAft>
+                        <a:buNone/>
+                      </a:pPr>
+                      <a:r>
+                        <a:rPr cap="none" sz="1200" i="0" b="0" u="none">
+                          <a:solidFill>
+                            <a:srgbClr val="000000">
+                              <a:alpha val="100000"/>
+                            </a:srgbClr>
+                          </a:solidFill>
+                          <a:latin typeface="arial"/>
+                          <a:cs typeface="arial"/>
+                          <a:ea typeface="arial"/>
+                          <a:sym typeface="arial"/>
+                        </a:rPr>
+                        <a:t>58 (43.3%)</a:t>
+                      </a:r>
+                    </a:p>
+                  </a:txBody>
+                  <a:tcPr anchor="ctr" marB="38100" marT="38100" marR="0" marL="0">
+                    <a:lnL algn="ctr" cmpd="sng" cap="flat" w="0">
+                      <a:noFill/>
+                      <a:prstDash val="solid"/>
+                    </a:lnL>
+                    <a:lnR algn="ctr" cmpd="sng" cap="flat" w="0">
+                      <a:noFill/>
+                      <a:prstDash val="solid"/>
+                    </a:lnR>
+                    <a:lnT algn="ctr" cmpd="sng" cap="flat" w="0">
+                      <a:noFill/>
+                      <a:prstDash val="solid"/>
+                    </a:lnT>
+                    <a:lnB algn="ctr" cmpd="sng" cap="flat" w="0">
+                      <a:noFill/>
+                      <a:prstDash val="solid"/>
+                    </a:lnB>
+                    <a:solidFill>
+                      <a:srgbClr val="FFBD69">
+                        <a:alpha val="100000"/>
+                      </a:srgbClr>
+                    </a:solidFill>
+                  </a:tcPr>
+                </a:tc>
+                <a:tc>
+                  <a:txBody>
+                    <a:bodyPr/>
+                    <a:lstStyle/>
+                    <a:p>
+                      <a:pPr algn="ctr" marL="63500" marR="63500">
+                        <a:lnSpc>
+                          <a:spcPct val="100000"/>
+                        </a:lnSpc>
+                        <a:spcBef>
+                          <a:spcPts val="300"/>
+                        </a:spcBef>
+                        <a:spcAft>
+                          <a:spcPts val="300"/>
+                        </a:spcAft>
+                        <a:buNone/>
+                      </a:pPr>
+                      <a:r>
+                        <a:rPr cap="none" sz="1200" i="0" b="0" u="none">
+                          <a:solidFill>
+                            <a:srgbClr val="000000">
+                              <a:alpha val="100000"/>
+                            </a:srgbClr>
+                          </a:solidFill>
+                          <a:latin typeface="arial"/>
+                          <a:cs typeface="arial"/>
+                          <a:ea typeface="arial"/>
+                          <a:sym typeface="arial"/>
+                        </a:rPr>
+                        <a:t>162 (40.5%)</a:t>
+                      </a:r>
+                    </a:p>
+                  </a:txBody>
+                  <a:tcPr anchor="ctr" marB="38100" marT="38100" marR="0" marL="0">
+                    <a:lnL algn="ctr" cmpd="sng" cap="flat" w="0">
+                      <a:noFill/>
+                      <a:prstDash val="solid"/>
+                    </a:lnL>
+                    <a:lnR algn="ctr" cmpd="sng" cap="flat" w="0">
+                      <a:noFill/>
+                      <a:prstDash val="solid"/>
+                    </a:lnR>
+                    <a:lnT algn="ctr" cmpd="sng" cap="flat" w="0">
+                      <a:noFill/>
+                      <a:prstDash val="solid"/>
+                    </a:lnT>
+                    <a:lnB algn="ctr" cmpd="sng" cap="flat" w="0">
+                      <a:noFill/>
+                      <a:prstDash val="solid"/>
+                    </a:lnB>
+                    <a:solidFill>
+                      <a:srgbClr val="FFBD69">
+                        <a:alpha val="100000"/>
+                      </a:srgbClr>
+                    </a:solidFill>
+                  </a:tcPr>
+                </a:tc>
+              </a:tr>
+              <a:tr h="243582">
+                <a:tc>
+                  <a:txBody>
+                    <a:bodyPr/>
+                    <a:lstStyle/>
+                    <a:p>
+                      <a:pPr algn="l" marL="127000" marR="63500">
+                        <a:lnSpc>
+                          <a:spcPct val="100000"/>
+                        </a:lnSpc>
+                        <a:spcBef>
+                          <a:spcPts val="300"/>
+                        </a:spcBef>
+                        <a:spcAft>
+                          <a:spcPts val="300"/>
+                        </a:spcAft>
+                        <a:buNone/>
+                      </a:pPr>
+                      <a:r>
+                        <a:rPr cap="none" sz="1200" i="0" b="0" u="none">
+                          <a:solidFill>
+                            <a:srgbClr val="000000">
+                              <a:alpha val="100000"/>
+                            </a:srgbClr>
+                          </a:solidFill>
+                          <a:latin typeface="arial"/>
+                          <a:cs typeface="arial"/>
+                          <a:ea typeface="arial"/>
+                          <a:sym typeface="arial"/>
+                        </a:rPr>
+                        <a:t>dcd D.2.1.5.3</a:t>
+                      </a:r>
+                    </a:p>
+                  </a:txBody>
+                  <a:tcPr anchor="ctr" marB="38100" marT="38100" marR="0" marL="0">
+                    <a:lnL algn="ctr" cmpd="sng" cap="flat" w="0">
+                      <a:noFill/>
+                      <a:prstDash val="solid"/>
+                    </a:lnL>
+                    <a:lnR algn="ctr" cmpd="sng" cap="flat" w="0">
+                      <a:noFill/>
+                      <a:prstDash val="solid"/>
+                    </a:lnR>
+                    <a:lnT algn="ctr" cmpd="sng" cap="flat" w="0">
+                      <a:noFill/>
+                      <a:prstDash val="solid"/>
+                    </a:lnT>
+                    <a:lnB algn="ctr" cmpd="sng" cap="flat" w="0">
+                      <a:noFill/>
+                      <a:prstDash val="solid"/>
+                    </a:lnB>
+                    <a:solidFill>
+                      <a:srgbClr val="FF7D29">
+                        <a:alpha val="100000"/>
+                      </a:srgbClr>
+                    </a:solidFill>
+                  </a:tcPr>
+                </a:tc>
+                <a:tc>
+                  <a:txBody>
+                    <a:bodyPr/>
+                    <a:lstStyle/>
+                    <a:p>
+                      <a:pPr algn="ctr" marL="63500" marR="63500">
+                        <a:lnSpc>
+                          <a:spcPct val="100000"/>
+                        </a:lnSpc>
+                        <a:spcBef>
+                          <a:spcPts val="300"/>
+                        </a:spcBef>
+                        <a:spcAft>
+                          <a:spcPts val="300"/>
+                        </a:spcAft>
+                        <a:buNone/>
+                      </a:pPr>
+                      <a:r>
+                        <a:rPr cap="none" sz="1200" i="0" b="0" u="none">
+                          <a:solidFill>
+                            <a:srgbClr val="000000">
+                              <a:alpha val="100000"/>
+                            </a:srgbClr>
+                          </a:solidFill>
+                          <a:latin typeface="arial"/>
+                          <a:cs typeface="arial"/>
+                          <a:ea typeface="arial"/>
+                          <a:sym typeface="arial"/>
+                        </a:rPr>
+                        <a:t>47 (35.1%)</a:t>
+                      </a:r>
+                    </a:p>
+                  </a:txBody>
+                  <a:tcPr anchor="ctr" marB="38100" marT="38100" marR="0" marL="0">
+                    <a:lnL algn="ctr" cmpd="sng" cap="flat" w="0">
+                      <a:noFill/>
+                      <a:prstDash val="solid"/>
+                    </a:lnL>
+                    <a:lnR algn="ctr" cmpd="sng" cap="flat" w="0">
+                      <a:noFill/>
+                      <a:prstDash val="solid"/>
+                    </a:lnR>
+                    <a:lnT algn="ctr" cmpd="sng" cap="flat" w="0">
+                      <a:noFill/>
+                      <a:prstDash val="solid"/>
+                    </a:lnT>
+                    <a:lnB algn="ctr" cmpd="sng" cap="flat" w="0">
+                      <a:noFill/>
+                      <a:prstDash val="solid"/>
+                    </a:lnB>
+                    <a:solidFill>
+                      <a:srgbClr val="FF7D29">
+                        <a:alpha val="100000"/>
+                      </a:srgbClr>
+                    </a:solidFill>
+                  </a:tcPr>
+                </a:tc>
+                <a:tc>
+                  <a:txBody>
+                    <a:bodyPr/>
+                    <a:lstStyle/>
+                    <a:p>
+                      <a:pPr algn="ctr" marL="63500" marR="63500">
+                        <a:lnSpc>
+                          <a:spcPct val="100000"/>
+                        </a:lnSpc>
+                        <a:spcBef>
+                          <a:spcPts val="300"/>
+                        </a:spcBef>
+                        <a:spcAft>
+                          <a:spcPts val="300"/>
+                        </a:spcAft>
+                        <a:buNone/>
+                      </a:pPr>
+                      <a:r>
+                        <a:rPr cap="none" sz="1200" i="0" b="0" u="none">
+                          <a:solidFill>
+                            <a:srgbClr val="000000">
+                              <a:alpha val="100000"/>
+                            </a:srgbClr>
+                          </a:solidFill>
+                          <a:latin typeface="arial"/>
+                          <a:cs typeface="arial"/>
+                          <a:ea typeface="arial"/>
+                          <a:sym typeface="arial"/>
+                        </a:rPr>
+                        <a:t>58 (43.3%)</a:t>
+                      </a:r>
+                    </a:p>
+                  </a:txBody>
+                  <a:tcPr anchor="ctr" marB="38100" marT="38100" marR="0" marL="0">
+                    <a:lnL algn="ctr" cmpd="sng" cap="flat" w="0">
+                      <a:noFill/>
+                      <a:prstDash val="solid"/>
+                    </a:lnL>
+                    <a:lnR algn="ctr" cmpd="sng" cap="flat" w="0">
+                      <a:noFill/>
+                      <a:prstDash val="solid"/>
+                    </a:lnR>
+                    <a:lnT algn="ctr" cmpd="sng" cap="flat" w="0">
+                      <a:noFill/>
+                      <a:prstDash val="solid"/>
+                    </a:lnT>
+                    <a:lnB algn="ctr" cmpd="sng" cap="flat" w="0">
+                      <a:noFill/>
+                      <a:prstDash val="solid"/>
+                    </a:lnB>
+                    <a:solidFill>
+                      <a:srgbClr val="FF7D29">
+                        <a:alpha val="100000"/>
+                      </a:srgbClr>
+                    </a:solidFill>
+                  </a:tcPr>
+                </a:tc>
+                <a:tc>
+                  <a:txBody>
+                    <a:bodyPr/>
+                    <a:lstStyle/>
+                    <a:p>
+                      <a:pPr algn="ctr" marL="63500" marR="63500">
+                        <a:lnSpc>
+                          <a:spcPct val="100000"/>
+                        </a:lnSpc>
+                        <a:spcBef>
+                          <a:spcPts val="300"/>
+                        </a:spcBef>
+                        <a:spcAft>
+                          <a:spcPts val="300"/>
+                        </a:spcAft>
+                        <a:buNone/>
+                      </a:pPr>
+                      <a:r>
+                        <a:rPr cap="none" sz="1200" i="0" b="0" u="none">
+                          <a:solidFill>
+                            <a:srgbClr val="000000">
+                              <a:alpha val="100000"/>
+                            </a:srgbClr>
+                          </a:solidFill>
+                          <a:latin typeface="arial"/>
+                          <a:cs typeface="arial"/>
+                          <a:ea typeface="arial"/>
+                          <a:sym typeface="arial"/>
+                        </a:rPr>
+                        <a:t>162 (40.5%)</a:t>
                       </a:r>
                     </a:p>
                   </a:txBody>
@@ -7777,7 +7404,7 @@
                           <a:ea typeface="arial"/>
                           <a:sym typeface="arial"/>
                         </a:rPr>
-                        <a:t>cl D.2</a:t>
+                        <a:t>cl B.1</a:t>
                       </a:r>
                     </a:p>
                   </a:txBody>
@@ -7891,7 +7518,7 @@
                           <a:ea typeface="arial"/>
                           <a:sym typeface="arial"/>
                         </a:rPr>
-                        <a:t>58 (43.3%)</a:t>
+                        <a:t>49 (36.6%)</a:t>
                       </a:r>
                     </a:p>
                   </a:txBody>
@@ -7948,64 +7575,7 @@
                           <a:ea typeface="arial"/>
                           <a:sym typeface="arial"/>
                         </a:rPr>
-                        <a:t>105 (39.2%)</a:t>
-                      </a:r>
-                    </a:p>
-                  </a:txBody>
-                  <a:tcPr anchor="ctr" marB="38100" marT="38100" marR="0" marL="0">
-                    <a:lnL algn="ctr" cmpd="sng" cap="flat" w="0">
-                      <a:noFill/>
-                      <a:prstDash val="solid"/>
-                    </a:lnL>
-                    <a:lnR algn="ctr" cmpd="sng" cap="flat" w="0">
-                      <a:noFill/>
-                      <a:prstDash val="solid"/>
-                    </a:lnR>
-                    <a:lnT algn="ctr" cmpd="sng" cap="flat" w="0">
-                      <a:noFill/>
-                      <a:prstDash val="solid"/>
-                    </a:lnT>
-                    <a:lnB algn="ctr" cmpd="sng" cap="flat" w="0">
-                      <a:noFill/>
-                      <a:prstDash val="solid"/>
-                    </a:lnB>
-                    <a:solidFill>
-                      <a:srgbClr val="FFBD69">
-                        <a:alpha val="100000"/>
-                      </a:srgbClr>
-                    </a:solidFill>
-                  </a:tcPr>
-                </a:tc>
-                <a:tc>
-                  <a:txBody>
-                    <a:bodyPr/>
-                    <a:lstStyle/>
-                    <a:p>
-                      <a:pPr algn="ctr" marL="63500" marR="63500">
-                        <a:lnSpc>
-                          <a:spcPct val="100000"/>
-                        </a:lnSpc>
-                        <a:spcBef>
-                          <a:spcPts val="300"/>
-                        </a:spcBef>
-                        <a:spcAft>
-                          <a:spcPts val="300"/>
-                        </a:spcAft>
-                        <a:buNone/>
-                      </a:pPr>
-                      <a:r>
-                        <a:rPr cap="none" sz="1200" i="0" b="0" u="none">
-                          <a:solidFill>
-                            <a:srgbClr val="000000">
-                              <a:alpha val="100000"/>
-                            </a:srgbClr>
-                          </a:solidFill>
-                          <a:latin typeface="arial"/>
-                          <a:cs typeface="arial"/>
-                          <a:ea typeface="arial"/>
-                          <a:sym typeface="arial"/>
-                        </a:rPr>
-                        <a:t>162 (40.5%)</a:t>
+                        <a:t>139 (34.8%)</a:t>
                       </a:r>
                     </a:p>
                   </a:txBody>
@@ -8064,7 +7634,7 @@
                           <a:ea typeface="arial"/>
                           <a:sym typeface="arial"/>
                         </a:rPr>
-                        <a:t>dcd D.2.1.5.3</a:t>
+                        <a:t>dcd B.1.1.1.1</a:t>
                       </a:r>
                     </a:p>
                   </a:txBody>
@@ -8178,7 +7748,7 @@
                           <a:ea typeface="arial"/>
                           <a:sym typeface="arial"/>
                         </a:rPr>
-                        <a:t>58 (43.3%)</a:t>
+                        <a:t>49 (36.6%)</a:t>
                       </a:r>
                     </a:p>
                   </a:txBody>
@@ -8235,64 +7805,7 @@
                           <a:ea typeface="arial"/>
                           <a:sym typeface="arial"/>
                         </a:rPr>
-                        <a:t>105 (39.2%)</a:t>
-                      </a:r>
-                    </a:p>
-                  </a:txBody>
-                  <a:tcPr anchor="ctr" marB="38100" marT="38100" marR="0" marL="0">
-                    <a:lnL algn="ctr" cmpd="sng" cap="flat" w="0">
-                      <a:noFill/>
-                      <a:prstDash val="solid"/>
-                    </a:lnL>
-                    <a:lnR algn="ctr" cmpd="sng" cap="flat" w="0">
-                      <a:noFill/>
-                      <a:prstDash val="solid"/>
-                    </a:lnR>
-                    <a:lnT algn="ctr" cmpd="sng" cap="flat" w="0">
-                      <a:noFill/>
-                      <a:prstDash val="solid"/>
-                    </a:lnT>
-                    <a:lnB algn="ctr" cmpd="sng" cap="flat" w="0">
-                      <a:noFill/>
-                      <a:prstDash val="solid"/>
-                    </a:lnB>
-                    <a:solidFill>
-                      <a:srgbClr val="FF7D29">
-                        <a:alpha val="100000"/>
-                      </a:srgbClr>
-                    </a:solidFill>
-                  </a:tcPr>
-                </a:tc>
-                <a:tc>
-                  <a:txBody>
-                    <a:bodyPr/>
-                    <a:lstStyle/>
-                    <a:p>
-                      <a:pPr algn="ctr" marL="63500" marR="63500">
-                        <a:lnSpc>
-                          <a:spcPct val="100000"/>
-                        </a:lnSpc>
-                        <a:spcBef>
-                          <a:spcPts val="300"/>
-                        </a:spcBef>
-                        <a:spcAft>
-                          <a:spcPts val="300"/>
-                        </a:spcAft>
-                        <a:buNone/>
-                      </a:pPr>
-                      <a:r>
-                        <a:rPr cap="none" sz="1200" i="0" b="0" u="none">
-                          <a:solidFill>
-                            <a:srgbClr val="000000">
-                              <a:alpha val="100000"/>
-                            </a:srgbClr>
-                          </a:solidFill>
-                          <a:latin typeface="arial"/>
-                          <a:cs typeface="arial"/>
-                          <a:ea typeface="arial"/>
-                          <a:sym typeface="arial"/>
-                        </a:rPr>
-                        <a:t>162 (40.5%)</a:t>
+                        <a:t>139 (34.8%)</a:t>
                       </a:r>
                     </a:p>
                   </a:txBody>
@@ -8351,7 +7864,7 @@
                           <a:ea typeface="arial"/>
                           <a:sym typeface="arial"/>
                         </a:rPr>
-                        <a:t>cl B.1</a:t>
+                        <a:t>cl C.1</a:t>
                       </a:r>
                     </a:p>
                   </a:txBody>
@@ -8408,7 +7921,7 @@
                           <a:ea typeface="arial"/>
                           <a:sym typeface="arial"/>
                         </a:rPr>
-                        <a:t>47 (35.1%)</a:t>
+                        <a:t>43 (32.1%)</a:t>
                       </a:r>
                     </a:p>
                   </a:txBody>
@@ -8465,7 +7978,7 @@
                           <a:ea typeface="arial"/>
                           <a:sym typeface="arial"/>
                         </a:rPr>
-                        <a:t>49 (36.6%)</a:t>
+                        <a:t>46 (34.3%)</a:t>
                       </a:r>
                     </a:p>
                   </a:txBody>
@@ -8522,64 +8035,7 @@
                           <a:ea typeface="arial"/>
                           <a:sym typeface="arial"/>
                         </a:rPr>
-                        <a:t>96 (35.8%)</a:t>
-                      </a:r>
-                    </a:p>
-                  </a:txBody>
-                  <a:tcPr anchor="ctr" marB="38100" marT="38100" marR="0" marL="0">
-                    <a:lnL algn="ctr" cmpd="sng" cap="flat" w="0">
-                      <a:noFill/>
-                      <a:prstDash val="solid"/>
-                    </a:lnL>
-                    <a:lnR algn="ctr" cmpd="sng" cap="flat" w="0">
-                      <a:noFill/>
-                      <a:prstDash val="solid"/>
-                    </a:lnR>
-                    <a:lnT algn="ctr" cmpd="sng" cap="flat" w="0">
-                      <a:noFill/>
-                      <a:prstDash val="solid"/>
-                    </a:lnT>
-                    <a:lnB algn="ctr" cmpd="sng" cap="flat" w="0">
-                      <a:noFill/>
-                      <a:prstDash val="solid"/>
-                    </a:lnB>
-                    <a:solidFill>
-                      <a:srgbClr val="FFBD69">
-                        <a:alpha val="100000"/>
-                      </a:srgbClr>
-                    </a:solidFill>
-                  </a:tcPr>
-                </a:tc>
-                <a:tc>
-                  <a:txBody>
-                    <a:bodyPr/>
-                    <a:lstStyle/>
-                    <a:p>
-                      <a:pPr algn="ctr" marL="63500" marR="63500">
-                        <a:lnSpc>
-                          <a:spcPct val="100000"/>
-                        </a:lnSpc>
-                        <a:spcBef>
-                          <a:spcPts val="300"/>
-                        </a:spcBef>
-                        <a:spcAft>
-                          <a:spcPts val="300"/>
-                        </a:spcAft>
-                        <a:buNone/>
-                      </a:pPr>
-                      <a:r>
-                        <a:rPr cap="none" sz="1200" i="0" b="0" u="none">
-                          <a:solidFill>
-                            <a:srgbClr val="000000">
-                              <a:alpha val="100000"/>
-                            </a:srgbClr>
-                          </a:solidFill>
-                          <a:latin typeface="arial"/>
-                          <a:cs typeface="arial"/>
-                          <a:ea typeface="arial"/>
-                          <a:sym typeface="arial"/>
-                        </a:rPr>
-                        <a:t>139 (34.8%)</a:t>
+                        <a:t>132 (33.0%)</a:t>
                       </a:r>
                     </a:p>
                   </a:txBody>
@@ -8638,7 +8094,7 @@
                           <a:ea typeface="arial"/>
                           <a:sym typeface="arial"/>
                         </a:rPr>
-                        <a:t>dcd B.1.1.1.1</a:t>
+                        <a:t>dcd C.1.1.1.3</a:t>
                       </a:r>
                     </a:p>
                   </a:txBody>
@@ -8695,7 +8151,7 @@
                           <a:ea typeface="arial"/>
                           <a:sym typeface="arial"/>
                         </a:rPr>
-                        <a:t>47 (35.1%)</a:t>
+                        <a:t>43 (32.1%)</a:t>
                       </a:r>
                     </a:p>
                   </a:txBody>
@@ -8752,7 +8208,7 @@
                           <a:ea typeface="arial"/>
                           <a:sym typeface="arial"/>
                         </a:rPr>
-                        <a:t>49 (36.6%)</a:t>
+                        <a:t>46 (34.3%)</a:t>
                       </a:r>
                     </a:p>
                   </a:txBody>
@@ -8809,64 +8265,7 @@
                           <a:ea typeface="arial"/>
                           <a:sym typeface="arial"/>
                         </a:rPr>
-                        <a:t>96 (35.8%)</a:t>
-                      </a:r>
-                    </a:p>
-                  </a:txBody>
-                  <a:tcPr anchor="ctr" marB="38100" marT="38100" marR="0" marL="0">
-                    <a:lnL algn="ctr" cmpd="sng" cap="flat" w="0">
-                      <a:noFill/>
-                      <a:prstDash val="solid"/>
-                    </a:lnL>
-                    <a:lnR algn="ctr" cmpd="sng" cap="flat" w="0">
-                      <a:noFill/>
-                      <a:prstDash val="solid"/>
-                    </a:lnR>
-                    <a:lnT algn="ctr" cmpd="sng" cap="flat" w="0">
-                      <a:noFill/>
-                      <a:prstDash val="solid"/>
-                    </a:lnT>
-                    <a:lnB algn="ctr" cmpd="sng" cap="flat" w="0">
-                      <a:noFill/>
-                      <a:prstDash val="solid"/>
-                    </a:lnB>
-                    <a:solidFill>
-                      <a:srgbClr val="FF7D29">
-                        <a:alpha val="100000"/>
-                      </a:srgbClr>
-                    </a:solidFill>
-                  </a:tcPr>
-                </a:tc>
-                <a:tc>
-                  <a:txBody>
-                    <a:bodyPr/>
-                    <a:lstStyle/>
-                    <a:p>
-                      <a:pPr algn="ctr" marL="63500" marR="63500">
-                        <a:lnSpc>
-                          <a:spcPct val="100000"/>
-                        </a:lnSpc>
-                        <a:spcBef>
-                          <a:spcPts val="300"/>
-                        </a:spcBef>
-                        <a:spcAft>
-                          <a:spcPts val="300"/>
-                        </a:spcAft>
-                        <a:buNone/>
-                      </a:pPr>
-                      <a:r>
-                        <a:rPr cap="none" sz="1200" i="0" b="0" u="none">
-                          <a:solidFill>
-                            <a:srgbClr val="000000">
-                              <a:alpha val="100000"/>
-                            </a:srgbClr>
-                          </a:solidFill>
-                          <a:latin typeface="arial"/>
-                          <a:cs typeface="arial"/>
-                          <a:ea typeface="arial"/>
-                          <a:sym typeface="arial"/>
-                        </a:rPr>
-                        <a:t>139 (34.8%)</a:t>
+                        <a:t>132 (33.0%)</a:t>
                       </a:r>
                     </a:p>
                   </a:txBody>
@@ -8925,7 +8324,7 @@
                           <a:ea typeface="arial"/>
                           <a:sym typeface="arial"/>
                         </a:rPr>
-                        <a:t>cl C.1</a:t>
+                        <a:t>cl C.2</a:t>
                       </a:r>
                     </a:p>
                   </a:txBody>
@@ -8982,7 +8381,7 @@
                           <a:ea typeface="arial"/>
                           <a:sym typeface="arial"/>
                         </a:rPr>
-                        <a:t>43 (32.1%)</a:t>
+                        <a:t>35 (26.1%)</a:t>
                       </a:r>
                     </a:p>
                   </a:txBody>
@@ -9039,638 +8438,7 @@
                           <a:ea typeface="arial"/>
                           <a:sym typeface="arial"/>
                         </a:rPr>
-                        <a:t>46 (34.3%)</a:t>
-                      </a:r>
-                    </a:p>
-                  </a:txBody>
-                  <a:tcPr anchor="ctr" marB="38100" marT="38100" marR="0" marL="0">
-                    <a:lnL algn="ctr" cmpd="sng" cap="flat" w="0">
-                      <a:noFill/>
-                      <a:prstDash val="solid"/>
-                    </a:lnL>
-                    <a:lnR algn="ctr" cmpd="sng" cap="flat" w="0">
-                      <a:noFill/>
-                      <a:prstDash val="solid"/>
-                    </a:lnR>
-                    <a:lnT algn="ctr" cmpd="sng" cap="flat" w="0">
-                      <a:noFill/>
-                      <a:prstDash val="solid"/>
-                    </a:lnT>
-                    <a:lnB algn="ctr" cmpd="sng" cap="flat" w="0">
-                      <a:noFill/>
-                      <a:prstDash val="solid"/>
-                    </a:lnB>
-                    <a:solidFill>
-                      <a:srgbClr val="FFBD69">
-                        <a:alpha val="100000"/>
-                      </a:srgbClr>
-                    </a:solidFill>
-                  </a:tcPr>
-                </a:tc>
-                <a:tc>
-                  <a:txBody>
-                    <a:bodyPr/>
-                    <a:lstStyle/>
-                    <a:p>
-                      <a:pPr algn="ctr" marL="63500" marR="63500">
-                        <a:lnSpc>
-                          <a:spcPct val="100000"/>
-                        </a:lnSpc>
-                        <a:spcBef>
-                          <a:spcPts val="300"/>
-                        </a:spcBef>
-                        <a:spcAft>
-                          <a:spcPts val="300"/>
-                        </a:spcAft>
-                        <a:buNone/>
-                      </a:pPr>
-                      <a:r>
-                        <a:rPr cap="none" sz="1200" i="0" b="0" u="none">
-                          <a:solidFill>
-                            <a:srgbClr val="000000">
-                              <a:alpha val="100000"/>
-                            </a:srgbClr>
-                          </a:solidFill>
-                          <a:latin typeface="arial"/>
-                          <a:cs typeface="arial"/>
-                          <a:ea typeface="arial"/>
-                          <a:sym typeface="arial"/>
-                        </a:rPr>
-                        <a:t>89 (33.2%)</a:t>
-                      </a:r>
-                    </a:p>
-                  </a:txBody>
-                  <a:tcPr anchor="ctr" marB="38100" marT="38100" marR="0" marL="0">
-                    <a:lnL algn="ctr" cmpd="sng" cap="flat" w="0">
-                      <a:noFill/>
-                      <a:prstDash val="solid"/>
-                    </a:lnL>
-                    <a:lnR algn="ctr" cmpd="sng" cap="flat" w="0">
-                      <a:noFill/>
-                      <a:prstDash val="solid"/>
-                    </a:lnR>
-                    <a:lnT algn="ctr" cmpd="sng" cap="flat" w="0">
-                      <a:noFill/>
-                      <a:prstDash val="solid"/>
-                    </a:lnT>
-                    <a:lnB algn="ctr" cmpd="sng" cap="flat" w="0">
-                      <a:noFill/>
-                      <a:prstDash val="solid"/>
-                    </a:lnB>
-                    <a:solidFill>
-                      <a:srgbClr val="FFBD69">
-                        <a:alpha val="100000"/>
-                      </a:srgbClr>
-                    </a:solidFill>
-                  </a:tcPr>
-                </a:tc>
-                <a:tc>
-                  <a:txBody>
-                    <a:bodyPr/>
-                    <a:lstStyle/>
-                    <a:p>
-                      <a:pPr algn="ctr" marL="63500" marR="63500">
-                        <a:lnSpc>
-                          <a:spcPct val="100000"/>
-                        </a:lnSpc>
-                        <a:spcBef>
-                          <a:spcPts val="300"/>
-                        </a:spcBef>
-                        <a:spcAft>
-                          <a:spcPts val="300"/>
-                        </a:spcAft>
-                        <a:buNone/>
-                      </a:pPr>
-                      <a:r>
-                        <a:rPr cap="none" sz="1200" i="0" b="0" u="none">
-                          <a:solidFill>
-                            <a:srgbClr val="000000">
-                              <a:alpha val="100000"/>
-                            </a:srgbClr>
-                          </a:solidFill>
-                          <a:latin typeface="arial"/>
-                          <a:cs typeface="arial"/>
-                          <a:ea typeface="arial"/>
-                          <a:sym typeface="arial"/>
-                        </a:rPr>
-                        <a:t>132 (33.0%)</a:t>
-                      </a:r>
-                    </a:p>
-                  </a:txBody>
-                  <a:tcPr anchor="ctr" marB="38100" marT="38100" marR="0" marL="0">
-                    <a:lnL algn="ctr" cmpd="sng" cap="flat" w="0">
-                      <a:noFill/>
-                      <a:prstDash val="solid"/>
-                    </a:lnL>
-                    <a:lnR algn="ctr" cmpd="sng" cap="flat" w="0">
-                      <a:noFill/>
-                      <a:prstDash val="solid"/>
-                    </a:lnR>
-                    <a:lnT algn="ctr" cmpd="sng" cap="flat" w="0">
-                      <a:noFill/>
-                      <a:prstDash val="solid"/>
-                    </a:lnT>
-                    <a:lnB algn="ctr" cmpd="sng" cap="flat" w="0">
-                      <a:noFill/>
-                      <a:prstDash val="solid"/>
-                    </a:lnB>
-                    <a:solidFill>
-                      <a:srgbClr val="FFBD69">
-                        <a:alpha val="100000"/>
-                      </a:srgbClr>
-                    </a:solidFill>
-                  </a:tcPr>
-                </a:tc>
-              </a:tr>
-              <a:tr h="243582">
-                <a:tc>
-                  <a:txBody>
-                    <a:bodyPr/>
-                    <a:lstStyle/>
-                    <a:p>
-                      <a:pPr algn="l" marL="127000" marR="63500">
-                        <a:lnSpc>
-                          <a:spcPct val="100000"/>
-                        </a:lnSpc>
-                        <a:spcBef>
-                          <a:spcPts val="300"/>
-                        </a:spcBef>
-                        <a:spcAft>
-                          <a:spcPts val="300"/>
-                        </a:spcAft>
-                        <a:buNone/>
-                      </a:pPr>
-                      <a:r>
-                        <a:rPr cap="none" sz="1200" i="0" b="0" u="none">
-                          <a:solidFill>
-                            <a:srgbClr val="000000">
-                              <a:alpha val="100000"/>
-                            </a:srgbClr>
-                          </a:solidFill>
-                          <a:latin typeface="arial"/>
-                          <a:cs typeface="arial"/>
-                          <a:ea typeface="arial"/>
-                          <a:sym typeface="arial"/>
-                        </a:rPr>
-                        <a:t>dcd C.1.1.1.3</a:t>
-                      </a:r>
-                    </a:p>
-                  </a:txBody>
-                  <a:tcPr anchor="ctr" marB="38100" marT="38100" marR="0" marL="0">
-                    <a:lnL algn="ctr" cmpd="sng" cap="flat" w="0">
-                      <a:noFill/>
-                      <a:prstDash val="solid"/>
-                    </a:lnL>
-                    <a:lnR algn="ctr" cmpd="sng" cap="flat" w="0">
-                      <a:noFill/>
-                      <a:prstDash val="solid"/>
-                    </a:lnR>
-                    <a:lnT algn="ctr" cmpd="sng" cap="flat" w="0">
-                      <a:noFill/>
-                      <a:prstDash val="solid"/>
-                    </a:lnT>
-                    <a:lnB algn="ctr" cmpd="sng" cap="flat" w="0">
-                      <a:noFill/>
-                      <a:prstDash val="solid"/>
-                    </a:lnB>
-                    <a:solidFill>
-                      <a:srgbClr val="FF7D29">
-                        <a:alpha val="100000"/>
-                      </a:srgbClr>
-                    </a:solidFill>
-                  </a:tcPr>
-                </a:tc>
-                <a:tc>
-                  <a:txBody>
-                    <a:bodyPr/>
-                    <a:lstStyle/>
-                    <a:p>
-                      <a:pPr algn="ctr" marL="63500" marR="63500">
-                        <a:lnSpc>
-                          <a:spcPct val="100000"/>
-                        </a:lnSpc>
-                        <a:spcBef>
-                          <a:spcPts val="300"/>
-                        </a:spcBef>
-                        <a:spcAft>
-                          <a:spcPts val="300"/>
-                        </a:spcAft>
-                        <a:buNone/>
-                      </a:pPr>
-                      <a:r>
-                        <a:rPr cap="none" sz="1200" i="0" b="0" u="none">
-                          <a:solidFill>
-                            <a:srgbClr val="000000">
-                              <a:alpha val="100000"/>
-                            </a:srgbClr>
-                          </a:solidFill>
-                          <a:latin typeface="arial"/>
-                          <a:cs typeface="arial"/>
-                          <a:ea typeface="arial"/>
-                          <a:sym typeface="arial"/>
-                        </a:rPr>
-                        <a:t>43 (32.1%)</a:t>
-                      </a:r>
-                    </a:p>
-                  </a:txBody>
-                  <a:tcPr anchor="ctr" marB="38100" marT="38100" marR="0" marL="0">
-                    <a:lnL algn="ctr" cmpd="sng" cap="flat" w="0">
-                      <a:noFill/>
-                      <a:prstDash val="solid"/>
-                    </a:lnL>
-                    <a:lnR algn="ctr" cmpd="sng" cap="flat" w="0">
-                      <a:noFill/>
-                      <a:prstDash val="solid"/>
-                    </a:lnR>
-                    <a:lnT algn="ctr" cmpd="sng" cap="flat" w="0">
-                      <a:noFill/>
-                      <a:prstDash val="solid"/>
-                    </a:lnT>
-                    <a:lnB algn="ctr" cmpd="sng" cap="flat" w="0">
-                      <a:noFill/>
-                      <a:prstDash val="solid"/>
-                    </a:lnB>
-                    <a:solidFill>
-                      <a:srgbClr val="FF7D29">
-                        <a:alpha val="100000"/>
-                      </a:srgbClr>
-                    </a:solidFill>
-                  </a:tcPr>
-                </a:tc>
-                <a:tc>
-                  <a:txBody>
-                    <a:bodyPr/>
-                    <a:lstStyle/>
-                    <a:p>
-                      <a:pPr algn="ctr" marL="63500" marR="63500">
-                        <a:lnSpc>
-                          <a:spcPct val="100000"/>
-                        </a:lnSpc>
-                        <a:spcBef>
-                          <a:spcPts val="300"/>
-                        </a:spcBef>
-                        <a:spcAft>
-                          <a:spcPts val="300"/>
-                        </a:spcAft>
-                        <a:buNone/>
-                      </a:pPr>
-                      <a:r>
-                        <a:rPr cap="none" sz="1200" i="0" b="0" u="none">
-                          <a:solidFill>
-                            <a:srgbClr val="000000">
-                              <a:alpha val="100000"/>
-                            </a:srgbClr>
-                          </a:solidFill>
-                          <a:latin typeface="arial"/>
-                          <a:cs typeface="arial"/>
-                          <a:ea typeface="arial"/>
-                          <a:sym typeface="arial"/>
-                        </a:rPr>
-                        <a:t>46 (34.3%)</a:t>
-                      </a:r>
-                    </a:p>
-                  </a:txBody>
-                  <a:tcPr anchor="ctr" marB="38100" marT="38100" marR="0" marL="0">
-                    <a:lnL algn="ctr" cmpd="sng" cap="flat" w="0">
-                      <a:noFill/>
-                      <a:prstDash val="solid"/>
-                    </a:lnL>
-                    <a:lnR algn="ctr" cmpd="sng" cap="flat" w="0">
-                      <a:noFill/>
-                      <a:prstDash val="solid"/>
-                    </a:lnR>
-                    <a:lnT algn="ctr" cmpd="sng" cap="flat" w="0">
-                      <a:noFill/>
-                      <a:prstDash val="solid"/>
-                    </a:lnT>
-                    <a:lnB algn="ctr" cmpd="sng" cap="flat" w="0">
-                      <a:noFill/>
-                      <a:prstDash val="solid"/>
-                    </a:lnB>
-                    <a:solidFill>
-                      <a:srgbClr val="FF7D29">
-                        <a:alpha val="100000"/>
-                      </a:srgbClr>
-                    </a:solidFill>
-                  </a:tcPr>
-                </a:tc>
-                <a:tc>
-                  <a:txBody>
-                    <a:bodyPr/>
-                    <a:lstStyle/>
-                    <a:p>
-                      <a:pPr algn="ctr" marL="63500" marR="63500">
-                        <a:lnSpc>
-                          <a:spcPct val="100000"/>
-                        </a:lnSpc>
-                        <a:spcBef>
-                          <a:spcPts val="300"/>
-                        </a:spcBef>
-                        <a:spcAft>
-                          <a:spcPts val="300"/>
-                        </a:spcAft>
-                        <a:buNone/>
-                      </a:pPr>
-                      <a:r>
-                        <a:rPr cap="none" sz="1200" i="0" b="0" u="none">
-                          <a:solidFill>
-                            <a:srgbClr val="000000">
-                              <a:alpha val="100000"/>
-                            </a:srgbClr>
-                          </a:solidFill>
-                          <a:latin typeface="arial"/>
-                          <a:cs typeface="arial"/>
-                          <a:ea typeface="arial"/>
-                          <a:sym typeface="arial"/>
-                        </a:rPr>
-                        <a:t>89 (33.2%)</a:t>
-                      </a:r>
-                    </a:p>
-                  </a:txBody>
-                  <a:tcPr anchor="ctr" marB="38100" marT="38100" marR="0" marL="0">
-                    <a:lnL algn="ctr" cmpd="sng" cap="flat" w="0">
-                      <a:noFill/>
-                      <a:prstDash val="solid"/>
-                    </a:lnL>
-                    <a:lnR algn="ctr" cmpd="sng" cap="flat" w="0">
-                      <a:noFill/>
-                      <a:prstDash val="solid"/>
-                    </a:lnR>
-                    <a:lnT algn="ctr" cmpd="sng" cap="flat" w="0">
-                      <a:noFill/>
-                      <a:prstDash val="solid"/>
-                    </a:lnT>
-                    <a:lnB algn="ctr" cmpd="sng" cap="flat" w="0">
-                      <a:noFill/>
-                      <a:prstDash val="solid"/>
-                    </a:lnB>
-                    <a:solidFill>
-                      <a:srgbClr val="FF7D29">
-                        <a:alpha val="100000"/>
-                      </a:srgbClr>
-                    </a:solidFill>
-                  </a:tcPr>
-                </a:tc>
-                <a:tc>
-                  <a:txBody>
-                    <a:bodyPr/>
-                    <a:lstStyle/>
-                    <a:p>
-                      <a:pPr algn="ctr" marL="63500" marR="63500">
-                        <a:lnSpc>
-                          <a:spcPct val="100000"/>
-                        </a:lnSpc>
-                        <a:spcBef>
-                          <a:spcPts val="300"/>
-                        </a:spcBef>
-                        <a:spcAft>
-                          <a:spcPts val="300"/>
-                        </a:spcAft>
-                        <a:buNone/>
-                      </a:pPr>
-                      <a:r>
-                        <a:rPr cap="none" sz="1200" i="0" b="0" u="none">
-                          <a:solidFill>
-                            <a:srgbClr val="000000">
-                              <a:alpha val="100000"/>
-                            </a:srgbClr>
-                          </a:solidFill>
-                          <a:latin typeface="arial"/>
-                          <a:cs typeface="arial"/>
-                          <a:ea typeface="arial"/>
-                          <a:sym typeface="arial"/>
-                        </a:rPr>
-                        <a:t>132 (33.0%)</a:t>
-                      </a:r>
-                    </a:p>
-                  </a:txBody>
-                  <a:tcPr anchor="ctr" marB="38100" marT="38100" marR="0" marL="0">
-                    <a:lnL algn="ctr" cmpd="sng" cap="flat" w="0">
-                      <a:noFill/>
-                      <a:prstDash val="solid"/>
-                    </a:lnL>
-                    <a:lnR algn="ctr" cmpd="sng" cap="flat" w="0">
-                      <a:noFill/>
-                      <a:prstDash val="solid"/>
-                    </a:lnR>
-                    <a:lnT algn="ctr" cmpd="sng" cap="flat" w="0">
-                      <a:noFill/>
-                      <a:prstDash val="solid"/>
-                    </a:lnT>
-                    <a:lnB algn="ctr" cmpd="sng" cap="flat" w="0">
-                      <a:noFill/>
-                      <a:prstDash val="solid"/>
-                    </a:lnB>
-                    <a:solidFill>
-                      <a:srgbClr val="FF7D29">
-                        <a:alpha val="100000"/>
-                      </a:srgbClr>
-                    </a:solidFill>
-                  </a:tcPr>
-                </a:tc>
-              </a:tr>
-              <a:tr h="243582">
-                <a:tc>
-                  <a:txBody>
-                    <a:bodyPr/>
-                    <a:lstStyle/>
-                    <a:p>
-                      <a:pPr algn="l" marL="127000" marR="63500">
-                        <a:lnSpc>
-                          <a:spcPct val="100000"/>
-                        </a:lnSpc>
-                        <a:spcBef>
-                          <a:spcPts val="300"/>
-                        </a:spcBef>
-                        <a:spcAft>
-                          <a:spcPts val="300"/>
-                        </a:spcAft>
-                        <a:buNone/>
-                      </a:pPr>
-                      <a:r>
-                        <a:rPr cap="none" sz="1200" i="0" b="0" u="none">
-                          <a:solidFill>
-                            <a:srgbClr val="000000">
-                              <a:alpha val="100000"/>
-                            </a:srgbClr>
-                          </a:solidFill>
-                          <a:latin typeface="arial"/>
-                          <a:cs typeface="arial"/>
-                          <a:ea typeface="arial"/>
-                          <a:sym typeface="arial"/>
-                        </a:rPr>
-                        <a:t>cl C.2</a:t>
-                      </a:r>
-                    </a:p>
-                  </a:txBody>
-                  <a:tcPr anchor="ctr" marB="38100" marT="38100" marR="0" marL="0">
-                    <a:lnL algn="ctr" cmpd="sng" cap="flat" w="0">
-                      <a:noFill/>
-                      <a:prstDash val="solid"/>
-                    </a:lnL>
-                    <a:lnR algn="ctr" cmpd="sng" cap="flat" w="0">
-                      <a:noFill/>
-                      <a:prstDash val="solid"/>
-                    </a:lnR>
-                    <a:lnT algn="ctr" cmpd="sng" cap="flat" w="0">
-                      <a:noFill/>
-                      <a:prstDash val="solid"/>
-                    </a:lnT>
-                    <a:lnB algn="ctr" cmpd="sng" cap="flat" w="0">
-                      <a:noFill/>
-                      <a:prstDash val="solid"/>
-                    </a:lnB>
-                    <a:solidFill>
-                      <a:srgbClr val="FFBD69">
-                        <a:alpha val="100000"/>
-                      </a:srgbClr>
-                    </a:solidFill>
-                  </a:tcPr>
-                </a:tc>
-                <a:tc>
-                  <a:txBody>
-                    <a:bodyPr/>
-                    <a:lstStyle/>
-                    <a:p>
-                      <a:pPr algn="ctr" marL="63500" marR="63500">
-                        <a:lnSpc>
-                          <a:spcPct val="100000"/>
-                        </a:lnSpc>
-                        <a:spcBef>
-                          <a:spcPts val="300"/>
-                        </a:spcBef>
-                        <a:spcAft>
-                          <a:spcPts val="300"/>
-                        </a:spcAft>
-                        <a:buNone/>
-                      </a:pPr>
-                      <a:r>
-                        <a:rPr cap="none" sz="1200" i="0" b="0" u="none">
-                          <a:solidFill>
-                            <a:srgbClr val="000000">
-                              <a:alpha val="100000"/>
-                            </a:srgbClr>
-                          </a:solidFill>
-                          <a:latin typeface="arial"/>
-                          <a:cs typeface="arial"/>
-                          <a:ea typeface="arial"/>
-                          <a:sym typeface="arial"/>
-                        </a:rPr>
-                        <a:t>35 (26.1%)</a:t>
-                      </a:r>
-                    </a:p>
-                  </a:txBody>
-                  <a:tcPr anchor="ctr" marB="38100" marT="38100" marR="0" marL="0">
-                    <a:lnL algn="ctr" cmpd="sng" cap="flat" w="0">
-                      <a:noFill/>
-                      <a:prstDash val="solid"/>
-                    </a:lnL>
-                    <a:lnR algn="ctr" cmpd="sng" cap="flat" w="0">
-                      <a:noFill/>
-                      <a:prstDash val="solid"/>
-                    </a:lnR>
-                    <a:lnT algn="ctr" cmpd="sng" cap="flat" w="0">
-                      <a:noFill/>
-                      <a:prstDash val="solid"/>
-                    </a:lnT>
-                    <a:lnB algn="ctr" cmpd="sng" cap="flat" w="0">
-                      <a:noFill/>
-                      <a:prstDash val="solid"/>
-                    </a:lnB>
-                    <a:solidFill>
-                      <a:srgbClr val="FFBD69">
-                        <a:alpha val="100000"/>
-                      </a:srgbClr>
-                    </a:solidFill>
-                  </a:tcPr>
-                </a:tc>
-                <a:tc>
-                  <a:txBody>
-                    <a:bodyPr/>
-                    <a:lstStyle/>
-                    <a:p>
-                      <a:pPr algn="ctr" marL="63500" marR="63500">
-                        <a:lnSpc>
-                          <a:spcPct val="100000"/>
-                        </a:lnSpc>
-                        <a:spcBef>
-                          <a:spcPts val="300"/>
-                        </a:spcBef>
-                        <a:spcAft>
-                          <a:spcPts val="300"/>
-                        </a:spcAft>
-                        <a:buNone/>
-                      </a:pPr>
-                      <a:r>
-                        <a:rPr cap="none" sz="1200" i="0" b="0" u="none">
-                          <a:solidFill>
-                            <a:srgbClr val="000000">
-                              <a:alpha val="100000"/>
-                            </a:srgbClr>
-                          </a:solidFill>
-                          <a:latin typeface="arial"/>
-                          <a:cs typeface="arial"/>
-                          <a:ea typeface="arial"/>
-                          <a:sym typeface="arial"/>
-                        </a:rPr>
                         <a:t>48 (35.8%)</a:t>
-                      </a:r>
-                    </a:p>
-                  </a:txBody>
-                  <a:tcPr anchor="ctr" marB="38100" marT="38100" marR="0" marL="0">
-                    <a:lnL algn="ctr" cmpd="sng" cap="flat" w="0">
-                      <a:noFill/>
-                      <a:prstDash val="solid"/>
-                    </a:lnL>
-                    <a:lnR algn="ctr" cmpd="sng" cap="flat" w="0">
-                      <a:noFill/>
-                      <a:prstDash val="solid"/>
-                    </a:lnR>
-                    <a:lnT algn="ctr" cmpd="sng" cap="flat" w="0">
-                      <a:noFill/>
-                      <a:prstDash val="solid"/>
-                    </a:lnT>
-                    <a:lnB algn="ctr" cmpd="sng" cap="flat" w="0">
-                      <a:noFill/>
-                      <a:prstDash val="solid"/>
-                    </a:lnB>
-                    <a:solidFill>
-                      <a:srgbClr val="FFBD69">
-                        <a:alpha val="100000"/>
-                      </a:srgbClr>
-                    </a:solidFill>
-                  </a:tcPr>
-                </a:tc>
-                <a:tc>
-                  <a:txBody>
-                    <a:bodyPr/>
-                    <a:lstStyle/>
-                    <a:p>
-                      <a:pPr algn="ctr" marL="63500" marR="63500">
-                        <a:lnSpc>
-                          <a:spcPct val="100000"/>
-                        </a:lnSpc>
-                        <a:spcBef>
-                          <a:spcPts val="300"/>
-                        </a:spcBef>
-                        <a:spcAft>
-                          <a:spcPts val="300"/>
-                        </a:spcAft>
-                        <a:buNone/>
-                      </a:pPr>
-                      <a:r>
-                        <a:rPr cap="none" sz="1200" i="0" b="0" u="none">
-                          <a:solidFill>
-                            <a:srgbClr val="000000">
-                              <a:alpha val="100000"/>
-                            </a:srgbClr>
-                          </a:solidFill>
-                          <a:latin typeface="arial"/>
-                          <a:cs typeface="arial"/>
-                          <a:ea typeface="arial"/>
-                          <a:sym typeface="arial"/>
-                        </a:rPr>
-                        <a:t>83 (31.0%)</a:t>
                       </a:r>
                     </a:p>
                   </a:txBody>
@@ -9957,63 +8725,6 @@
                           <a:ea typeface="arial"/>
                           <a:sym typeface="arial"/>
                         </a:rPr>
-                        <a:t>83 (31.0%)</a:t>
-                      </a:r>
-                    </a:p>
-                  </a:txBody>
-                  <a:tcPr anchor="ctr" marB="38100" marT="38100" marR="0" marL="0">
-                    <a:lnL algn="ctr" cmpd="sng" cap="flat" w="0">
-                      <a:noFill/>
-                      <a:prstDash val="solid"/>
-                    </a:lnL>
-                    <a:lnR algn="ctr" cmpd="sng" cap="flat" w="0">
-                      <a:noFill/>
-                      <a:prstDash val="solid"/>
-                    </a:lnR>
-                    <a:lnT algn="ctr" cmpd="sng" cap="flat" w="0">
-                      <a:noFill/>
-                      <a:prstDash val="solid"/>
-                    </a:lnT>
-                    <a:lnB algn="ctr" cmpd="sng" cap="flat" w="0">
-                      <a:noFill/>
-                      <a:prstDash val="solid"/>
-                    </a:lnB>
-                    <a:solidFill>
-                      <a:srgbClr val="FF7D29">
-                        <a:alpha val="100000"/>
-                      </a:srgbClr>
-                    </a:solidFill>
-                  </a:tcPr>
-                </a:tc>
-                <a:tc>
-                  <a:txBody>
-                    <a:bodyPr/>
-                    <a:lstStyle/>
-                    <a:p>
-                      <a:pPr algn="ctr" marL="63500" marR="63500">
-                        <a:lnSpc>
-                          <a:spcPct val="100000"/>
-                        </a:lnSpc>
-                        <a:spcBef>
-                          <a:spcPts val="300"/>
-                        </a:spcBef>
-                        <a:spcAft>
-                          <a:spcPts val="300"/>
-                        </a:spcAft>
-                        <a:buNone/>
-                      </a:pPr>
-                      <a:r>
-                        <a:rPr cap="none" sz="1200" i="0" b="0" u="none">
-                          <a:solidFill>
-                            <a:srgbClr val="000000">
-                              <a:alpha val="100000"/>
-                            </a:srgbClr>
-                          </a:solidFill>
-                          <a:latin typeface="arial"/>
-                          <a:cs typeface="arial"/>
-                          <a:ea typeface="arial"/>
-                          <a:sym typeface="arial"/>
-                        </a:rPr>
                         <a:t>138 (34.5%)</a:t>
                       </a:r>
                     </a:p>
@@ -10044,7 +8755,7 @@
                 </a:tc>
               </a:tr>
               <a:tr h="228600">
-                <a:tc gridSpan="5">
+                <a:tc gridSpan="4">
                   <a:txBody>
                     <a:bodyPr/>
                     <a:lstStyle/>
@@ -10116,74 +8827,6 @@
                           <a:sym typeface="DejaVu Sans"/>
                         </a:rPr>
                         <a:t>; </a:t>
-                      </a:r>
-                    </a:p>
-                  </a:txBody>
-                  <a:tcPr anchor="ctr" marB="63500" marT="63500" marR="0" marL="0">
-                    <a:lnL algn="ctr" cmpd="sng" cap="flat" w="0">
-                      <a:noFill/>
-                      <a:prstDash val="solid"/>
-                    </a:lnL>
-                    <a:lnR algn="ctr" cmpd="sng" cap="flat" w="0">
-                      <a:noFill/>
-                      <a:prstDash val="solid"/>
-                    </a:lnR>
-                    <a:lnT algn="ctr" cmpd="sng" cap="flat" w="0">
-                      <a:noFill/>
-                      <a:prstDash val="solid"/>
-                    </a:lnT>
-                    <a:lnB algn="ctr" cmpd="sng" cap="flat" w="0">
-                      <a:noFill/>
-                      <a:prstDash val="solid"/>
-                    </a:lnB>
-                    <a:solidFill>
-                      <a:srgbClr val="FFFFFF">
-                        <a:alpha val="0"/>
-                      </a:srgbClr>
-                    </a:solidFill>
-                  </a:tcPr>
-                </a:tc>
-                <a:tc hMerge="true">
-                  <a:txBody>
-                    <a:bodyPr/>
-                    <a:lstStyle/>
-                    <a:p>
-                      <a:pPr algn="l" marL="63500" marR="63500">
-                        <a:lnSpc>
-                          <a:spcPct val="100000"/>
-                        </a:lnSpc>
-                        <a:spcBef>
-                          <a:spcPts val="500"/>
-                        </a:spcBef>
-                        <a:spcAft>
-                          <a:spcPts val="500"/>
-                        </a:spcAft>
-                        <a:buNone/>
-                      </a:pPr>
-                      <a:endParaRPr cap="none" sz="1100" i="0" b="0" u="none">
-                        <a:solidFill>
-                          <a:srgbClr val="000000">
-                            <a:alpha val="100000"/>
-                          </a:srgbClr>
-                        </a:solidFill>
-                        <a:latin typeface="DejaVu Sans"/>
-                        <a:cs typeface="DejaVu Sans"/>
-                        <a:ea typeface="DejaVu Sans"/>
-                        <a:sym typeface="DejaVu Sans"/>
-                      </a:endParaRPr>
-                      <a:r>
-                        <a:rPr cap="none" sz="1100" i="0" b="0" u="none">
-                          <a:solidFill>
-                            <a:srgbClr val="000000">
-                              <a:alpha val="100000"/>
-                            </a:srgbClr>
-                          </a:solidFill>
-                          <a:latin typeface="DejaVu Sans"/>
-                          <a:cs typeface="DejaVu Sans"/>
-                          <a:ea typeface="DejaVu Sans"/>
-                          <a:sym typeface="DejaVu Sans"/>
-                        </a:rPr>
-                        <a:t/>
                       </a:r>
                     </a:p>
                   </a:txBody>

</xml_diff>

<commit_message>
Update pkgdown documentation 36aedec935b3876dbbf2f5c919f7e219454cbdac
</commit_message>
<xml_diff>
--- a/main/reference/ae.pptx
+++ b/main/reference/ae.pptx
@@ -3932,7 +3932,7 @@
                   </a:tcPr>
                 </a:tc>
               </a:tr>
-              <a:tr h="243582">
+              <a:tr h="213519">
                 <a:tc>
                   <a:txBody>
                     <a:bodyPr/>
@@ -4007,6 +4007,17 @@
                         </a:spcAft>
                         <a:buNone/>
                       </a:pPr>
+                      <a:endParaRPr cap="none" sz="1200" i="0" b="0" u="none">
+                        <a:solidFill>
+                          <a:srgbClr val="000000">
+                            <a:alpha val="100000"/>
+                          </a:srgbClr>
+                        </a:solidFill>
+                        <a:latin typeface="arial"/>
+                        <a:cs typeface="arial"/>
+                        <a:ea typeface="arial"/>
+                        <a:sym typeface="arial"/>
+                      </a:endParaRPr>
                       <a:r>
                         <a:rPr cap="none" sz="1200" i="0" b="0" u="none">
                           <a:solidFill>
@@ -4019,7 +4030,7 @@
                           <a:ea typeface="arial"/>
                           <a:sym typeface="arial"/>
                         </a:rPr>
-                        <a:t>78 (58.2%)</a:t>
+                        <a:t/>
                       </a:r>
                     </a:p>
                   </a:txBody>
@@ -4064,6 +4075,17 @@
                         </a:spcAft>
                         <a:buNone/>
                       </a:pPr>
+                      <a:endParaRPr cap="none" sz="1200" i="0" b="0" u="none">
+                        <a:solidFill>
+                          <a:srgbClr val="000000">
+                            <a:alpha val="100000"/>
+                          </a:srgbClr>
+                        </a:solidFill>
+                        <a:latin typeface="arial"/>
+                        <a:cs typeface="arial"/>
+                        <a:ea typeface="arial"/>
+                        <a:sym typeface="arial"/>
+                      </a:endParaRPr>
                       <a:r>
                         <a:rPr cap="none" sz="1200" i="0" b="0" u="none">
                           <a:solidFill>
@@ -4076,7 +4098,7 @@
                           <a:ea typeface="arial"/>
                           <a:sym typeface="arial"/>
                         </a:rPr>
-                        <a:t>75 (56.0%)</a:t>
+                        <a:t/>
                       </a:r>
                     </a:p>
                   </a:txBody>
@@ -4121,6 +4143,17 @@
                         </a:spcAft>
                         <a:buNone/>
                       </a:pPr>
+                      <a:endParaRPr cap="none" sz="1200" i="0" b="0" u="none">
+                        <a:solidFill>
+                          <a:srgbClr val="000000">
+                            <a:alpha val="100000"/>
+                          </a:srgbClr>
+                        </a:solidFill>
+                        <a:latin typeface="arial"/>
+                        <a:cs typeface="arial"/>
+                        <a:ea typeface="arial"/>
+                        <a:sym typeface="arial"/>
+                      </a:endParaRPr>
                       <a:r>
                         <a:rPr cap="none" sz="1200" i="0" b="0" u="none">
                           <a:solidFill>
@@ -4133,7 +4166,7 @@
                           <a:ea typeface="arial"/>
                           <a:sym typeface="arial"/>
                         </a:rPr>
-                        <a:t>242 (60.5%)</a:t>
+                        <a:t/>
                       </a:r>
                     </a:p>
                   </a:txBody>
@@ -4249,7 +4282,7 @@
                           <a:ea typeface="arial"/>
                           <a:sym typeface="arial"/>
                         </a:rPr>
-                        <a:t>50 (37.3%)</a:t>
+                        <a:t>45 (33.6%)</a:t>
                       </a:r>
                     </a:p>
                   </a:txBody>
@@ -4306,7 +4339,7 @@
                           <a:ea typeface="arial"/>
                           <a:sym typeface="arial"/>
                         </a:rPr>
-                        <a:t>45 (33.6%)</a:t>
+                        <a:t>31 (23.1%)</a:t>
                       </a:r>
                     </a:p>
                   </a:txBody>
@@ -4363,7 +4396,7 @@
                           <a:ea typeface="arial"/>
                           <a:sym typeface="arial"/>
                         </a:rPr>
-                        <a:t>158 (39.5%)</a:t>
+                        <a:t>128 (32.0%)</a:t>
                       </a:r>
                     </a:p>
                   </a:txBody>
@@ -4479,7 +4512,7 @@
                           <a:ea typeface="arial"/>
                           <a:sym typeface="arial"/>
                         </a:rPr>
-                        <a:t>48 (35.8%)</a:t>
+                        <a:t>41 (30.6%)</a:t>
                       </a:r>
                     </a:p>
                   </a:txBody>
@@ -4536,7 +4569,7 @@
                           <a:ea typeface="arial"/>
                           <a:sym typeface="arial"/>
                         </a:rPr>
-                        <a:t>48 (35.8%)</a:t>
+                        <a:t>39 (29.1%)</a:t>
                       </a:r>
                     </a:p>
                   </a:txBody>
@@ -4593,7 +4626,7 @@
                           <a:ea typeface="arial"/>
                           <a:sym typeface="arial"/>
                         </a:rPr>
-                        <a:t>146 (36.5%)</a:t>
+                        <a:t>122 (30.5%)</a:t>
                       </a:r>
                     </a:p>
                   </a:txBody>
@@ -4622,7 +4655,7 @@
                   </a:tcPr>
                 </a:tc>
               </a:tr>
-              <a:tr h="243582">
+              <a:tr h="213519">
                 <a:tc>
                   <a:txBody>
                     <a:bodyPr/>
@@ -4652,7 +4685,7 @@
                           <a:ea typeface="arial"/>
                           <a:sym typeface="arial"/>
                         </a:rPr>
-                        <a:t>cl B.2</a:t>
+                        <a:t>cl B.1</a:t>
                       </a:r>
                     </a:p>
                   </a:txBody>
@@ -4697,6 +4730,17 @@
                         </a:spcAft>
                         <a:buNone/>
                       </a:pPr>
+                      <a:endParaRPr cap="none" sz="1200" i="0" b="0" u="none">
+                        <a:solidFill>
+                          <a:srgbClr val="000000">
+                            <a:alpha val="100000"/>
+                          </a:srgbClr>
+                        </a:solidFill>
+                        <a:latin typeface="arial"/>
+                        <a:cs typeface="arial"/>
+                        <a:ea typeface="arial"/>
+                        <a:sym typeface="arial"/>
+                      </a:endParaRPr>
                       <a:r>
                         <a:rPr cap="none" sz="1200" i="0" b="0" u="none">
                           <a:solidFill>
@@ -4709,7 +4753,7 @@
                           <a:ea typeface="arial"/>
                           <a:sym typeface="arial"/>
                         </a:rPr>
-                        <a:t>79 (59.0%)</a:t>
+                        <a:t/>
                       </a:r>
                     </a:p>
                   </a:txBody>
@@ -4754,6 +4798,17 @@
                         </a:spcAft>
                         <a:buNone/>
                       </a:pPr>
+                      <a:endParaRPr cap="none" sz="1200" i="0" b="0" u="none">
+                        <a:solidFill>
+                          <a:srgbClr val="000000">
+                            <a:alpha val="100000"/>
+                          </a:srgbClr>
+                        </a:solidFill>
+                        <a:latin typeface="arial"/>
+                        <a:cs typeface="arial"/>
+                        <a:ea typeface="arial"/>
+                        <a:sym typeface="arial"/>
+                      </a:endParaRPr>
                       <a:r>
                         <a:rPr cap="none" sz="1200" i="0" b="0" u="none">
                           <a:solidFill>
@@ -4766,7 +4821,7 @@
                           <a:ea typeface="arial"/>
                           <a:sym typeface="arial"/>
                         </a:rPr>
-                        <a:t>74 (55.2%)</a:t>
+                        <a:t/>
                       </a:r>
                     </a:p>
                   </a:txBody>
@@ -4811,6 +4866,17 @@
                         </a:spcAft>
                         <a:buNone/>
                       </a:pPr>
+                      <a:endParaRPr cap="none" sz="1200" i="0" b="0" u="none">
+                        <a:solidFill>
+                          <a:srgbClr val="000000">
+                            <a:alpha val="100000"/>
+                          </a:srgbClr>
+                        </a:solidFill>
+                        <a:latin typeface="arial"/>
+                        <a:cs typeface="arial"/>
+                        <a:ea typeface="arial"/>
+                        <a:sym typeface="arial"/>
+                      </a:endParaRPr>
                       <a:r>
                         <a:rPr cap="none" sz="1200" i="0" b="0" u="none">
                           <a:solidFill>
@@ -4823,7 +4889,7 @@
                           <a:ea typeface="arial"/>
                           <a:sym typeface="arial"/>
                         </a:rPr>
-                        <a:t>238 (59.5%)</a:t>
+                        <a:t/>
                       </a:r>
                     </a:p>
                   </a:txBody>
@@ -4882,7 +4948,7 @@
                           <a:ea typeface="arial"/>
                           <a:sym typeface="arial"/>
                         </a:rPr>
-                        <a:t>dcd B.2.2.3.1</a:t>
+                        <a:t>dcd B.1.1.1.1</a:t>
                       </a:r>
                     </a:p>
                   </a:txBody>
@@ -4939,7 +5005,7 @@
                           <a:ea typeface="arial"/>
                           <a:sym typeface="arial"/>
                         </a:rPr>
-                        <a:t>48 (35.8%)</a:t>
+                        <a:t>38 (28.4%)</a:t>
                       </a:r>
                     </a:p>
                   </a:txBody>
@@ -4996,7 +5062,7 @@
                           <a:ea typeface="arial"/>
                           <a:sym typeface="arial"/>
                         </a:rPr>
-                        <a:t>54 (40.3%)</a:t>
+                        <a:t>37 (27.6%)</a:t>
                       </a:r>
                     </a:p>
                   </a:txBody>
@@ -5053,7 +5119,7 @@
                           <a:ea typeface="arial"/>
                           <a:sym typeface="arial"/>
                         </a:rPr>
-                        <a:t>153 (38.2%)</a:t>
+                        <a:t>111 (27.8%)</a:t>
                       </a:r>
                     </a:p>
                   </a:txBody>
@@ -5082,7 +5148,7 @@
                   </a:tcPr>
                 </a:tc>
               </a:tr>
-              <a:tr h="243582">
+              <a:tr h="213519">
                 <a:tc>
                   <a:txBody>
                     <a:bodyPr/>
@@ -5112,7 +5178,7 @@
                           <a:ea typeface="arial"/>
                           <a:sym typeface="arial"/>
                         </a:rPr>
-                        <a:t>dcd B.2.1.2.1</a:t>
+                        <a:t>cl B.2</a:t>
                       </a:r>
                     </a:p>
                   </a:txBody>
@@ -5157,6 +5223,17 @@
                         </a:spcAft>
                         <a:buNone/>
                       </a:pPr>
+                      <a:endParaRPr cap="none" sz="1200" i="0" b="0" u="none">
+                        <a:solidFill>
+                          <a:srgbClr val="000000">
+                            <a:alpha val="100000"/>
+                          </a:srgbClr>
+                        </a:solidFill>
+                        <a:latin typeface="arial"/>
+                        <a:cs typeface="arial"/>
+                        <a:ea typeface="arial"/>
+                        <a:sym typeface="arial"/>
+                      </a:endParaRPr>
                       <a:r>
                         <a:rPr cap="none" sz="1200" i="0" b="0" u="none">
                           <a:solidFill>
@@ -5169,7 +5246,7 @@
                           <a:ea typeface="arial"/>
                           <a:sym typeface="arial"/>
                         </a:rPr>
-                        <a:t>49 (36.6%)</a:t>
+                        <a:t/>
                       </a:r>
                     </a:p>
                   </a:txBody>
@@ -5214,6 +5291,17 @@
                         </a:spcAft>
                         <a:buNone/>
                       </a:pPr>
+                      <a:endParaRPr cap="none" sz="1200" i="0" b="0" u="none">
+                        <a:solidFill>
+                          <a:srgbClr val="000000">
+                            <a:alpha val="100000"/>
+                          </a:srgbClr>
+                        </a:solidFill>
+                        <a:latin typeface="arial"/>
+                        <a:cs typeface="arial"/>
+                        <a:ea typeface="arial"/>
+                        <a:sym typeface="arial"/>
+                      </a:endParaRPr>
                       <a:r>
                         <a:rPr cap="none" sz="1200" i="0" b="0" u="none">
                           <a:solidFill>
@@ -5226,7 +5314,7 @@
                           <a:ea typeface="arial"/>
                           <a:sym typeface="arial"/>
                         </a:rPr>
-                        <a:t>44 (32.8%)</a:t>
+                        <a:t/>
                       </a:r>
                     </a:p>
                   </a:txBody>
@@ -5271,6 +5359,17 @@
                         </a:spcAft>
                         <a:buNone/>
                       </a:pPr>
+                      <a:endParaRPr cap="none" sz="1200" i="0" b="0" u="none">
+                        <a:solidFill>
+                          <a:srgbClr val="000000">
+                            <a:alpha val="100000"/>
+                          </a:srgbClr>
+                        </a:solidFill>
+                        <a:latin typeface="arial"/>
+                        <a:cs typeface="arial"/>
+                        <a:ea typeface="arial"/>
+                        <a:sym typeface="arial"/>
+                      </a:endParaRPr>
                       <a:r>
                         <a:rPr cap="none" sz="1200" i="0" b="0" u="none">
                           <a:solidFill>
@@ -5283,7 +5382,7 @@
                           <a:ea typeface="arial"/>
                           <a:sym typeface="arial"/>
                         </a:rPr>
-                        <a:t>145 (36.2%)</a:t>
+                        <a:t/>
                       </a:r>
                     </a:p>
                   </a:txBody>
@@ -5342,7 +5441,7 @@
                           <a:ea typeface="arial"/>
                           <a:sym typeface="arial"/>
                         </a:rPr>
-                        <a:t>cl D.1</a:t>
+                        <a:t>dcd B.2.2.3.1</a:t>
                       </a:r>
                     </a:p>
                   </a:txBody>
@@ -5399,7 +5498,7 @@
                           <a:ea typeface="arial"/>
                           <a:sym typeface="arial"/>
                         </a:rPr>
-                        <a:t>79 (59.0%)</a:t>
+                        <a:t>38 (28.4%)</a:t>
                       </a:r>
                     </a:p>
                   </a:txBody>
@@ -5456,7 +5555,7 @@
                           <a:ea typeface="arial"/>
                           <a:sym typeface="arial"/>
                         </a:rPr>
-                        <a:t>67 (50.0%)</a:t>
+                        <a:t>40 (29.9%)</a:t>
                       </a:r>
                     </a:p>
                   </a:txBody>
@@ -5513,7 +5612,7 @@
                           <a:ea typeface="arial"/>
                           <a:sym typeface="arial"/>
                         </a:rPr>
-                        <a:t>226 (56.5%)</a:t>
+                        <a:t>123 (30.8%)</a:t>
                       </a:r>
                     </a:p>
                   </a:txBody>
@@ -5548,7 +5647,7 @@
                     <a:bodyPr/>
                     <a:lstStyle/>
                     <a:p>
-                      <a:pPr algn="l" marL="127000" marR="63500">
+                      <a:pPr algn="ctr" marL="63500" marR="63500">
                         <a:lnSpc>
                           <a:spcPct val="100000"/>
                         </a:lnSpc>
@@ -5572,7 +5671,7 @@
                           <a:ea typeface="arial"/>
                           <a:sym typeface="arial"/>
                         </a:rPr>
-                        <a:t>dcd D.1.1.1.1</a:t>
+                        <a:t>dcd B.2.1.2.1</a:t>
                       </a:r>
                     </a:p>
                   </a:txBody>
@@ -5629,7 +5728,7 @@
                           <a:ea typeface="arial"/>
                           <a:sym typeface="arial"/>
                         </a:rPr>
-                        <a:t>50 (37.3%)</a:t>
+                        <a:t>39 (29.1%)</a:t>
                       </a:r>
                     </a:p>
                   </a:txBody>
@@ -5686,7 +5785,7 @@
                           <a:ea typeface="arial"/>
                           <a:sym typeface="arial"/>
                         </a:rPr>
-                        <a:t>42 (31.3%)</a:t>
+                        <a:t>34 (25.4%)</a:t>
                       </a:r>
                     </a:p>
                   </a:txBody>
@@ -5743,7 +5842,7 @@
                           <a:ea typeface="arial"/>
                           <a:sym typeface="arial"/>
                         </a:rPr>
-                        <a:t>143 (35.8%)</a:t>
+                        <a:t>119 (29.8%)</a:t>
                       </a:r>
                     </a:p>
                   </a:txBody>
@@ -5766,236 +5865,6 @@
                     </a:lnB>
                     <a:solidFill>
                       <a:srgbClr val="FF7D29">
-                        <a:alpha val="100000"/>
-                      </a:srgbClr>
-                    </a:solidFill>
-                  </a:tcPr>
-                </a:tc>
-              </a:tr>
-              <a:tr h="243582">
-                <a:tc>
-                  <a:txBody>
-                    <a:bodyPr/>
-                    <a:lstStyle/>
-                    <a:p>
-                      <a:pPr algn="ctr" marL="63500" marR="63500">
-                        <a:lnSpc>
-                          <a:spcPct val="100000"/>
-                        </a:lnSpc>
-                        <a:spcBef>
-                          <a:spcPts val="300"/>
-                        </a:spcBef>
-                        <a:spcAft>
-                          <a:spcPts val="300"/>
-                        </a:spcAft>
-                        <a:buNone/>
-                      </a:pPr>
-                      <a:r>
-                        <a:rPr cap="none" sz="1200" i="0" b="0" u="none">
-                          <a:solidFill>
-                            <a:srgbClr val="000000">
-                              <a:alpha val="100000"/>
-                            </a:srgbClr>
-                          </a:solidFill>
-                          <a:latin typeface="arial"/>
-                          <a:cs typeface="arial"/>
-                          <a:ea typeface="arial"/>
-                          <a:sym typeface="arial"/>
-                        </a:rPr>
-                        <a:t>dcd D.1.1.4.2</a:t>
-                      </a:r>
-                    </a:p>
-                  </a:txBody>
-                  <a:tcPr anchor="ctr" marB="38100" marT="38100" marR="0" marL="0">
-                    <a:lnL algn="ctr" cmpd="sng" cap="flat" w="0">
-                      <a:noFill/>
-                      <a:prstDash val="solid"/>
-                    </a:lnL>
-                    <a:lnR algn="ctr" cmpd="sng" cap="flat" w="0">
-                      <a:noFill/>
-                      <a:prstDash val="solid"/>
-                    </a:lnR>
-                    <a:lnT algn="ctr" cmpd="sng" cap="flat" w="0">
-                      <a:noFill/>
-                      <a:prstDash val="solid"/>
-                    </a:lnT>
-                    <a:lnB algn="ctr" cmpd="sng" cap="flat" w="0">
-                      <a:noFill/>
-                      <a:prstDash val="solid"/>
-                    </a:lnB>
-                    <a:solidFill>
-                      <a:srgbClr val="FFBD69">
-                        <a:alpha val="100000"/>
-                      </a:srgbClr>
-                    </a:solidFill>
-                  </a:tcPr>
-                </a:tc>
-                <a:tc>
-                  <a:txBody>
-                    <a:bodyPr/>
-                    <a:lstStyle/>
-                    <a:p>
-                      <a:pPr algn="ctr" marL="63500" marR="63500">
-                        <a:lnSpc>
-                          <a:spcPct val="100000"/>
-                        </a:lnSpc>
-                        <a:spcBef>
-                          <a:spcPts val="300"/>
-                        </a:spcBef>
-                        <a:spcAft>
-                          <a:spcPts val="300"/>
-                        </a:spcAft>
-                        <a:buNone/>
-                      </a:pPr>
-                      <a:r>
-                        <a:rPr cap="none" sz="1200" i="0" b="0" u="none">
-                          <a:solidFill>
-                            <a:srgbClr val="000000">
-                              <a:alpha val="100000"/>
-                            </a:srgbClr>
-                          </a:solidFill>
-                          <a:latin typeface="arial"/>
-                          <a:cs typeface="arial"/>
-                          <a:ea typeface="arial"/>
-                          <a:sym typeface="arial"/>
-                        </a:rPr>
-                        <a:t>48 (35.8%)</a:t>
-                      </a:r>
-                    </a:p>
-                  </a:txBody>
-                  <a:tcPr anchor="ctr" marB="38100" marT="38100" marR="0" marL="0">
-                    <a:lnL algn="ctr" cmpd="sng" cap="flat" w="0">
-                      <a:noFill/>
-                      <a:prstDash val="solid"/>
-                    </a:lnL>
-                    <a:lnR algn="ctr" cmpd="sng" cap="flat" w="0">
-                      <a:noFill/>
-                      <a:prstDash val="solid"/>
-                    </a:lnR>
-                    <a:lnT algn="ctr" cmpd="sng" cap="flat" w="0">
-                      <a:noFill/>
-                      <a:prstDash val="solid"/>
-                    </a:lnT>
-                    <a:lnB algn="ctr" cmpd="sng" cap="flat" w="0">
-                      <a:noFill/>
-                      <a:prstDash val="solid"/>
-                    </a:lnB>
-                    <a:solidFill>
-                      <a:srgbClr val="FFBD69">
-                        <a:alpha val="100000"/>
-                      </a:srgbClr>
-                    </a:solidFill>
-                  </a:tcPr>
-                </a:tc>
-                <a:tc>
-                  <a:txBody>
-                    <a:bodyPr/>
-                    <a:lstStyle/>
-                    <a:p>
-                      <a:pPr algn="ctr" marL="63500" marR="63500">
-                        <a:lnSpc>
-                          <a:spcPct val="100000"/>
-                        </a:lnSpc>
-                        <a:spcBef>
-                          <a:spcPts val="300"/>
-                        </a:spcBef>
-                        <a:spcAft>
-                          <a:spcPts val="300"/>
-                        </a:spcAft>
-                        <a:buNone/>
-                      </a:pPr>
-                      <a:r>
-                        <a:rPr cap="none" sz="1200" i="0" b="0" u="none">
-                          <a:solidFill>
-                            <a:srgbClr val="000000">
-                              <a:alpha val="100000"/>
-                            </a:srgbClr>
-                          </a:solidFill>
-                          <a:latin typeface="arial"/>
-                          <a:cs typeface="arial"/>
-                          <a:ea typeface="arial"/>
-                          <a:sym typeface="arial"/>
-                        </a:rPr>
-                        <a:t>42 (31.3%)</a:t>
-                      </a:r>
-                    </a:p>
-                  </a:txBody>
-                  <a:tcPr anchor="ctr" marB="38100" marT="38100" marR="0" marL="0">
-                    <a:lnL algn="ctr" cmpd="sng" cap="flat" w="0">
-                      <a:noFill/>
-                      <a:prstDash val="solid"/>
-                    </a:lnL>
-                    <a:lnR algn="ctr" cmpd="sng" cap="flat" w="0">
-                      <a:noFill/>
-                      <a:prstDash val="solid"/>
-                    </a:lnR>
-                    <a:lnT algn="ctr" cmpd="sng" cap="flat" w="0">
-                      <a:noFill/>
-                      <a:prstDash val="solid"/>
-                    </a:lnT>
-                    <a:lnB algn="ctr" cmpd="sng" cap="flat" w="0">
-                      <a:noFill/>
-                      <a:prstDash val="solid"/>
-                    </a:lnB>
-                    <a:solidFill>
-                      <a:srgbClr val="FFBD69">
-                        <a:alpha val="100000"/>
-                      </a:srgbClr>
-                    </a:solidFill>
-                  </a:tcPr>
-                </a:tc>
-                <a:tc>
-                  <a:txBody>
-                    <a:bodyPr/>
-                    <a:lstStyle/>
-                    <a:p>
-                      <a:pPr algn="ctr" marL="63500" marR="63500">
-                        <a:lnSpc>
-                          <a:spcPct val="100000"/>
-                        </a:lnSpc>
-                        <a:spcBef>
-                          <a:spcPts val="300"/>
-                        </a:spcBef>
-                        <a:spcAft>
-                          <a:spcPts val="300"/>
-                        </a:spcAft>
-                        <a:buNone/>
-                      </a:pPr>
-                      <a:r>
-                        <a:rPr cap="none" sz="1200" i="0" b="0" u="none">
-                          <a:solidFill>
-                            <a:srgbClr val="000000">
-                              <a:alpha val="100000"/>
-                            </a:srgbClr>
-                          </a:solidFill>
-                          <a:latin typeface="arial"/>
-                          <a:cs typeface="arial"/>
-                          <a:ea typeface="arial"/>
-                          <a:sym typeface="arial"/>
-                        </a:rPr>
-                        <a:t>140 (35.0%)</a:t>
-                      </a:r>
-                    </a:p>
-                  </a:txBody>
-                  <a:tcPr anchor="ctr" marB="38100" marT="38100" marR="0" marL="0">
-                    <a:lnL algn="ctr" cmpd="sng" cap="flat" w="0">
-                      <a:noFill/>
-                      <a:prstDash val="solid"/>
-                    </a:lnL>
-                    <a:lnR algn="ctr" cmpd="sng" cap="flat" w="0">
-                      <a:noFill/>
-                      <a:prstDash val="solid"/>
-                    </a:lnR>
-                    <a:lnT algn="ctr" cmpd="sng" cap="flat" w="0">
-                      <a:noFill/>
-                      <a:prstDash val="solid"/>
-                    </a:lnT>
-                    <a:lnB algn="ctr" cmpd="sng" cap="flat" w="0">
-                      <a:noFill/>
-                      <a:prstDash val="solid"/>
-                    </a:lnB>
-                    <a:solidFill>
-                      <a:srgbClr val="FFBD69">
                         <a:alpha val="100000"/>
                       </a:srgbClr>
                     </a:solidFill>
@@ -6355,7 +6224,7 @@
                 <a:ea typeface="Arial"/>
                 <a:sym typeface="Arial"/>
               </a:rPr>
-              <a:t>AE event table</a:t>
+              <a:t>Adverse Events table</a:t>
             </a:r>
           </a:p>
         </p:txBody>
@@ -6914,7 +6783,7 @@
                   </a:tcPr>
                 </a:tc>
               </a:tr>
-              <a:tr h="243582">
+              <a:tr h="213519">
                 <a:tc>
                   <a:txBody>
                     <a:bodyPr/>
@@ -6944,7 +6813,7 @@
                           <a:ea typeface="arial"/>
                           <a:sym typeface="arial"/>
                         </a:rPr>
-                        <a:t>cl D.2</a:t>
+                        <a:t>cl C.1</a:t>
                       </a:r>
                     </a:p>
                   </a:txBody>
@@ -6989,6 +6858,17 @@
                         </a:spcAft>
                         <a:buNone/>
                       </a:pPr>
+                      <a:endParaRPr cap="none" sz="1200" i="0" b="0" u="none">
+                        <a:solidFill>
+                          <a:srgbClr val="000000">
+                            <a:alpha val="100000"/>
+                          </a:srgbClr>
+                        </a:solidFill>
+                        <a:latin typeface="arial"/>
+                        <a:cs typeface="arial"/>
+                        <a:ea typeface="arial"/>
+                        <a:sym typeface="arial"/>
+                      </a:endParaRPr>
                       <a:r>
                         <a:rPr cap="none" sz="1200" i="0" b="0" u="none">
                           <a:solidFill>
@@ -7001,7 +6881,7 @@
                           <a:ea typeface="arial"/>
                           <a:sym typeface="arial"/>
                         </a:rPr>
-                        <a:t>47 (35.1%)</a:t>
+                        <a:t/>
                       </a:r>
                     </a:p>
                   </a:txBody>
@@ -7046,6 +6926,17 @@
                         </a:spcAft>
                         <a:buNone/>
                       </a:pPr>
+                      <a:endParaRPr cap="none" sz="1200" i="0" b="0" u="none">
+                        <a:solidFill>
+                          <a:srgbClr val="000000">
+                            <a:alpha val="100000"/>
+                          </a:srgbClr>
+                        </a:solidFill>
+                        <a:latin typeface="arial"/>
+                        <a:cs typeface="arial"/>
+                        <a:ea typeface="arial"/>
+                        <a:sym typeface="arial"/>
+                      </a:endParaRPr>
                       <a:r>
                         <a:rPr cap="none" sz="1200" i="0" b="0" u="none">
                           <a:solidFill>
@@ -7058,7 +6949,7 @@
                           <a:ea typeface="arial"/>
                           <a:sym typeface="arial"/>
                         </a:rPr>
-                        <a:t>58 (43.3%)</a:t>
+                        <a:t/>
                       </a:r>
                     </a:p>
                   </a:txBody>
@@ -7103,6 +6994,17 @@
                         </a:spcAft>
                         <a:buNone/>
                       </a:pPr>
+                      <a:endParaRPr cap="none" sz="1200" i="0" b="0" u="none">
+                        <a:solidFill>
+                          <a:srgbClr val="000000">
+                            <a:alpha val="100000"/>
+                          </a:srgbClr>
+                        </a:solidFill>
+                        <a:latin typeface="arial"/>
+                        <a:cs typeface="arial"/>
+                        <a:ea typeface="arial"/>
+                        <a:sym typeface="arial"/>
+                      </a:endParaRPr>
                       <a:r>
                         <a:rPr cap="none" sz="1200" i="0" b="0" u="none">
                           <a:solidFill>
@@ -7115,7 +7017,7 @@
                           <a:ea typeface="arial"/>
                           <a:sym typeface="arial"/>
                         </a:rPr>
-                        <a:t>162 (40.5%)</a:t>
+                        <a:t/>
                       </a:r>
                     </a:p>
                   </a:txBody>
@@ -7174,7 +7076,7 @@
                           <a:ea typeface="arial"/>
                           <a:sym typeface="arial"/>
                         </a:rPr>
-                        <a:t>dcd D.2.1.5.3</a:t>
+                        <a:t>dcd C.1.1.1.3</a:t>
                       </a:r>
                     </a:p>
                   </a:txBody>
@@ -7231,7 +7133,7 @@
                           <a:ea typeface="arial"/>
                           <a:sym typeface="arial"/>
                         </a:rPr>
-                        <a:t>47 (35.1%)</a:t>
+                        <a:t>36 (26.9%)</a:t>
                       </a:r>
                     </a:p>
                   </a:txBody>
@@ -7288,7 +7190,7 @@
                           <a:ea typeface="arial"/>
                           <a:sym typeface="arial"/>
                         </a:rPr>
-                        <a:t>58 (43.3%)</a:t>
+                        <a:t>34 (25.4%)</a:t>
                       </a:r>
                     </a:p>
                   </a:txBody>
@@ -7345,7 +7247,993 @@
                           <a:ea typeface="arial"/>
                           <a:sym typeface="arial"/>
                         </a:rPr>
-                        <a:t>162 (40.5%)</a:t>
+                        <a:t>106 (26.5%)</a:t>
+                      </a:r>
+                    </a:p>
+                  </a:txBody>
+                  <a:tcPr anchor="ctr" marB="38100" marT="38100" marR="0" marL="0">
+                    <a:lnL algn="ctr" cmpd="sng" cap="flat" w="0">
+                      <a:noFill/>
+                      <a:prstDash val="solid"/>
+                    </a:lnL>
+                    <a:lnR algn="ctr" cmpd="sng" cap="flat" w="0">
+                      <a:noFill/>
+                      <a:prstDash val="solid"/>
+                    </a:lnR>
+                    <a:lnT algn="ctr" cmpd="sng" cap="flat" w="0">
+                      <a:noFill/>
+                      <a:prstDash val="solid"/>
+                    </a:lnT>
+                    <a:lnB algn="ctr" cmpd="sng" cap="flat" w="0">
+                      <a:noFill/>
+                      <a:prstDash val="solid"/>
+                    </a:lnB>
+                    <a:solidFill>
+                      <a:srgbClr val="FF7D29">
+                        <a:alpha val="100000"/>
+                      </a:srgbClr>
+                    </a:solidFill>
+                  </a:tcPr>
+                </a:tc>
+              </a:tr>
+              <a:tr h="213519">
+                <a:tc>
+                  <a:txBody>
+                    <a:bodyPr/>
+                    <a:lstStyle/>
+                    <a:p>
+                      <a:pPr algn="l" marL="127000" marR="63500">
+                        <a:lnSpc>
+                          <a:spcPct val="100000"/>
+                        </a:lnSpc>
+                        <a:spcBef>
+                          <a:spcPts val="300"/>
+                        </a:spcBef>
+                        <a:spcAft>
+                          <a:spcPts val="300"/>
+                        </a:spcAft>
+                        <a:buNone/>
+                      </a:pPr>
+                      <a:r>
+                        <a:rPr cap="none" sz="1200" i="0" b="0" u="none">
+                          <a:solidFill>
+                            <a:srgbClr val="000000">
+                              <a:alpha val="100000"/>
+                            </a:srgbClr>
+                          </a:solidFill>
+                          <a:latin typeface="arial"/>
+                          <a:cs typeface="arial"/>
+                          <a:ea typeface="arial"/>
+                          <a:sym typeface="arial"/>
+                        </a:rPr>
+                        <a:t>cl C.2</a:t>
+                      </a:r>
+                    </a:p>
+                  </a:txBody>
+                  <a:tcPr anchor="ctr" marB="38100" marT="38100" marR="0" marL="0">
+                    <a:lnL algn="ctr" cmpd="sng" cap="flat" w="0">
+                      <a:noFill/>
+                      <a:prstDash val="solid"/>
+                    </a:lnL>
+                    <a:lnR algn="ctr" cmpd="sng" cap="flat" w="0">
+                      <a:noFill/>
+                      <a:prstDash val="solid"/>
+                    </a:lnR>
+                    <a:lnT algn="ctr" cmpd="sng" cap="flat" w="0">
+                      <a:noFill/>
+                      <a:prstDash val="solid"/>
+                    </a:lnT>
+                    <a:lnB algn="ctr" cmpd="sng" cap="flat" w="0">
+                      <a:noFill/>
+                      <a:prstDash val="solid"/>
+                    </a:lnB>
+                    <a:solidFill>
+                      <a:srgbClr val="FFBD69">
+                        <a:alpha val="100000"/>
+                      </a:srgbClr>
+                    </a:solidFill>
+                  </a:tcPr>
+                </a:tc>
+                <a:tc>
+                  <a:txBody>
+                    <a:bodyPr/>
+                    <a:lstStyle/>
+                    <a:p>
+                      <a:pPr algn="ctr" marL="63500" marR="63500">
+                        <a:lnSpc>
+                          <a:spcPct val="100000"/>
+                        </a:lnSpc>
+                        <a:spcBef>
+                          <a:spcPts val="300"/>
+                        </a:spcBef>
+                        <a:spcAft>
+                          <a:spcPts val="300"/>
+                        </a:spcAft>
+                        <a:buNone/>
+                      </a:pPr>
+                      <a:endParaRPr cap="none" sz="1200" i="0" b="0" u="none">
+                        <a:solidFill>
+                          <a:srgbClr val="000000">
+                            <a:alpha val="100000"/>
+                          </a:srgbClr>
+                        </a:solidFill>
+                        <a:latin typeface="arial"/>
+                        <a:cs typeface="arial"/>
+                        <a:ea typeface="arial"/>
+                        <a:sym typeface="arial"/>
+                      </a:endParaRPr>
+                      <a:r>
+                        <a:rPr cap="none" sz="1200" i="0" b="0" u="none">
+                          <a:solidFill>
+                            <a:srgbClr val="000000">
+                              <a:alpha val="100000"/>
+                            </a:srgbClr>
+                          </a:solidFill>
+                          <a:latin typeface="arial"/>
+                          <a:cs typeface="arial"/>
+                          <a:ea typeface="arial"/>
+                          <a:sym typeface="arial"/>
+                        </a:rPr>
+                        <a:t/>
+                      </a:r>
+                    </a:p>
+                  </a:txBody>
+                  <a:tcPr anchor="ctr" marB="38100" marT="38100" marR="0" marL="0">
+                    <a:lnL algn="ctr" cmpd="sng" cap="flat" w="0">
+                      <a:noFill/>
+                      <a:prstDash val="solid"/>
+                    </a:lnL>
+                    <a:lnR algn="ctr" cmpd="sng" cap="flat" w="0">
+                      <a:noFill/>
+                      <a:prstDash val="solid"/>
+                    </a:lnR>
+                    <a:lnT algn="ctr" cmpd="sng" cap="flat" w="0">
+                      <a:noFill/>
+                      <a:prstDash val="solid"/>
+                    </a:lnT>
+                    <a:lnB algn="ctr" cmpd="sng" cap="flat" w="0">
+                      <a:noFill/>
+                      <a:prstDash val="solid"/>
+                    </a:lnB>
+                    <a:solidFill>
+                      <a:srgbClr val="FFBD69">
+                        <a:alpha val="100000"/>
+                      </a:srgbClr>
+                    </a:solidFill>
+                  </a:tcPr>
+                </a:tc>
+                <a:tc>
+                  <a:txBody>
+                    <a:bodyPr/>
+                    <a:lstStyle/>
+                    <a:p>
+                      <a:pPr algn="ctr" marL="63500" marR="63500">
+                        <a:lnSpc>
+                          <a:spcPct val="100000"/>
+                        </a:lnSpc>
+                        <a:spcBef>
+                          <a:spcPts val="300"/>
+                        </a:spcBef>
+                        <a:spcAft>
+                          <a:spcPts val="300"/>
+                        </a:spcAft>
+                        <a:buNone/>
+                      </a:pPr>
+                      <a:endParaRPr cap="none" sz="1200" i="0" b="0" u="none">
+                        <a:solidFill>
+                          <a:srgbClr val="000000">
+                            <a:alpha val="100000"/>
+                          </a:srgbClr>
+                        </a:solidFill>
+                        <a:latin typeface="arial"/>
+                        <a:cs typeface="arial"/>
+                        <a:ea typeface="arial"/>
+                        <a:sym typeface="arial"/>
+                      </a:endParaRPr>
+                      <a:r>
+                        <a:rPr cap="none" sz="1200" i="0" b="0" u="none">
+                          <a:solidFill>
+                            <a:srgbClr val="000000">
+                              <a:alpha val="100000"/>
+                            </a:srgbClr>
+                          </a:solidFill>
+                          <a:latin typeface="arial"/>
+                          <a:cs typeface="arial"/>
+                          <a:ea typeface="arial"/>
+                          <a:sym typeface="arial"/>
+                        </a:rPr>
+                        <a:t/>
+                      </a:r>
+                    </a:p>
+                  </a:txBody>
+                  <a:tcPr anchor="ctr" marB="38100" marT="38100" marR="0" marL="0">
+                    <a:lnL algn="ctr" cmpd="sng" cap="flat" w="0">
+                      <a:noFill/>
+                      <a:prstDash val="solid"/>
+                    </a:lnL>
+                    <a:lnR algn="ctr" cmpd="sng" cap="flat" w="0">
+                      <a:noFill/>
+                      <a:prstDash val="solid"/>
+                    </a:lnR>
+                    <a:lnT algn="ctr" cmpd="sng" cap="flat" w="0">
+                      <a:noFill/>
+                      <a:prstDash val="solid"/>
+                    </a:lnT>
+                    <a:lnB algn="ctr" cmpd="sng" cap="flat" w="0">
+                      <a:noFill/>
+                      <a:prstDash val="solid"/>
+                    </a:lnB>
+                    <a:solidFill>
+                      <a:srgbClr val="FFBD69">
+                        <a:alpha val="100000"/>
+                      </a:srgbClr>
+                    </a:solidFill>
+                  </a:tcPr>
+                </a:tc>
+                <a:tc>
+                  <a:txBody>
+                    <a:bodyPr/>
+                    <a:lstStyle/>
+                    <a:p>
+                      <a:pPr algn="ctr" marL="63500" marR="63500">
+                        <a:lnSpc>
+                          <a:spcPct val="100000"/>
+                        </a:lnSpc>
+                        <a:spcBef>
+                          <a:spcPts val="300"/>
+                        </a:spcBef>
+                        <a:spcAft>
+                          <a:spcPts val="300"/>
+                        </a:spcAft>
+                        <a:buNone/>
+                      </a:pPr>
+                      <a:endParaRPr cap="none" sz="1200" i="0" b="0" u="none">
+                        <a:solidFill>
+                          <a:srgbClr val="000000">
+                            <a:alpha val="100000"/>
+                          </a:srgbClr>
+                        </a:solidFill>
+                        <a:latin typeface="arial"/>
+                        <a:cs typeface="arial"/>
+                        <a:ea typeface="arial"/>
+                        <a:sym typeface="arial"/>
+                      </a:endParaRPr>
+                      <a:r>
+                        <a:rPr cap="none" sz="1200" i="0" b="0" u="none">
+                          <a:solidFill>
+                            <a:srgbClr val="000000">
+                              <a:alpha val="100000"/>
+                            </a:srgbClr>
+                          </a:solidFill>
+                          <a:latin typeface="arial"/>
+                          <a:cs typeface="arial"/>
+                          <a:ea typeface="arial"/>
+                          <a:sym typeface="arial"/>
+                        </a:rPr>
+                        <a:t/>
+                      </a:r>
+                    </a:p>
+                  </a:txBody>
+                  <a:tcPr anchor="ctr" marB="38100" marT="38100" marR="0" marL="0">
+                    <a:lnL algn="ctr" cmpd="sng" cap="flat" w="0">
+                      <a:noFill/>
+                      <a:prstDash val="solid"/>
+                    </a:lnL>
+                    <a:lnR algn="ctr" cmpd="sng" cap="flat" w="0">
+                      <a:noFill/>
+                      <a:prstDash val="solid"/>
+                    </a:lnR>
+                    <a:lnT algn="ctr" cmpd="sng" cap="flat" w="0">
+                      <a:noFill/>
+                      <a:prstDash val="solid"/>
+                    </a:lnT>
+                    <a:lnB algn="ctr" cmpd="sng" cap="flat" w="0">
+                      <a:noFill/>
+                      <a:prstDash val="solid"/>
+                    </a:lnB>
+                    <a:solidFill>
+                      <a:srgbClr val="FFBD69">
+                        <a:alpha val="100000"/>
+                      </a:srgbClr>
+                    </a:solidFill>
+                  </a:tcPr>
+                </a:tc>
+              </a:tr>
+              <a:tr h="243582">
+                <a:tc>
+                  <a:txBody>
+                    <a:bodyPr/>
+                    <a:lstStyle/>
+                    <a:p>
+                      <a:pPr algn="l" marL="127000" marR="63500">
+                        <a:lnSpc>
+                          <a:spcPct val="100000"/>
+                        </a:lnSpc>
+                        <a:spcBef>
+                          <a:spcPts val="300"/>
+                        </a:spcBef>
+                        <a:spcAft>
+                          <a:spcPts val="300"/>
+                        </a:spcAft>
+                        <a:buNone/>
+                      </a:pPr>
+                      <a:r>
+                        <a:rPr cap="none" sz="1200" i="0" b="0" u="none">
+                          <a:solidFill>
+                            <a:srgbClr val="000000">
+                              <a:alpha val="100000"/>
+                            </a:srgbClr>
+                          </a:solidFill>
+                          <a:latin typeface="arial"/>
+                          <a:cs typeface="arial"/>
+                          <a:ea typeface="arial"/>
+                          <a:sym typeface="arial"/>
+                        </a:rPr>
+                        <a:t>dcd C.2.1.2.1</a:t>
+                      </a:r>
+                    </a:p>
+                  </a:txBody>
+                  <a:tcPr anchor="ctr" marB="38100" marT="38100" marR="0" marL="0">
+                    <a:lnL algn="ctr" cmpd="sng" cap="flat" w="0">
+                      <a:noFill/>
+                      <a:prstDash val="solid"/>
+                    </a:lnL>
+                    <a:lnR algn="ctr" cmpd="sng" cap="flat" w="0">
+                      <a:noFill/>
+                      <a:prstDash val="solid"/>
+                    </a:lnR>
+                    <a:lnT algn="ctr" cmpd="sng" cap="flat" w="0">
+                      <a:noFill/>
+                      <a:prstDash val="solid"/>
+                    </a:lnT>
+                    <a:lnB algn="ctr" cmpd="sng" cap="flat" w="0">
+                      <a:noFill/>
+                      <a:prstDash val="solid"/>
+                    </a:lnB>
+                    <a:solidFill>
+                      <a:srgbClr val="FF7D29">
+                        <a:alpha val="100000"/>
+                      </a:srgbClr>
+                    </a:solidFill>
+                  </a:tcPr>
+                </a:tc>
+                <a:tc>
+                  <a:txBody>
+                    <a:bodyPr/>
+                    <a:lstStyle/>
+                    <a:p>
+                      <a:pPr algn="ctr" marL="63500" marR="63500">
+                        <a:lnSpc>
+                          <a:spcPct val="100000"/>
+                        </a:lnSpc>
+                        <a:spcBef>
+                          <a:spcPts val="300"/>
+                        </a:spcBef>
+                        <a:spcAft>
+                          <a:spcPts val="300"/>
+                        </a:spcAft>
+                        <a:buNone/>
+                      </a:pPr>
+                      <a:r>
+                        <a:rPr cap="none" sz="1200" i="0" b="0" u="none">
+                          <a:solidFill>
+                            <a:srgbClr val="000000">
+                              <a:alpha val="100000"/>
+                            </a:srgbClr>
+                          </a:solidFill>
+                          <a:latin typeface="arial"/>
+                          <a:cs typeface="arial"/>
+                          <a:ea typeface="arial"/>
+                          <a:sym typeface="arial"/>
+                        </a:rPr>
+                        <a:t>28 (20.9%)</a:t>
+                      </a:r>
+                    </a:p>
+                  </a:txBody>
+                  <a:tcPr anchor="ctr" marB="38100" marT="38100" marR="0" marL="0">
+                    <a:lnL algn="ctr" cmpd="sng" cap="flat" w="0">
+                      <a:noFill/>
+                      <a:prstDash val="solid"/>
+                    </a:lnL>
+                    <a:lnR algn="ctr" cmpd="sng" cap="flat" w="0">
+                      <a:noFill/>
+                      <a:prstDash val="solid"/>
+                    </a:lnR>
+                    <a:lnT algn="ctr" cmpd="sng" cap="flat" w="0">
+                      <a:noFill/>
+                      <a:prstDash val="solid"/>
+                    </a:lnT>
+                    <a:lnB algn="ctr" cmpd="sng" cap="flat" w="0">
+                      <a:noFill/>
+                      <a:prstDash val="solid"/>
+                    </a:lnB>
+                    <a:solidFill>
+                      <a:srgbClr val="FF7D29">
+                        <a:alpha val="100000"/>
+                      </a:srgbClr>
+                    </a:solidFill>
+                  </a:tcPr>
+                </a:tc>
+                <a:tc>
+                  <a:txBody>
+                    <a:bodyPr/>
+                    <a:lstStyle/>
+                    <a:p>
+                      <a:pPr algn="ctr" marL="63500" marR="63500">
+                        <a:lnSpc>
+                          <a:spcPct val="100000"/>
+                        </a:lnSpc>
+                        <a:spcBef>
+                          <a:spcPts val="300"/>
+                        </a:spcBef>
+                        <a:spcAft>
+                          <a:spcPts val="300"/>
+                        </a:spcAft>
+                        <a:buNone/>
+                      </a:pPr>
+                      <a:r>
+                        <a:rPr cap="none" sz="1200" i="0" b="0" u="none">
+                          <a:solidFill>
+                            <a:srgbClr val="000000">
+                              <a:alpha val="100000"/>
+                            </a:srgbClr>
+                          </a:solidFill>
+                          <a:latin typeface="arial"/>
+                          <a:cs typeface="arial"/>
+                          <a:ea typeface="arial"/>
+                          <a:sym typeface="arial"/>
+                        </a:rPr>
+                        <a:t>36 (26.9%)</a:t>
+                      </a:r>
+                    </a:p>
+                  </a:txBody>
+                  <a:tcPr anchor="ctr" marB="38100" marT="38100" marR="0" marL="0">
+                    <a:lnL algn="ctr" cmpd="sng" cap="flat" w="0">
+                      <a:noFill/>
+                      <a:prstDash val="solid"/>
+                    </a:lnL>
+                    <a:lnR algn="ctr" cmpd="sng" cap="flat" w="0">
+                      <a:noFill/>
+                      <a:prstDash val="solid"/>
+                    </a:lnR>
+                    <a:lnT algn="ctr" cmpd="sng" cap="flat" w="0">
+                      <a:noFill/>
+                      <a:prstDash val="solid"/>
+                    </a:lnT>
+                    <a:lnB algn="ctr" cmpd="sng" cap="flat" w="0">
+                      <a:noFill/>
+                      <a:prstDash val="solid"/>
+                    </a:lnB>
+                    <a:solidFill>
+                      <a:srgbClr val="FF7D29">
+                        <a:alpha val="100000"/>
+                      </a:srgbClr>
+                    </a:solidFill>
+                  </a:tcPr>
+                </a:tc>
+                <a:tc>
+                  <a:txBody>
+                    <a:bodyPr/>
+                    <a:lstStyle/>
+                    <a:p>
+                      <a:pPr algn="ctr" marL="63500" marR="63500">
+                        <a:lnSpc>
+                          <a:spcPct val="100000"/>
+                        </a:lnSpc>
+                        <a:spcBef>
+                          <a:spcPts val="300"/>
+                        </a:spcBef>
+                        <a:spcAft>
+                          <a:spcPts val="300"/>
+                        </a:spcAft>
+                        <a:buNone/>
+                      </a:pPr>
+                      <a:r>
+                        <a:rPr cap="none" sz="1200" i="0" b="0" u="none">
+                          <a:solidFill>
+                            <a:srgbClr val="000000">
+                              <a:alpha val="100000"/>
+                            </a:srgbClr>
+                          </a:solidFill>
+                          <a:latin typeface="arial"/>
+                          <a:cs typeface="arial"/>
+                          <a:ea typeface="arial"/>
+                          <a:sym typeface="arial"/>
+                        </a:rPr>
+                        <a:t>112 (28.0%)</a:t>
+                      </a:r>
+                    </a:p>
+                  </a:txBody>
+                  <a:tcPr anchor="ctr" marB="38100" marT="38100" marR="0" marL="0">
+                    <a:lnL algn="ctr" cmpd="sng" cap="flat" w="0">
+                      <a:noFill/>
+                      <a:prstDash val="solid"/>
+                    </a:lnL>
+                    <a:lnR algn="ctr" cmpd="sng" cap="flat" w="0">
+                      <a:noFill/>
+                      <a:prstDash val="solid"/>
+                    </a:lnR>
+                    <a:lnT algn="ctr" cmpd="sng" cap="flat" w="0">
+                      <a:noFill/>
+                      <a:prstDash val="solid"/>
+                    </a:lnT>
+                    <a:lnB algn="ctr" cmpd="sng" cap="flat" w="0">
+                      <a:noFill/>
+                      <a:prstDash val="solid"/>
+                    </a:lnB>
+                    <a:solidFill>
+                      <a:srgbClr val="FF7D29">
+                        <a:alpha val="100000"/>
+                      </a:srgbClr>
+                    </a:solidFill>
+                  </a:tcPr>
+                </a:tc>
+              </a:tr>
+              <a:tr h="213519">
+                <a:tc>
+                  <a:txBody>
+                    <a:bodyPr/>
+                    <a:lstStyle/>
+                    <a:p>
+                      <a:pPr algn="l" marL="127000" marR="63500">
+                        <a:lnSpc>
+                          <a:spcPct val="100000"/>
+                        </a:lnSpc>
+                        <a:spcBef>
+                          <a:spcPts val="300"/>
+                        </a:spcBef>
+                        <a:spcAft>
+                          <a:spcPts val="300"/>
+                        </a:spcAft>
+                        <a:buNone/>
+                      </a:pPr>
+                      <a:r>
+                        <a:rPr cap="none" sz="1200" i="0" b="0" u="none">
+                          <a:solidFill>
+                            <a:srgbClr val="000000">
+                              <a:alpha val="100000"/>
+                            </a:srgbClr>
+                          </a:solidFill>
+                          <a:latin typeface="arial"/>
+                          <a:cs typeface="arial"/>
+                          <a:ea typeface="arial"/>
+                          <a:sym typeface="arial"/>
+                        </a:rPr>
+                        <a:t>cl D.1</a:t>
+                      </a:r>
+                    </a:p>
+                  </a:txBody>
+                  <a:tcPr anchor="ctr" marB="38100" marT="38100" marR="0" marL="0">
+                    <a:lnL algn="ctr" cmpd="sng" cap="flat" w="0">
+                      <a:noFill/>
+                      <a:prstDash val="solid"/>
+                    </a:lnL>
+                    <a:lnR algn="ctr" cmpd="sng" cap="flat" w="0">
+                      <a:noFill/>
+                      <a:prstDash val="solid"/>
+                    </a:lnR>
+                    <a:lnT algn="ctr" cmpd="sng" cap="flat" w="0">
+                      <a:noFill/>
+                      <a:prstDash val="solid"/>
+                    </a:lnT>
+                    <a:lnB algn="ctr" cmpd="sng" cap="flat" w="0">
+                      <a:noFill/>
+                      <a:prstDash val="solid"/>
+                    </a:lnB>
+                    <a:solidFill>
+                      <a:srgbClr val="FFBD69">
+                        <a:alpha val="100000"/>
+                      </a:srgbClr>
+                    </a:solidFill>
+                  </a:tcPr>
+                </a:tc>
+                <a:tc>
+                  <a:txBody>
+                    <a:bodyPr/>
+                    <a:lstStyle/>
+                    <a:p>
+                      <a:pPr algn="ctr" marL="63500" marR="63500">
+                        <a:lnSpc>
+                          <a:spcPct val="100000"/>
+                        </a:lnSpc>
+                        <a:spcBef>
+                          <a:spcPts val="300"/>
+                        </a:spcBef>
+                        <a:spcAft>
+                          <a:spcPts val="300"/>
+                        </a:spcAft>
+                        <a:buNone/>
+                      </a:pPr>
+                      <a:endParaRPr cap="none" sz="1200" i="0" b="0" u="none">
+                        <a:solidFill>
+                          <a:srgbClr val="000000">
+                            <a:alpha val="100000"/>
+                          </a:srgbClr>
+                        </a:solidFill>
+                        <a:latin typeface="arial"/>
+                        <a:cs typeface="arial"/>
+                        <a:ea typeface="arial"/>
+                        <a:sym typeface="arial"/>
+                      </a:endParaRPr>
+                      <a:r>
+                        <a:rPr cap="none" sz="1200" i="0" b="0" u="none">
+                          <a:solidFill>
+                            <a:srgbClr val="000000">
+                              <a:alpha val="100000"/>
+                            </a:srgbClr>
+                          </a:solidFill>
+                          <a:latin typeface="arial"/>
+                          <a:cs typeface="arial"/>
+                          <a:ea typeface="arial"/>
+                          <a:sym typeface="arial"/>
+                        </a:rPr>
+                        <a:t/>
+                      </a:r>
+                    </a:p>
+                  </a:txBody>
+                  <a:tcPr anchor="ctr" marB="38100" marT="38100" marR="0" marL="0">
+                    <a:lnL algn="ctr" cmpd="sng" cap="flat" w="0">
+                      <a:noFill/>
+                      <a:prstDash val="solid"/>
+                    </a:lnL>
+                    <a:lnR algn="ctr" cmpd="sng" cap="flat" w="0">
+                      <a:noFill/>
+                      <a:prstDash val="solid"/>
+                    </a:lnR>
+                    <a:lnT algn="ctr" cmpd="sng" cap="flat" w="0">
+                      <a:noFill/>
+                      <a:prstDash val="solid"/>
+                    </a:lnT>
+                    <a:lnB algn="ctr" cmpd="sng" cap="flat" w="0">
+                      <a:noFill/>
+                      <a:prstDash val="solid"/>
+                    </a:lnB>
+                    <a:solidFill>
+                      <a:srgbClr val="FFBD69">
+                        <a:alpha val="100000"/>
+                      </a:srgbClr>
+                    </a:solidFill>
+                  </a:tcPr>
+                </a:tc>
+                <a:tc>
+                  <a:txBody>
+                    <a:bodyPr/>
+                    <a:lstStyle/>
+                    <a:p>
+                      <a:pPr algn="ctr" marL="63500" marR="63500">
+                        <a:lnSpc>
+                          <a:spcPct val="100000"/>
+                        </a:lnSpc>
+                        <a:spcBef>
+                          <a:spcPts val="300"/>
+                        </a:spcBef>
+                        <a:spcAft>
+                          <a:spcPts val="300"/>
+                        </a:spcAft>
+                        <a:buNone/>
+                      </a:pPr>
+                      <a:endParaRPr cap="none" sz="1200" i="0" b="0" u="none">
+                        <a:solidFill>
+                          <a:srgbClr val="000000">
+                            <a:alpha val="100000"/>
+                          </a:srgbClr>
+                        </a:solidFill>
+                        <a:latin typeface="arial"/>
+                        <a:cs typeface="arial"/>
+                        <a:ea typeface="arial"/>
+                        <a:sym typeface="arial"/>
+                      </a:endParaRPr>
+                      <a:r>
+                        <a:rPr cap="none" sz="1200" i="0" b="0" u="none">
+                          <a:solidFill>
+                            <a:srgbClr val="000000">
+                              <a:alpha val="100000"/>
+                            </a:srgbClr>
+                          </a:solidFill>
+                          <a:latin typeface="arial"/>
+                          <a:cs typeface="arial"/>
+                          <a:ea typeface="arial"/>
+                          <a:sym typeface="arial"/>
+                        </a:rPr>
+                        <a:t/>
+                      </a:r>
+                    </a:p>
+                  </a:txBody>
+                  <a:tcPr anchor="ctr" marB="38100" marT="38100" marR="0" marL="0">
+                    <a:lnL algn="ctr" cmpd="sng" cap="flat" w="0">
+                      <a:noFill/>
+                      <a:prstDash val="solid"/>
+                    </a:lnL>
+                    <a:lnR algn="ctr" cmpd="sng" cap="flat" w="0">
+                      <a:noFill/>
+                      <a:prstDash val="solid"/>
+                    </a:lnR>
+                    <a:lnT algn="ctr" cmpd="sng" cap="flat" w="0">
+                      <a:noFill/>
+                      <a:prstDash val="solid"/>
+                    </a:lnT>
+                    <a:lnB algn="ctr" cmpd="sng" cap="flat" w="0">
+                      <a:noFill/>
+                      <a:prstDash val="solid"/>
+                    </a:lnB>
+                    <a:solidFill>
+                      <a:srgbClr val="FFBD69">
+                        <a:alpha val="100000"/>
+                      </a:srgbClr>
+                    </a:solidFill>
+                  </a:tcPr>
+                </a:tc>
+                <a:tc>
+                  <a:txBody>
+                    <a:bodyPr/>
+                    <a:lstStyle/>
+                    <a:p>
+                      <a:pPr algn="ctr" marL="63500" marR="63500">
+                        <a:lnSpc>
+                          <a:spcPct val="100000"/>
+                        </a:lnSpc>
+                        <a:spcBef>
+                          <a:spcPts val="300"/>
+                        </a:spcBef>
+                        <a:spcAft>
+                          <a:spcPts val="300"/>
+                        </a:spcAft>
+                        <a:buNone/>
+                      </a:pPr>
+                      <a:endParaRPr cap="none" sz="1200" i="0" b="0" u="none">
+                        <a:solidFill>
+                          <a:srgbClr val="000000">
+                            <a:alpha val="100000"/>
+                          </a:srgbClr>
+                        </a:solidFill>
+                        <a:latin typeface="arial"/>
+                        <a:cs typeface="arial"/>
+                        <a:ea typeface="arial"/>
+                        <a:sym typeface="arial"/>
+                      </a:endParaRPr>
+                      <a:r>
+                        <a:rPr cap="none" sz="1200" i="0" b="0" u="none">
+                          <a:solidFill>
+                            <a:srgbClr val="000000">
+                              <a:alpha val="100000"/>
+                            </a:srgbClr>
+                          </a:solidFill>
+                          <a:latin typeface="arial"/>
+                          <a:cs typeface="arial"/>
+                          <a:ea typeface="arial"/>
+                          <a:sym typeface="arial"/>
+                        </a:rPr>
+                        <a:t/>
+                      </a:r>
+                    </a:p>
+                  </a:txBody>
+                  <a:tcPr anchor="ctr" marB="38100" marT="38100" marR="0" marL="0">
+                    <a:lnL algn="ctr" cmpd="sng" cap="flat" w="0">
+                      <a:noFill/>
+                      <a:prstDash val="solid"/>
+                    </a:lnL>
+                    <a:lnR algn="ctr" cmpd="sng" cap="flat" w="0">
+                      <a:noFill/>
+                      <a:prstDash val="solid"/>
+                    </a:lnR>
+                    <a:lnT algn="ctr" cmpd="sng" cap="flat" w="0">
+                      <a:noFill/>
+                      <a:prstDash val="solid"/>
+                    </a:lnT>
+                    <a:lnB algn="ctr" cmpd="sng" cap="flat" w="0">
+                      <a:noFill/>
+                      <a:prstDash val="solid"/>
+                    </a:lnB>
+                    <a:solidFill>
+                      <a:srgbClr val="FFBD69">
+                        <a:alpha val="100000"/>
+                      </a:srgbClr>
+                    </a:solidFill>
+                  </a:tcPr>
+                </a:tc>
+              </a:tr>
+              <a:tr h="243582">
+                <a:tc>
+                  <a:txBody>
+                    <a:bodyPr/>
+                    <a:lstStyle/>
+                    <a:p>
+                      <a:pPr algn="l" marL="127000" marR="63500">
+                        <a:lnSpc>
+                          <a:spcPct val="100000"/>
+                        </a:lnSpc>
+                        <a:spcBef>
+                          <a:spcPts val="300"/>
+                        </a:spcBef>
+                        <a:spcAft>
+                          <a:spcPts val="300"/>
+                        </a:spcAft>
+                        <a:buNone/>
+                      </a:pPr>
+                      <a:r>
+                        <a:rPr cap="none" sz="1200" i="0" b="0" u="none">
+                          <a:solidFill>
+                            <a:srgbClr val="000000">
+                              <a:alpha val="100000"/>
+                            </a:srgbClr>
+                          </a:solidFill>
+                          <a:latin typeface="arial"/>
+                          <a:cs typeface="arial"/>
+                          <a:ea typeface="arial"/>
+                          <a:sym typeface="arial"/>
+                        </a:rPr>
+                        <a:t>dcd D.1.1.1.1</a:t>
+                      </a:r>
+                    </a:p>
+                  </a:txBody>
+                  <a:tcPr anchor="ctr" marB="38100" marT="38100" marR="0" marL="0">
+                    <a:lnL algn="ctr" cmpd="sng" cap="flat" w="0">
+                      <a:noFill/>
+                      <a:prstDash val="solid"/>
+                    </a:lnL>
+                    <a:lnR algn="ctr" cmpd="sng" cap="flat" w="0">
+                      <a:noFill/>
+                      <a:prstDash val="solid"/>
+                    </a:lnR>
+                    <a:lnT algn="ctr" cmpd="sng" cap="flat" w="0">
+                      <a:noFill/>
+                      <a:prstDash val="solid"/>
+                    </a:lnT>
+                    <a:lnB algn="ctr" cmpd="sng" cap="flat" w="0">
+                      <a:noFill/>
+                      <a:prstDash val="solid"/>
+                    </a:lnB>
+                    <a:solidFill>
+                      <a:srgbClr val="FF7D29">
+                        <a:alpha val="100000"/>
+                      </a:srgbClr>
+                    </a:solidFill>
+                  </a:tcPr>
+                </a:tc>
+                <a:tc>
+                  <a:txBody>
+                    <a:bodyPr/>
+                    <a:lstStyle/>
+                    <a:p>
+                      <a:pPr algn="ctr" marL="63500" marR="63500">
+                        <a:lnSpc>
+                          <a:spcPct val="100000"/>
+                        </a:lnSpc>
+                        <a:spcBef>
+                          <a:spcPts val="300"/>
+                        </a:spcBef>
+                        <a:spcAft>
+                          <a:spcPts val="300"/>
+                        </a:spcAft>
+                        <a:buNone/>
+                      </a:pPr>
+                      <a:r>
+                        <a:rPr cap="none" sz="1200" i="0" b="0" u="none">
+                          <a:solidFill>
+                            <a:srgbClr val="000000">
+                              <a:alpha val="100000"/>
+                            </a:srgbClr>
+                          </a:solidFill>
+                          <a:latin typeface="arial"/>
+                          <a:cs typeface="arial"/>
+                          <a:ea typeface="arial"/>
+                          <a:sym typeface="arial"/>
+                        </a:rPr>
+                        <a:t>42 (31.3%)</a:t>
+                      </a:r>
+                    </a:p>
+                  </a:txBody>
+                  <a:tcPr anchor="ctr" marB="38100" marT="38100" marR="0" marL="0">
+                    <a:lnL algn="ctr" cmpd="sng" cap="flat" w="0">
+                      <a:noFill/>
+                      <a:prstDash val="solid"/>
+                    </a:lnL>
+                    <a:lnR algn="ctr" cmpd="sng" cap="flat" w="0">
+                      <a:noFill/>
+                      <a:prstDash val="solid"/>
+                    </a:lnR>
+                    <a:lnT algn="ctr" cmpd="sng" cap="flat" w="0">
+                      <a:noFill/>
+                      <a:prstDash val="solid"/>
+                    </a:lnT>
+                    <a:lnB algn="ctr" cmpd="sng" cap="flat" w="0">
+                      <a:noFill/>
+                      <a:prstDash val="solid"/>
+                    </a:lnB>
+                    <a:solidFill>
+                      <a:srgbClr val="FF7D29">
+                        <a:alpha val="100000"/>
+                      </a:srgbClr>
+                    </a:solidFill>
+                  </a:tcPr>
+                </a:tc>
+                <a:tc>
+                  <a:txBody>
+                    <a:bodyPr/>
+                    <a:lstStyle/>
+                    <a:p>
+                      <a:pPr algn="ctr" marL="63500" marR="63500">
+                        <a:lnSpc>
+                          <a:spcPct val="100000"/>
+                        </a:lnSpc>
+                        <a:spcBef>
+                          <a:spcPts val="300"/>
+                        </a:spcBef>
+                        <a:spcAft>
+                          <a:spcPts val="300"/>
+                        </a:spcAft>
+                        <a:buNone/>
+                      </a:pPr>
+                      <a:r>
+                        <a:rPr cap="none" sz="1200" i="0" b="0" u="none">
+                          <a:solidFill>
+                            <a:srgbClr val="000000">
+                              <a:alpha val="100000"/>
+                            </a:srgbClr>
+                          </a:solidFill>
+                          <a:latin typeface="arial"/>
+                          <a:cs typeface="arial"/>
+                          <a:ea typeface="arial"/>
+                          <a:sym typeface="arial"/>
+                        </a:rPr>
+                        <a:t>32 (23.9%)</a:t>
+                      </a:r>
+                    </a:p>
+                  </a:txBody>
+                  <a:tcPr anchor="ctr" marB="38100" marT="38100" marR="0" marL="0">
+                    <a:lnL algn="ctr" cmpd="sng" cap="flat" w="0">
+                      <a:noFill/>
+                      <a:prstDash val="solid"/>
+                    </a:lnL>
+                    <a:lnR algn="ctr" cmpd="sng" cap="flat" w="0">
+                      <a:noFill/>
+                      <a:prstDash val="solid"/>
+                    </a:lnR>
+                    <a:lnT algn="ctr" cmpd="sng" cap="flat" w="0">
+                      <a:noFill/>
+                      <a:prstDash val="solid"/>
+                    </a:lnT>
+                    <a:lnB algn="ctr" cmpd="sng" cap="flat" w="0">
+                      <a:noFill/>
+                      <a:prstDash val="solid"/>
+                    </a:lnB>
+                    <a:solidFill>
+                      <a:srgbClr val="FF7D29">
+                        <a:alpha val="100000"/>
+                      </a:srgbClr>
+                    </a:solidFill>
+                  </a:tcPr>
+                </a:tc>
+                <a:tc>
+                  <a:txBody>
+                    <a:bodyPr/>
+                    <a:lstStyle/>
+                    <a:p>
+                      <a:pPr algn="ctr" marL="63500" marR="63500">
+                        <a:lnSpc>
+                          <a:spcPct val="100000"/>
+                        </a:lnSpc>
+                        <a:spcBef>
+                          <a:spcPts val="300"/>
+                        </a:spcBef>
+                        <a:spcAft>
+                          <a:spcPts val="300"/>
+                        </a:spcAft>
+                        <a:buNone/>
+                      </a:pPr>
+                      <a:r>
+                        <a:rPr cap="none" sz="1200" i="0" b="0" u="none">
+                          <a:solidFill>
+                            <a:srgbClr val="000000">
+                              <a:alpha val="100000"/>
+                            </a:srgbClr>
+                          </a:solidFill>
+                          <a:latin typeface="arial"/>
+                          <a:cs typeface="arial"/>
+                          <a:ea typeface="arial"/>
+                          <a:sym typeface="arial"/>
+                        </a:rPr>
+                        <a:t>120 (30.0%)</a:t>
                       </a:r>
                     </a:p>
                   </a:txBody>
@@ -7404,7 +8292,7 @@
                           <a:ea typeface="arial"/>
                           <a:sym typeface="arial"/>
                         </a:rPr>
-                        <a:t>cl B.1</a:t>
+                        <a:t>dcd D.1.1.4.2</a:t>
                       </a:r>
                     </a:p>
                   </a:txBody>
@@ -7461,7 +8349,7 @@
                           <a:ea typeface="arial"/>
                           <a:sym typeface="arial"/>
                         </a:rPr>
-                        <a:t>47 (35.1%)</a:t>
+                        <a:t>38 (28.4%)</a:t>
                       </a:r>
                     </a:p>
                   </a:txBody>
@@ -7518,7 +8406,7 @@
                           <a:ea typeface="arial"/>
                           <a:sym typeface="arial"/>
                         </a:rPr>
-                        <a:t>49 (36.6%)</a:t>
+                        <a:t>34 (25.4%)</a:t>
                       </a:r>
                     </a:p>
                   </a:txBody>
@@ -7575,7 +8463,7 @@
                           <a:ea typeface="arial"/>
                           <a:sym typeface="arial"/>
                         </a:rPr>
-                        <a:t>139 (34.8%)</a:t>
+                        <a:t>112 (28.0%)</a:t>
                       </a:r>
                     </a:p>
                   </a:txBody>
@@ -7604,7 +8492,7 @@
                   </a:tcPr>
                 </a:tc>
               </a:tr>
-              <a:tr h="243582">
+              <a:tr h="213519">
                 <a:tc>
                   <a:txBody>
                     <a:bodyPr/>
@@ -7634,7 +8522,7 @@
                           <a:ea typeface="arial"/>
                           <a:sym typeface="arial"/>
                         </a:rPr>
-                        <a:t>dcd B.1.1.1.1</a:t>
+                        <a:t>cl D.2</a:t>
                       </a:r>
                     </a:p>
                   </a:txBody>
@@ -7679,6 +8567,17 @@
                         </a:spcAft>
                         <a:buNone/>
                       </a:pPr>
+                      <a:endParaRPr cap="none" sz="1200" i="0" b="0" u="none">
+                        <a:solidFill>
+                          <a:srgbClr val="000000">
+                            <a:alpha val="100000"/>
+                          </a:srgbClr>
+                        </a:solidFill>
+                        <a:latin typeface="arial"/>
+                        <a:cs typeface="arial"/>
+                        <a:ea typeface="arial"/>
+                        <a:sym typeface="arial"/>
+                      </a:endParaRPr>
                       <a:r>
                         <a:rPr cap="none" sz="1200" i="0" b="0" u="none">
                           <a:solidFill>
@@ -7691,7 +8590,7 @@
                           <a:ea typeface="arial"/>
                           <a:sym typeface="arial"/>
                         </a:rPr>
-                        <a:t>47 (35.1%)</a:t>
+                        <a:t/>
                       </a:r>
                     </a:p>
                   </a:txBody>
@@ -7736,6 +8635,17 @@
                         </a:spcAft>
                         <a:buNone/>
                       </a:pPr>
+                      <a:endParaRPr cap="none" sz="1200" i="0" b="0" u="none">
+                        <a:solidFill>
+                          <a:srgbClr val="000000">
+                            <a:alpha val="100000"/>
+                          </a:srgbClr>
+                        </a:solidFill>
+                        <a:latin typeface="arial"/>
+                        <a:cs typeface="arial"/>
+                        <a:ea typeface="arial"/>
+                        <a:sym typeface="arial"/>
+                      </a:endParaRPr>
                       <a:r>
                         <a:rPr cap="none" sz="1200" i="0" b="0" u="none">
                           <a:solidFill>
@@ -7748,7 +8658,7 @@
                           <a:ea typeface="arial"/>
                           <a:sym typeface="arial"/>
                         </a:rPr>
-                        <a:t>49 (36.6%)</a:t>
+                        <a:t/>
                       </a:r>
                     </a:p>
                   </a:txBody>
@@ -7793,6 +8703,17 @@
                         </a:spcAft>
                         <a:buNone/>
                       </a:pPr>
+                      <a:endParaRPr cap="none" sz="1200" i="0" b="0" u="none">
+                        <a:solidFill>
+                          <a:srgbClr val="000000">
+                            <a:alpha val="100000"/>
+                          </a:srgbClr>
+                        </a:solidFill>
+                        <a:latin typeface="arial"/>
+                        <a:cs typeface="arial"/>
+                        <a:ea typeface="arial"/>
+                        <a:sym typeface="arial"/>
+                      </a:endParaRPr>
                       <a:r>
                         <a:rPr cap="none" sz="1200" i="0" b="0" u="none">
                           <a:solidFill>
@@ -7805,7 +8726,7 @@
                           <a:ea typeface="arial"/>
                           <a:sym typeface="arial"/>
                         </a:rPr>
-                        <a:t>139 (34.8%)</a:t>
+                        <a:t/>
                       </a:r>
                     </a:p>
                   </a:txBody>
@@ -7840,7 +8761,7 @@
                     <a:bodyPr/>
                     <a:lstStyle/>
                     <a:p>
-                      <a:pPr algn="l" marL="127000" marR="63500">
+                      <a:pPr algn="ctr" marL="63500" marR="63500">
                         <a:lnSpc>
                           <a:spcPct val="100000"/>
                         </a:lnSpc>
@@ -7864,7 +8785,7 @@
                           <a:ea typeface="arial"/>
                           <a:sym typeface="arial"/>
                         </a:rPr>
-                        <a:t>cl C.1</a:t>
+                        <a:t>dcd D.2.1.5.3</a:t>
                       </a:r>
                     </a:p>
                   </a:txBody>
@@ -7921,7 +8842,7 @@
                           <a:ea typeface="arial"/>
                           <a:sym typeface="arial"/>
                         </a:rPr>
-                        <a:t>43 (32.1%)</a:t>
+                        <a:t>37 (27.6%)</a:t>
                       </a:r>
                     </a:p>
                   </a:txBody>
@@ -8035,7 +8956,7 @@
                           <a:ea typeface="arial"/>
                           <a:sym typeface="arial"/>
                         </a:rPr>
-                        <a:t>132 (33.0%)</a:t>
+                        <a:t>133 (33.2%)</a:t>
                       </a:r>
                     </a:p>
                   </a:txBody>
@@ -8058,696 +8979,6 @@
                     </a:lnB>
                     <a:solidFill>
                       <a:srgbClr val="FFBD69">
-                        <a:alpha val="100000"/>
-                      </a:srgbClr>
-                    </a:solidFill>
-                  </a:tcPr>
-                </a:tc>
-              </a:tr>
-              <a:tr h="243582">
-                <a:tc>
-                  <a:txBody>
-                    <a:bodyPr/>
-                    <a:lstStyle/>
-                    <a:p>
-                      <a:pPr algn="l" marL="127000" marR="63500">
-                        <a:lnSpc>
-                          <a:spcPct val="100000"/>
-                        </a:lnSpc>
-                        <a:spcBef>
-                          <a:spcPts val="300"/>
-                        </a:spcBef>
-                        <a:spcAft>
-                          <a:spcPts val="300"/>
-                        </a:spcAft>
-                        <a:buNone/>
-                      </a:pPr>
-                      <a:r>
-                        <a:rPr cap="none" sz="1200" i="0" b="0" u="none">
-                          <a:solidFill>
-                            <a:srgbClr val="000000">
-                              <a:alpha val="100000"/>
-                            </a:srgbClr>
-                          </a:solidFill>
-                          <a:latin typeface="arial"/>
-                          <a:cs typeface="arial"/>
-                          <a:ea typeface="arial"/>
-                          <a:sym typeface="arial"/>
-                        </a:rPr>
-                        <a:t>dcd C.1.1.1.3</a:t>
-                      </a:r>
-                    </a:p>
-                  </a:txBody>
-                  <a:tcPr anchor="ctr" marB="38100" marT="38100" marR="0" marL="0">
-                    <a:lnL algn="ctr" cmpd="sng" cap="flat" w="0">
-                      <a:noFill/>
-                      <a:prstDash val="solid"/>
-                    </a:lnL>
-                    <a:lnR algn="ctr" cmpd="sng" cap="flat" w="0">
-                      <a:noFill/>
-                      <a:prstDash val="solid"/>
-                    </a:lnR>
-                    <a:lnT algn="ctr" cmpd="sng" cap="flat" w="0">
-                      <a:noFill/>
-                      <a:prstDash val="solid"/>
-                    </a:lnT>
-                    <a:lnB algn="ctr" cmpd="sng" cap="flat" w="0">
-                      <a:noFill/>
-                      <a:prstDash val="solid"/>
-                    </a:lnB>
-                    <a:solidFill>
-                      <a:srgbClr val="FF7D29">
-                        <a:alpha val="100000"/>
-                      </a:srgbClr>
-                    </a:solidFill>
-                  </a:tcPr>
-                </a:tc>
-                <a:tc>
-                  <a:txBody>
-                    <a:bodyPr/>
-                    <a:lstStyle/>
-                    <a:p>
-                      <a:pPr algn="ctr" marL="63500" marR="63500">
-                        <a:lnSpc>
-                          <a:spcPct val="100000"/>
-                        </a:lnSpc>
-                        <a:spcBef>
-                          <a:spcPts val="300"/>
-                        </a:spcBef>
-                        <a:spcAft>
-                          <a:spcPts val="300"/>
-                        </a:spcAft>
-                        <a:buNone/>
-                      </a:pPr>
-                      <a:r>
-                        <a:rPr cap="none" sz="1200" i="0" b="0" u="none">
-                          <a:solidFill>
-                            <a:srgbClr val="000000">
-                              <a:alpha val="100000"/>
-                            </a:srgbClr>
-                          </a:solidFill>
-                          <a:latin typeface="arial"/>
-                          <a:cs typeface="arial"/>
-                          <a:ea typeface="arial"/>
-                          <a:sym typeface="arial"/>
-                        </a:rPr>
-                        <a:t>43 (32.1%)</a:t>
-                      </a:r>
-                    </a:p>
-                  </a:txBody>
-                  <a:tcPr anchor="ctr" marB="38100" marT="38100" marR="0" marL="0">
-                    <a:lnL algn="ctr" cmpd="sng" cap="flat" w="0">
-                      <a:noFill/>
-                      <a:prstDash val="solid"/>
-                    </a:lnL>
-                    <a:lnR algn="ctr" cmpd="sng" cap="flat" w="0">
-                      <a:noFill/>
-                      <a:prstDash val="solid"/>
-                    </a:lnR>
-                    <a:lnT algn="ctr" cmpd="sng" cap="flat" w="0">
-                      <a:noFill/>
-                      <a:prstDash val="solid"/>
-                    </a:lnT>
-                    <a:lnB algn="ctr" cmpd="sng" cap="flat" w="0">
-                      <a:noFill/>
-                      <a:prstDash val="solid"/>
-                    </a:lnB>
-                    <a:solidFill>
-                      <a:srgbClr val="FF7D29">
-                        <a:alpha val="100000"/>
-                      </a:srgbClr>
-                    </a:solidFill>
-                  </a:tcPr>
-                </a:tc>
-                <a:tc>
-                  <a:txBody>
-                    <a:bodyPr/>
-                    <a:lstStyle/>
-                    <a:p>
-                      <a:pPr algn="ctr" marL="63500" marR="63500">
-                        <a:lnSpc>
-                          <a:spcPct val="100000"/>
-                        </a:lnSpc>
-                        <a:spcBef>
-                          <a:spcPts val="300"/>
-                        </a:spcBef>
-                        <a:spcAft>
-                          <a:spcPts val="300"/>
-                        </a:spcAft>
-                        <a:buNone/>
-                      </a:pPr>
-                      <a:r>
-                        <a:rPr cap="none" sz="1200" i="0" b="0" u="none">
-                          <a:solidFill>
-                            <a:srgbClr val="000000">
-                              <a:alpha val="100000"/>
-                            </a:srgbClr>
-                          </a:solidFill>
-                          <a:latin typeface="arial"/>
-                          <a:cs typeface="arial"/>
-                          <a:ea typeface="arial"/>
-                          <a:sym typeface="arial"/>
-                        </a:rPr>
-                        <a:t>46 (34.3%)</a:t>
-                      </a:r>
-                    </a:p>
-                  </a:txBody>
-                  <a:tcPr anchor="ctr" marB="38100" marT="38100" marR="0" marL="0">
-                    <a:lnL algn="ctr" cmpd="sng" cap="flat" w="0">
-                      <a:noFill/>
-                      <a:prstDash val="solid"/>
-                    </a:lnL>
-                    <a:lnR algn="ctr" cmpd="sng" cap="flat" w="0">
-                      <a:noFill/>
-                      <a:prstDash val="solid"/>
-                    </a:lnR>
-                    <a:lnT algn="ctr" cmpd="sng" cap="flat" w="0">
-                      <a:noFill/>
-                      <a:prstDash val="solid"/>
-                    </a:lnT>
-                    <a:lnB algn="ctr" cmpd="sng" cap="flat" w="0">
-                      <a:noFill/>
-                      <a:prstDash val="solid"/>
-                    </a:lnB>
-                    <a:solidFill>
-                      <a:srgbClr val="FF7D29">
-                        <a:alpha val="100000"/>
-                      </a:srgbClr>
-                    </a:solidFill>
-                  </a:tcPr>
-                </a:tc>
-                <a:tc>
-                  <a:txBody>
-                    <a:bodyPr/>
-                    <a:lstStyle/>
-                    <a:p>
-                      <a:pPr algn="ctr" marL="63500" marR="63500">
-                        <a:lnSpc>
-                          <a:spcPct val="100000"/>
-                        </a:lnSpc>
-                        <a:spcBef>
-                          <a:spcPts val="300"/>
-                        </a:spcBef>
-                        <a:spcAft>
-                          <a:spcPts val="300"/>
-                        </a:spcAft>
-                        <a:buNone/>
-                      </a:pPr>
-                      <a:r>
-                        <a:rPr cap="none" sz="1200" i="0" b="0" u="none">
-                          <a:solidFill>
-                            <a:srgbClr val="000000">
-                              <a:alpha val="100000"/>
-                            </a:srgbClr>
-                          </a:solidFill>
-                          <a:latin typeface="arial"/>
-                          <a:cs typeface="arial"/>
-                          <a:ea typeface="arial"/>
-                          <a:sym typeface="arial"/>
-                        </a:rPr>
-                        <a:t>132 (33.0%)</a:t>
-                      </a:r>
-                    </a:p>
-                  </a:txBody>
-                  <a:tcPr anchor="ctr" marB="38100" marT="38100" marR="0" marL="0">
-                    <a:lnL algn="ctr" cmpd="sng" cap="flat" w="0">
-                      <a:noFill/>
-                      <a:prstDash val="solid"/>
-                    </a:lnL>
-                    <a:lnR algn="ctr" cmpd="sng" cap="flat" w="0">
-                      <a:noFill/>
-                      <a:prstDash val="solid"/>
-                    </a:lnR>
-                    <a:lnT algn="ctr" cmpd="sng" cap="flat" w="0">
-                      <a:noFill/>
-                      <a:prstDash val="solid"/>
-                    </a:lnT>
-                    <a:lnB algn="ctr" cmpd="sng" cap="flat" w="0">
-                      <a:noFill/>
-                      <a:prstDash val="solid"/>
-                    </a:lnB>
-                    <a:solidFill>
-                      <a:srgbClr val="FF7D29">
-                        <a:alpha val="100000"/>
-                      </a:srgbClr>
-                    </a:solidFill>
-                  </a:tcPr>
-                </a:tc>
-              </a:tr>
-              <a:tr h="243582">
-                <a:tc>
-                  <a:txBody>
-                    <a:bodyPr/>
-                    <a:lstStyle/>
-                    <a:p>
-                      <a:pPr algn="l" marL="127000" marR="63500">
-                        <a:lnSpc>
-                          <a:spcPct val="100000"/>
-                        </a:lnSpc>
-                        <a:spcBef>
-                          <a:spcPts val="300"/>
-                        </a:spcBef>
-                        <a:spcAft>
-                          <a:spcPts val="300"/>
-                        </a:spcAft>
-                        <a:buNone/>
-                      </a:pPr>
-                      <a:r>
-                        <a:rPr cap="none" sz="1200" i="0" b="0" u="none">
-                          <a:solidFill>
-                            <a:srgbClr val="000000">
-                              <a:alpha val="100000"/>
-                            </a:srgbClr>
-                          </a:solidFill>
-                          <a:latin typeface="arial"/>
-                          <a:cs typeface="arial"/>
-                          <a:ea typeface="arial"/>
-                          <a:sym typeface="arial"/>
-                        </a:rPr>
-                        <a:t>cl C.2</a:t>
-                      </a:r>
-                    </a:p>
-                  </a:txBody>
-                  <a:tcPr anchor="ctr" marB="38100" marT="38100" marR="0" marL="0">
-                    <a:lnL algn="ctr" cmpd="sng" cap="flat" w="0">
-                      <a:noFill/>
-                      <a:prstDash val="solid"/>
-                    </a:lnL>
-                    <a:lnR algn="ctr" cmpd="sng" cap="flat" w="0">
-                      <a:noFill/>
-                      <a:prstDash val="solid"/>
-                    </a:lnR>
-                    <a:lnT algn="ctr" cmpd="sng" cap="flat" w="0">
-                      <a:noFill/>
-                      <a:prstDash val="solid"/>
-                    </a:lnT>
-                    <a:lnB algn="ctr" cmpd="sng" cap="flat" w="0">
-                      <a:noFill/>
-                      <a:prstDash val="solid"/>
-                    </a:lnB>
-                    <a:solidFill>
-                      <a:srgbClr val="FFBD69">
-                        <a:alpha val="100000"/>
-                      </a:srgbClr>
-                    </a:solidFill>
-                  </a:tcPr>
-                </a:tc>
-                <a:tc>
-                  <a:txBody>
-                    <a:bodyPr/>
-                    <a:lstStyle/>
-                    <a:p>
-                      <a:pPr algn="ctr" marL="63500" marR="63500">
-                        <a:lnSpc>
-                          <a:spcPct val="100000"/>
-                        </a:lnSpc>
-                        <a:spcBef>
-                          <a:spcPts val="300"/>
-                        </a:spcBef>
-                        <a:spcAft>
-                          <a:spcPts val="300"/>
-                        </a:spcAft>
-                        <a:buNone/>
-                      </a:pPr>
-                      <a:r>
-                        <a:rPr cap="none" sz="1200" i="0" b="0" u="none">
-                          <a:solidFill>
-                            <a:srgbClr val="000000">
-                              <a:alpha val="100000"/>
-                            </a:srgbClr>
-                          </a:solidFill>
-                          <a:latin typeface="arial"/>
-                          <a:cs typeface="arial"/>
-                          <a:ea typeface="arial"/>
-                          <a:sym typeface="arial"/>
-                        </a:rPr>
-                        <a:t>35 (26.1%)</a:t>
-                      </a:r>
-                    </a:p>
-                  </a:txBody>
-                  <a:tcPr anchor="ctr" marB="38100" marT="38100" marR="0" marL="0">
-                    <a:lnL algn="ctr" cmpd="sng" cap="flat" w="0">
-                      <a:noFill/>
-                      <a:prstDash val="solid"/>
-                    </a:lnL>
-                    <a:lnR algn="ctr" cmpd="sng" cap="flat" w="0">
-                      <a:noFill/>
-                      <a:prstDash val="solid"/>
-                    </a:lnR>
-                    <a:lnT algn="ctr" cmpd="sng" cap="flat" w="0">
-                      <a:noFill/>
-                      <a:prstDash val="solid"/>
-                    </a:lnT>
-                    <a:lnB algn="ctr" cmpd="sng" cap="flat" w="0">
-                      <a:noFill/>
-                      <a:prstDash val="solid"/>
-                    </a:lnB>
-                    <a:solidFill>
-                      <a:srgbClr val="FFBD69">
-                        <a:alpha val="100000"/>
-                      </a:srgbClr>
-                    </a:solidFill>
-                  </a:tcPr>
-                </a:tc>
-                <a:tc>
-                  <a:txBody>
-                    <a:bodyPr/>
-                    <a:lstStyle/>
-                    <a:p>
-                      <a:pPr algn="ctr" marL="63500" marR="63500">
-                        <a:lnSpc>
-                          <a:spcPct val="100000"/>
-                        </a:lnSpc>
-                        <a:spcBef>
-                          <a:spcPts val="300"/>
-                        </a:spcBef>
-                        <a:spcAft>
-                          <a:spcPts val="300"/>
-                        </a:spcAft>
-                        <a:buNone/>
-                      </a:pPr>
-                      <a:r>
-                        <a:rPr cap="none" sz="1200" i="0" b="0" u="none">
-                          <a:solidFill>
-                            <a:srgbClr val="000000">
-                              <a:alpha val="100000"/>
-                            </a:srgbClr>
-                          </a:solidFill>
-                          <a:latin typeface="arial"/>
-                          <a:cs typeface="arial"/>
-                          <a:ea typeface="arial"/>
-                          <a:sym typeface="arial"/>
-                        </a:rPr>
-                        <a:t>48 (35.8%)</a:t>
-                      </a:r>
-                    </a:p>
-                  </a:txBody>
-                  <a:tcPr anchor="ctr" marB="38100" marT="38100" marR="0" marL="0">
-                    <a:lnL algn="ctr" cmpd="sng" cap="flat" w="0">
-                      <a:noFill/>
-                      <a:prstDash val="solid"/>
-                    </a:lnL>
-                    <a:lnR algn="ctr" cmpd="sng" cap="flat" w="0">
-                      <a:noFill/>
-                      <a:prstDash val="solid"/>
-                    </a:lnR>
-                    <a:lnT algn="ctr" cmpd="sng" cap="flat" w="0">
-                      <a:noFill/>
-                      <a:prstDash val="solid"/>
-                    </a:lnT>
-                    <a:lnB algn="ctr" cmpd="sng" cap="flat" w="0">
-                      <a:noFill/>
-                      <a:prstDash val="solid"/>
-                    </a:lnB>
-                    <a:solidFill>
-                      <a:srgbClr val="FFBD69">
-                        <a:alpha val="100000"/>
-                      </a:srgbClr>
-                    </a:solidFill>
-                  </a:tcPr>
-                </a:tc>
-                <a:tc>
-                  <a:txBody>
-                    <a:bodyPr/>
-                    <a:lstStyle/>
-                    <a:p>
-                      <a:pPr algn="ctr" marL="63500" marR="63500">
-                        <a:lnSpc>
-                          <a:spcPct val="100000"/>
-                        </a:lnSpc>
-                        <a:spcBef>
-                          <a:spcPts val="300"/>
-                        </a:spcBef>
-                        <a:spcAft>
-                          <a:spcPts val="300"/>
-                        </a:spcAft>
-                        <a:buNone/>
-                      </a:pPr>
-                      <a:r>
-                        <a:rPr cap="none" sz="1200" i="0" b="0" u="none">
-                          <a:solidFill>
-                            <a:srgbClr val="000000">
-                              <a:alpha val="100000"/>
-                            </a:srgbClr>
-                          </a:solidFill>
-                          <a:latin typeface="arial"/>
-                          <a:cs typeface="arial"/>
-                          <a:ea typeface="arial"/>
-                          <a:sym typeface="arial"/>
-                        </a:rPr>
-                        <a:t>138 (34.5%)</a:t>
-                      </a:r>
-                    </a:p>
-                  </a:txBody>
-                  <a:tcPr anchor="ctr" marB="38100" marT="38100" marR="0" marL="0">
-                    <a:lnL algn="ctr" cmpd="sng" cap="flat" w="0">
-                      <a:noFill/>
-                      <a:prstDash val="solid"/>
-                    </a:lnL>
-                    <a:lnR algn="ctr" cmpd="sng" cap="flat" w="0">
-                      <a:noFill/>
-                      <a:prstDash val="solid"/>
-                    </a:lnR>
-                    <a:lnT algn="ctr" cmpd="sng" cap="flat" w="0">
-                      <a:noFill/>
-                      <a:prstDash val="solid"/>
-                    </a:lnT>
-                    <a:lnB algn="ctr" cmpd="sng" cap="flat" w="0">
-                      <a:noFill/>
-                      <a:prstDash val="solid"/>
-                    </a:lnB>
-                    <a:solidFill>
-                      <a:srgbClr val="FFBD69">
-                        <a:alpha val="100000"/>
-                      </a:srgbClr>
-                    </a:solidFill>
-                  </a:tcPr>
-                </a:tc>
-              </a:tr>
-              <a:tr h="243582">
-                <a:tc>
-                  <a:txBody>
-                    <a:bodyPr/>
-                    <a:lstStyle/>
-                    <a:p>
-                      <a:pPr algn="ctr" marL="63500" marR="63500">
-                        <a:lnSpc>
-                          <a:spcPct val="100000"/>
-                        </a:lnSpc>
-                        <a:spcBef>
-                          <a:spcPts val="300"/>
-                        </a:spcBef>
-                        <a:spcAft>
-                          <a:spcPts val="300"/>
-                        </a:spcAft>
-                        <a:buNone/>
-                      </a:pPr>
-                      <a:r>
-                        <a:rPr cap="none" sz="1200" i="0" b="0" u="none">
-                          <a:solidFill>
-                            <a:srgbClr val="000000">
-                              <a:alpha val="100000"/>
-                            </a:srgbClr>
-                          </a:solidFill>
-                          <a:latin typeface="arial"/>
-                          <a:cs typeface="arial"/>
-                          <a:ea typeface="arial"/>
-                          <a:sym typeface="arial"/>
-                        </a:rPr>
-                        <a:t>dcd C.2.1.2.1</a:t>
-                      </a:r>
-                    </a:p>
-                  </a:txBody>
-                  <a:tcPr anchor="ctr" marB="38100" marT="38100" marR="0" marL="0">
-                    <a:lnL algn="ctr" cmpd="sng" cap="flat" w="0">
-                      <a:noFill/>
-                      <a:prstDash val="solid"/>
-                    </a:lnL>
-                    <a:lnR algn="ctr" cmpd="sng" cap="flat" w="0">
-                      <a:noFill/>
-                      <a:prstDash val="solid"/>
-                    </a:lnR>
-                    <a:lnT algn="ctr" cmpd="sng" cap="flat" w="0">
-                      <a:noFill/>
-                      <a:prstDash val="solid"/>
-                    </a:lnT>
-                    <a:lnB algn="ctr" cmpd="sng" cap="flat" w="0">
-                      <a:noFill/>
-                      <a:prstDash val="solid"/>
-                    </a:lnB>
-                    <a:solidFill>
-                      <a:srgbClr val="FF7D29">
-                        <a:alpha val="100000"/>
-                      </a:srgbClr>
-                    </a:solidFill>
-                  </a:tcPr>
-                </a:tc>
-                <a:tc>
-                  <a:txBody>
-                    <a:bodyPr/>
-                    <a:lstStyle/>
-                    <a:p>
-                      <a:pPr algn="ctr" marL="63500" marR="63500">
-                        <a:lnSpc>
-                          <a:spcPct val="100000"/>
-                        </a:lnSpc>
-                        <a:spcBef>
-                          <a:spcPts val="300"/>
-                        </a:spcBef>
-                        <a:spcAft>
-                          <a:spcPts val="300"/>
-                        </a:spcAft>
-                        <a:buNone/>
-                      </a:pPr>
-                      <a:r>
-                        <a:rPr cap="none" sz="1200" i="0" b="0" u="none">
-                          <a:solidFill>
-                            <a:srgbClr val="000000">
-                              <a:alpha val="100000"/>
-                            </a:srgbClr>
-                          </a:solidFill>
-                          <a:latin typeface="arial"/>
-                          <a:cs typeface="arial"/>
-                          <a:ea typeface="arial"/>
-                          <a:sym typeface="arial"/>
-                        </a:rPr>
-                        <a:t>35 (26.1%)</a:t>
-                      </a:r>
-                    </a:p>
-                  </a:txBody>
-                  <a:tcPr anchor="ctr" marB="38100" marT="38100" marR="0" marL="0">
-                    <a:lnL algn="ctr" cmpd="sng" cap="flat" w="0">
-                      <a:noFill/>
-                      <a:prstDash val="solid"/>
-                    </a:lnL>
-                    <a:lnR algn="ctr" cmpd="sng" cap="flat" w="0">
-                      <a:noFill/>
-                      <a:prstDash val="solid"/>
-                    </a:lnR>
-                    <a:lnT algn="ctr" cmpd="sng" cap="flat" w="0">
-                      <a:noFill/>
-                      <a:prstDash val="solid"/>
-                    </a:lnT>
-                    <a:lnB algn="ctr" cmpd="sng" cap="flat" w="0">
-                      <a:noFill/>
-                      <a:prstDash val="solid"/>
-                    </a:lnB>
-                    <a:solidFill>
-                      <a:srgbClr val="FF7D29">
-                        <a:alpha val="100000"/>
-                      </a:srgbClr>
-                    </a:solidFill>
-                  </a:tcPr>
-                </a:tc>
-                <a:tc>
-                  <a:txBody>
-                    <a:bodyPr/>
-                    <a:lstStyle/>
-                    <a:p>
-                      <a:pPr algn="ctr" marL="63500" marR="63500">
-                        <a:lnSpc>
-                          <a:spcPct val="100000"/>
-                        </a:lnSpc>
-                        <a:spcBef>
-                          <a:spcPts val="300"/>
-                        </a:spcBef>
-                        <a:spcAft>
-                          <a:spcPts val="300"/>
-                        </a:spcAft>
-                        <a:buNone/>
-                      </a:pPr>
-                      <a:r>
-                        <a:rPr cap="none" sz="1200" i="0" b="0" u="none">
-                          <a:solidFill>
-                            <a:srgbClr val="000000">
-                              <a:alpha val="100000"/>
-                            </a:srgbClr>
-                          </a:solidFill>
-                          <a:latin typeface="arial"/>
-                          <a:cs typeface="arial"/>
-                          <a:ea typeface="arial"/>
-                          <a:sym typeface="arial"/>
-                        </a:rPr>
-                        <a:t>48 (35.8%)</a:t>
-                      </a:r>
-                    </a:p>
-                  </a:txBody>
-                  <a:tcPr anchor="ctr" marB="38100" marT="38100" marR="0" marL="0">
-                    <a:lnL algn="ctr" cmpd="sng" cap="flat" w="0">
-                      <a:noFill/>
-                      <a:prstDash val="solid"/>
-                    </a:lnL>
-                    <a:lnR algn="ctr" cmpd="sng" cap="flat" w="0">
-                      <a:noFill/>
-                      <a:prstDash val="solid"/>
-                    </a:lnR>
-                    <a:lnT algn="ctr" cmpd="sng" cap="flat" w="0">
-                      <a:noFill/>
-                      <a:prstDash val="solid"/>
-                    </a:lnT>
-                    <a:lnB algn="ctr" cmpd="sng" cap="flat" w="0">
-                      <a:noFill/>
-                      <a:prstDash val="solid"/>
-                    </a:lnB>
-                    <a:solidFill>
-                      <a:srgbClr val="FF7D29">
-                        <a:alpha val="100000"/>
-                      </a:srgbClr>
-                    </a:solidFill>
-                  </a:tcPr>
-                </a:tc>
-                <a:tc>
-                  <a:txBody>
-                    <a:bodyPr/>
-                    <a:lstStyle/>
-                    <a:p>
-                      <a:pPr algn="ctr" marL="63500" marR="63500">
-                        <a:lnSpc>
-                          <a:spcPct val="100000"/>
-                        </a:lnSpc>
-                        <a:spcBef>
-                          <a:spcPts val="300"/>
-                        </a:spcBef>
-                        <a:spcAft>
-                          <a:spcPts val="300"/>
-                        </a:spcAft>
-                        <a:buNone/>
-                      </a:pPr>
-                      <a:r>
-                        <a:rPr cap="none" sz="1200" i="0" b="0" u="none">
-                          <a:solidFill>
-                            <a:srgbClr val="000000">
-                              <a:alpha val="100000"/>
-                            </a:srgbClr>
-                          </a:solidFill>
-                          <a:latin typeface="arial"/>
-                          <a:cs typeface="arial"/>
-                          <a:ea typeface="arial"/>
-                          <a:sym typeface="arial"/>
-                        </a:rPr>
-                        <a:t>138 (34.5%)</a:t>
-                      </a:r>
-                    </a:p>
-                  </a:txBody>
-                  <a:tcPr anchor="ctr" marB="38100" marT="38100" marR="0" marL="0">
-                    <a:lnL algn="ctr" cmpd="sng" cap="flat" w="0">
-                      <a:noFill/>
-                      <a:prstDash val="solid"/>
-                    </a:lnL>
-                    <a:lnR algn="ctr" cmpd="sng" cap="flat" w="0">
-                      <a:noFill/>
-                      <a:prstDash val="solid"/>
-                    </a:lnR>
-                    <a:lnT algn="ctr" cmpd="sng" cap="flat" w="0">
-                      <a:noFill/>
-                      <a:prstDash val="solid"/>
-                    </a:lnT>
-                    <a:lnB algn="ctr" cmpd="sng" cap="flat" w="0">
-                      <a:noFill/>
-                      <a:prstDash val="solid"/>
-                    </a:lnB>
-                    <a:solidFill>
-                      <a:srgbClr val="FF7D29">
                         <a:alpha val="100000"/>
                       </a:srgbClr>
                     </a:solidFill>
@@ -9107,7 +9338,7 @@
                 <a:ea typeface="Arial"/>
                 <a:sym typeface="Arial"/>
               </a:rPr>
-              <a:t>AE event table (cont.)</a:t>
+              <a:t>Adverse Events table (cont.)</a:t>
             </a:r>
           </a:p>
         </p:txBody>

</xml_diff>